<commit_message>
Improving lecture slides (up to session 2, slide 23)
</commit_message>
<xml_diff>
--- a/Vorlesung/0 Organisatorisches.pptx
+++ b/Vorlesung/0 Organisatorisches.pptx
@@ -7874,7 +7874,6 @@
               <a:rPr lang="nl-NL" sz="1000" dirty="0" smtClean="0"/>
               <a:t> </a:t>
             </a:r>
-            <a:endParaRPr lang="nl-NL" sz="1000" dirty="0" smtClean="0"/>
           </a:p>
         </p:txBody>
       </p:sp>
@@ -11655,7 +11654,7 @@
           <a:graphicData uri="http://schemas.openxmlformats.org/presentationml/2006/ole">
             <mc:AlternateContent xmlns:mc="http://schemas.openxmlformats.org/markup-compatibility/2006">
               <mc:Choice xmlns:v="urn:schemas-microsoft-com:vml" Requires="v">
-                <p:oleObj spid="_x0000_s27654" r:id="rId3" imgW="1038370" imgH="980952" progId="PBrush">
+                <p:oleObj spid="_x0000_s27665" r:id="rId3" imgW="1038370" imgH="980952" progId="PBrush">
                   <p:embed/>
                 </p:oleObj>
               </mc:Choice>
@@ -14649,7 +14648,7 @@
           <a:graphicData uri="http://schemas.openxmlformats.org/presentationml/2006/ole">
             <mc:AlternateContent xmlns:mc="http://schemas.openxmlformats.org/markup-compatibility/2006">
               <mc:Choice xmlns:v="urn:schemas-microsoft-com:vml" Requires="v">
-                <p:oleObj spid="_x0000_s1041" r:id="rId16" imgW="1038370" imgH="980952" progId="">
+                <p:oleObj spid="_x0000_s1052" r:id="rId16" imgW="1038370" imgH="980952" progId="">
                   <p:embed/>
                 </p:oleObj>
               </mc:Choice>
@@ -16595,7 +16594,7 @@
           <a:graphicData uri="http://schemas.openxmlformats.org/presentationml/2006/ole">
             <mc:AlternateContent xmlns:mc="http://schemas.openxmlformats.org/markup-compatibility/2006">
               <mc:Choice xmlns:v="urn:schemas-microsoft-com:vml" Requires="v">
-                <p:oleObj spid="_x0000_s2064" r:id="rId6" imgW="1038370" imgH="980952" progId="PBrush">
+                <p:oleObj spid="_x0000_s2075" r:id="rId6" imgW="1038370" imgH="980952" progId="PBrush">
                   <p:embed/>
                 </p:oleObj>
               </mc:Choice>
@@ -18238,8 +18237,24 @@
               <a:buNone/>
             </a:pPr>
             <a:r>
-              <a:rPr lang="de-DE" altLang="de-DE" sz="1800"/>
-              <a:t>GitHub (# of projects)</a:t>
+              <a:rPr lang="de-DE" altLang="de-DE" sz="1800" dirty="0"/>
+              <a:t>GitHub (# </a:t>
+            </a:r>
+            <a:r>
+              <a:rPr lang="de-DE" altLang="de-DE" sz="1800" dirty="0" err="1"/>
+              <a:t>of</a:t>
+            </a:r>
+            <a:r>
+              <a:rPr lang="de-DE" altLang="de-DE" sz="1800" dirty="0"/>
+              <a:t> </a:t>
+            </a:r>
+            <a:r>
+              <a:rPr lang="de-DE" altLang="de-DE" sz="1800" dirty="0" err="1"/>
+              <a:t>projects</a:t>
+            </a:r>
+            <a:r>
+              <a:rPr lang="de-DE" altLang="de-DE" sz="1800" dirty="0"/>
+              <a:t>)</a:t>
             </a:r>
           </a:p>
         </p:txBody>
@@ -19632,8 +19647,24 @@
             </a:pPr>
             <a:r>
               <a:rPr lang="de-DE" dirty="0" smtClean="0"/>
-              <a:t>09:00 – 12:00:  Frontalunterricht im Hörsaal</a:t>
-            </a:r>
+              <a:t>09:00 – </a:t>
+            </a:r>
+            <a:r>
+              <a:rPr lang="de-DE" dirty="0" smtClean="0"/>
+              <a:t>11:30</a:t>
+            </a:r>
+            <a:r>
+              <a:rPr lang="de-DE" dirty="0" smtClean="0"/>
+              <a:t>:  Frontalunterricht im </a:t>
+            </a:r>
+            <a:r>
+              <a:rPr lang="de-DE" dirty="0" smtClean="0"/>
+              <a:t>Hörsaal</a:t>
+            </a:r>
+            <a:br>
+              <a:rPr lang="de-DE" dirty="0" smtClean="0"/>
+            </a:br>
+            <a:endParaRPr lang="de-DE" dirty="0" smtClean="0"/>
           </a:p>
           <a:p>
             <a:pPr marL="180975" lvl="1" indent="0" eaLnBrk="1" hangingPunct="1">
@@ -19702,15 +19733,7 @@
             </a:pPr>
             <a:r>
               <a:rPr lang="de-DE" dirty="0" smtClean="0"/>
-              <a:t>Roland Kluge</a:t>
-            </a:r>
-            <a:r>
-              <a:rPr lang="de-DE" dirty="0" smtClean="0"/>
-              <a:t>,</a:t>
-            </a:r>
-            <a:r>
-              <a:rPr lang="de-DE" dirty="0" smtClean="0"/>
-              <a:t/>
+              <a:t>Roland Kluge,</a:t>
             </a:r>
             <a:br>
               <a:rPr lang="de-DE" dirty="0" smtClean="0"/>
@@ -19719,74 +19742,12 @@
               <a:rPr lang="de-DE" dirty="0" smtClean="0"/>
               <a:t>Eugen Lutz, Matthias TODO</a:t>
             </a:r>
-            <a:endParaRPr lang="de-DE" dirty="0" smtClean="0"/>
           </a:p>
           <a:p>
             <a:pPr lvl="1" eaLnBrk="1" hangingPunct="1">
               <a:defRPr/>
             </a:pPr>
             <a:endParaRPr lang="de-DE" dirty="0" smtClean="0"/>
-          </a:p>
-        </p:txBody>
-      </p:sp>
-      <p:sp>
-        <p:nvSpPr>
-          <p:cNvPr id="4" name="Abgerundete rechteckige Legende 3"/>
-          <p:cNvSpPr/>
-          <p:nvPr/>
-        </p:nvSpPr>
-        <p:spPr>
-          <a:xfrm>
-            <a:off x="5292725" y="1485900"/>
-            <a:ext cx="3671888" cy="1008063"/>
-          </a:xfrm>
-          <a:prstGeom prst="wedgeRoundRectCallout">
-            <a:avLst>
-              <a:gd name="adj1" fmla="val -57300"/>
-              <a:gd name="adj2" fmla="val 35794"/>
-              <a:gd name="adj3" fmla="val 16667"/>
-            </a:avLst>
-          </a:prstGeom>
-          <a:solidFill>
-            <a:schemeClr val="bg1"/>
-          </a:solidFill>
-          <a:ln>
-            <a:solidFill>
-              <a:schemeClr val="tx1"/>
-            </a:solidFill>
-          </a:ln>
-        </p:spPr>
-        <p:style>
-          <a:lnRef idx="2">
-            <a:schemeClr val="accent1">
-              <a:shade val="50000"/>
-            </a:schemeClr>
-          </a:lnRef>
-          <a:fillRef idx="1">
-            <a:schemeClr val="accent1"/>
-          </a:fillRef>
-          <a:effectRef idx="0">
-            <a:schemeClr val="accent1"/>
-          </a:effectRef>
-          <a:fontRef idx="minor">
-            <a:schemeClr val="lt1"/>
-          </a:fontRef>
-        </p:style>
-        <p:txBody>
-          <a:bodyPr anchor="ctr"/>
-          <a:lstStyle/>
-          <a:p>
-            <a:pPr>
-              <a:defRPr/>
-            </a:pPr>
-            <a:r>
-              <a:rPr lang="de-DE" dirty="0">
-                <a:solidFill>
-                  <a:schemeClr val="tx1"/>
-                </a:solidFill>
-              </a:rPr>
-              <a:t>Je nach Bedarf wechseln wir schon um 10:30/11:00 zur Übung</a:t>
-            </a:r>
           </a:p>
         </p:txBody>
       </p:sp>
@@ -19859,7 +19820,7 @@
         </p:nvSpPr>
         <p:spPr>
           <a:xfrm>
-            <a:off x="5219700" y="2852738"/>
+            <a:off x="5388768" y="3001963"/>
             <a:ext cx="2759075" cy="688975"/>
           </a:xfrm>
           <a:prstGeom prst="wedgeRoundRectCallout">
@@ -19967,7 +19928,7 @@
                                           </p:stCondLst>
                                         </p:cTn>
                                         <p:tgtEl>
-                                          <p:spTgt spid="4"/>
+                                          <p:spTgt spid="6"/>
                                         </p:tgtEl>
                                         <p:attrNameLst>
                                           <p:attrName>style.visibility</p:attrName>
@@ -19981,7 +19942,7 @@
                                       <p:cBhvr>
                                         <p:cTn id="7" dur="500"/>
                                         <p:tgtEl>
-                                          <p:spTgt spid="4"/>
+                                          <p:spTgt spid="6"/>
                                         </p:tgtEl>
                                       </p:cBhvr>
                                     </p:animEffect>
@@ -20020,7 +19981,7 @@
                                           </p:stCondLst>
                                         </p:cTn>
                                         <p:tgtEl>
-                                          <p:spTgt spid="6"/>
+                                          <p:spTgt spid="5"/>
                                         </p:tgtEl>
                                         <p:attrNameLst>
                                           <p:attrName>style.visibility</p:attrName>
@@ -20033,59 +19994,6 @@
                                     <p:animEffect transition="in" filter="fade">
                                       <p:cBhvr>
                                         <p:cTn id="12" dur="500"/>
-                                        <p:tgtEl>
-                                          <p:spTgt spid="6"/>
-                                        </p:tgtEl>
-                                      </p:cBhvr>
-                                    </p:animEffect>
-                                  </p:childTnLst>
-                                </p:cTn>
-                              </p:par>
-                            </p:childTnLst>
-                          </p:cTn>
-                        </p:par>
-                      </p:childTnLst>
-                    </p:cTn>
-                  </p:par>
-                  <p:par>
-                    <p:cTn id="13" fill="hold" nodeType="clickPar">
-                      <p:stCondLst>
-                        <p:cond delay="indefinite"/>
-                      </p:stCondLst>
-                      <p:childTnLst>
-                        <p:par>
-                          <p:cTn id="14" fill="hold" nodeType="withGroup">
-                            <p:stCondLst>
-                              <p:cond delay="0"/>
-                            </p:stCondLst>
-                            <p:childTnLst>
-                              <p:par>
-                                <p:cTn id="15" presetID="10" presetClass="entr" presetSubtype="0" fill="hold" grpId="0" nodeType="clickEffect">
-                                  <p:stCondLst>
-                                    <p:cond delay="0"/>
-                                  </p:stCondLst>
-                                  <p:childTnLst>
-                                    <p:set>
-                                      <p:cBhvr>
-                                        <p:cTn id="16" dur="1" fill="hold">
-                                          <p:stCondLst>
-                                            <p:cond delay="0"/>
-                                          </p:stCondLst>
-                                        </p:cTn>
-                                        <p:tgtEl>
-                                          <p:spTgt spid="5"/>
-                                        </p:tgtEl>
-                                        <p:attrNameLst>
-                                          <p:attrName>style.visibility</p:attrName>
-                                        </p:attrNameLst>
-                                      </p:cBhvr>
-                                      <p:to>
-                                        <p:strVal val="visible"/>
-                                      </p:to>
-                                    </p:set>
-                                    <p:animEffect transition="in" filter="fade">
-                                      <p:cBhvr>
-                                        <p:cTn id="17" dur="500"/>
                                         <p:tgtEl>
                                           <p:spTgt spid="5"/>
                                         </p:tgtEl>
@@ -20122,7 +20030,6 @@
       </p:par>
     </p:tnLst>
     <p:bldLst>
-      <p:bldP spid="4" grpId="0" animBg="1"/>
       <p:bldP spid="5" grpId="0" animBg="1"/>
       <p:bldP spid="6" grpId="0" animBg="1"/>
     </p:bldLst>
@@ -20195,9 +20102,27 @@
               <a:buNone/>
             </a:pPr>
             <a:r>
-              <a:rPr lang="de-DE" altLang="de-DE" smtClean="0"/>
+              <a:rPr lang="de-DE" altLang="de-DE" dirty="0" smtClean="0"/>
               <a:t>Termin</a:t>
             </a:r>
+          </a:p>
+          <a:p>
+            <a:pPr marL="180975" lvl="1" indent="0" eaLnBrk="1" hangingPunct="1">
+              <a:buNone/>
+            </a:pPr>
+            <a:r>
+              <a:rPr lang="de-DE" altLang="de-DE" dirty="0" smtClean="0"/>
+              <a:t>Datum:	</a:t>
+            </a:r>
+            <a:r>
+              <a:rPr lang="de-DE" altLang="de-DE" dirty="0"/>
+              <a:t> </a:t>
+            </a:r>
+            <a:r>
+              <a:rPr lang="de-DE" altLang="de-DE" dirty="0" smtClean="0"/>
+              <a:t>Dienstag, 14.10.2014</a:t>
+            </a:r>
+            <a:endParaRPr lang="de-DE" altLang="de-DE" dirty="0" smtClean="0"/>
           </a:p>
           <a:p>
             <a:pPr marL="180975" lvl="1" indent="0" eaLnBrk="1" hangingPunct="1">
@@ -20205,8 +20130,8 @@
               <a:buNone/>
             </a:pPr>
             <a:r>
-              <a:rPr lang="de-DE" altLang="de-DE" smtClean="0"/>
-              <a:t>Datum:	14.10.2014 (Dienstag)</a:t>
+              <a:rPr lang="de-DE" altLang="de-DE" dirty="0" smtClean="0"/>
+              <a:t>Uhrzeit:	16:15 – 18:15 (Bearbeitungszeit: 90 Minuten)</a:t>
             </a:r>
           </a:p>
           <a:p>
@@ -20215,8 +20140,28 @@
               <a:buNone/>
             </a:pPr>
             <a:r>
-              <a:rPr lang="de-DE" altLang="de-DE" smtClean="0"/>
-              <a:t>Uhrzeit:	16:15 – 18:15 (Bearbeitungszeit: 90 Minuten)</a:t>
+              <a:rPr lang="de-DE" altLang="de-DE" dirty="0" smtClean="0"/>
+              <a:t>Raum:	</a:t>
+            </a:r>
+            <a:r>
+              <a:rPr lang="de-DE" altLang="de-DE" b="1" dirty="0" smtClean="0">
+                <a:solidFill>
+                  <a:srgbClr val="FF0000"/>
+                </a:solidFill>
+              </a:rPr>
+              <a:t> </a:t>
+            </a:r>
+            <a:r>
+              <a:rPr lang="de-DE" altLang="de-DE" dirty="0" smtClean="0">
+                <a:solidFill>
+                  <a:srgbClr val="FF0000"/>
+                </a:solidFill>
+              </a:rPr>
+              <a:t>	</a:t>
+            </a:r>
+            <a:r>
+              <a:rPr lang="de-DE" altLang="de-DE" dirty="0" smtClean="0"/>
+              <a:t>S1|01 A01</a:t>
             </a:r>
           </a:p>
           <a:p>
@@ -20224,29 +20169,16 @@
               <a:buFont typeface="Wingdings" pitchFamily="2" charset="2"/>
               <a:buNone/>
             </a:pPr>
-            <a:r>
-              <a:rPr lang="de-DE" altLang="de-DE" smtClean="0"/>
-              <a:t>Raum:	</a:t>
-            </a:r>
-            <a:r>
-              <a:rPr lang="de-DE" altLang="de-DE" b="1" smtClean="0">
-                <a:solidFill>
-                  <a:srgbClr val="FF0000"/>
-                </a:solidFill>
-              </a:rPr>
-              <a:t> </a:t>
-            </a:r>
-            <a:r>
-              <a:rPr lang="de-DE" altLang="de-DE" smtClean="0">
-                <a:solidFill>
-                  <a:srgbClr val="FF0000"/>
-                </a:solidFill>
-              </a:rPr>
-              <a:t>	</a:t>
-            </a:r>
-            <a:r>
-              <a:rPr lang="de-DE" altLang="de-DE" smtClean="0"/>
-              <a:t>S1|01 A01</a:t>
+            <a:endParaRPr lang="de-DE" altLang="de-DE" dirty="0" smtClean="0"/>
+          </a:p>
+          <a:p>
+            <a:pPr marL="0" indent="0" eaLnBrk="1" hangingPunct="1">
+              <a:buFont typeface="Wingdings" pitchFamily="2" charset="2"/>
+              <a:buNone/>
+            </a:pPr>
+            <a:r>
+              <a:rPr lang="de-DE" altLang="de-DE" dirty="0" smtClean="0"/>
+              <a:t>Inhalt</a:t>
             </a:r>
           </a:p>
           <a:p>
@@ -20254,16 +20186,53 @@
               <a:buFont typeface="Wingdings" pitchFamily="2" charset="2"/>
               <a:buNone/>
             </a:pPr>
-            <a:endParaRPr lang="de-DE" altLang="de-DE" smtClean="0"/>
+            <a:r>
+              <a:rPr lang="de-DE" altLang="de-DE" dirty="0" smtClean="0"/>
+              <a:t>Tag 1 bis Tag 4</a:t>
+            </a:r>
+          </a:p>
+          <a:p>
+            <a:pPr marL="180975" lvl="1" indent="0" eaLnBrk="1" hangingPunct="1">
+              <a:buFont typeface="Wingdings" pitchFamily="2" charset="2"/>
+              <a:buNone/>
+            </a:pPr>
+            <a:r>
+              <a:rPr lang="de-DE" altLang="de-DE" dirty="0" smtClean="0"/>
+              <a:t>(Tag </a:t>
+            </a:r>
+            <a:r>
+              <a:rPr lang="de-DE" altLang="de-DE" dirty="0" smtClean="0"/>
+              <a:t>5 und Tag </a:t>
+            </a:r>
+            <a:r>
+              <a:rPr lang="de-DE" altLang="de-DE" dirty="0" smtClean="0"/>
+              <a:t>6 sind </a:t>
+            </a:r>
+            <a:r>
+              <a:rPr lang="de-DE" altLang="de-DE" b="1" dirty="0" smtClean="0"/>
+              <a:t>nicht</a:t>
+            </a:r>
+            <a:r>
+              <a:rPr lang="de-DE" altLang="de-DE" dirty="0" smtClean="0"/>
+              <a:t> klausurrelevant)</a:t>
+            </a:r>
+            <a:endParaRPr lang="de-DE" altLang="de-DE" dirty="0" smtClean="0"/>
           </a:p>
           <a:p>
             <a:pPr marL="0" indent="0" eaLnBrk="1" hangingPunct="1">
               <a:buFont typeface="Wingdings" pitchFamily="2" charset="2"/>
               <a:buNone/>
             </a:pPr>
-            <a:r>
-              <a:rPr lang="de-DE" altLang="de-DE" smtClean="0"/>
-              <a:t>Inhalt</a:t>
+            <a:endParaRPr lang="de-DE" altLang="de-DE" dirty="0" smtClean="0"/>
+          </a:p>
+          <a:p>
+            <a:pPr marL="0" indent="0" eaLnBrk="1" hangingPunct="1">
+              <a:buFont typeface="Wingdings" pitchFamily="2" charset="2"/>
+              <a:buNone/>
+            </a:pPr>
+            <a:r>
+              <a:rPr lang="de-DE" altLang="de-DE" dirty="0" smtClean="0"/>
+              <a:t>Vorbereitung</a:t>
             </a:r>
           </a:p>
           <a:p>
@@ -20272,8 +20241,25 @@
               <a:buNone/>
             </a:pPr>
             <a:r>
-              <a:rPr lang="de-DE" altLang="de-DE" smtClean="0"/>
-              <a:t>Tag 1 bis Tag 4</a:t>
+              <a:rPr lang="de-DE" altLang="de-DE" dirty="0" smtClean="0"/>
+              <a:t>Übungen aus dem Praktikum selbstständig lösen</a:t>
+            </a:r>
+          </a:p>
+          <a:p>
+            <a:pPr marL="0" indent="0" eaLnBrk="1" hangingPunct="1">
+              <a:buFont typeface="Wingdings" pitchFamily="2" charset="2"/>
+              <a:buNone/>
+            </a:pPr>
+            <a:endParaRPr lang="de-DE" altLang="de-DE" dirty="0" smtClean="0"/>
+          </a:p>
+          <a:p>
+            <a:pPr marL="0" indent="0" eaLnBrk="1" hangingPunct="1">
+              <a:buFont typeface="Wingdings" pitchFamily="2" charset="2"/>
+              <a:buNone/>
+            </a:pPr>
+            <a:r>
+              <a:rPr lang="de-DE" altLang="de-DE" dirty="0" smtClean="0"/>
+              <a:t>Zur Teilnahme erforderlich</a:t>
             </a:r>
           </a:p>
           <a:p>
@@ -20282,69 +20268,19 @@
               <a:buNone/>
             </a:pPr>
             <a:r>
-              <a:rPr lang="de-DE" altLang="de-DE" smtClean="0"/>
-              <a:t>(nicht klausurrelevant: Tag 5 und Tag 6)</a:t>
-            </a:r>
-          </a:p>
-          <a:p>
-            <a:pPr marL="0" indent="0" eaLnBrk="1" hangingPunct="1">
-              <a:buFont typeface="Wingdings" pitchFamily="2" charset="2"/>
-              <a:buNone/>
-            </a:pPr>
-            <a:endParaRPr lang="de-DE" altLang="de-DE" smtClean="0"/>
-          </a:p>
-          <a:p>
-            <a:pPr marL="0" indent="0" eaLnBrk="1" hangingPunct="1">
-              <a:buFont typeface="Wingdings" pitchFamily="2" charset="2"/>
-              <a:buNone/>
-            </a:pPr>
-            <a:r>
-              <a:rPr lang="de-DE" altLang="de-DE" smtClean="0"/>
-              <a:t>Vorbereitung</a:t>
-            </a:r>
-          </a:p>
-          <a:p>
-            <a:pPr marL="180975" lvl="1" indent="0" eaLnBrk="1" hangingPunct="1">
-              <a:buFont typeface="Wingdings" pitchFamily="2" charset="2"/>
-              <a:buNone/>
-            </a:pPr>
-            <a:r>
-              <a:rPr lang="de-DE" altLang="de-DE" smtClean="0"/>
-              <a:t>Übungen aus dem Praktikum selbstständig lösen</a:t>
-            </a:r>
-          </a:p>
-          <a:p>
-            <a:pPr marL="0" indent="0" eaLnBrk="1" hangingPunct="1">
-              <a:buFont typeface="Wingdings" pitchFamily="2" charset="2"/>
-              <a:buNone/>
-            </a:pPr>
-            <a:endParaRPr lang="de-DE" altLang="de-DE" smtClean="0"/>
-          </a:p>
-          <a:p>
-            <a:pPr marL="0" indent="0" eaLnBrk="1" hangingPunct="1">
-              <a:buFont typeface="Wingdings" pitchFamily="2" charset="2"/>
-              <a:buNone/>
-            </a:pPr>
-            <a:r>
-              <a:rPr lang="de-DE" altLang="de-DE" smtClean="0"/>
-              <a:t>Zur Teilnahme erforderlich</a:t>
-            </a:r>
-          </a:p>
-          <a:p>
-            <a:pPr marL="180975" lvl="1" indent="0" eaLnBrk="1" hangingPunct="1">
-              <a:buFont typeface="Wingdings" pitchFamily="2" charset="2"/>
-              <a:buNone/>
-            </a:pPr>
-            <a:r>
-              <a:rPr lang="de-DE" altLang="de-DE" smtClean="0"/>
-              <a:t>Amtlicher Lichtbildausweis, Studienausweis, Klausuranmeldung (</a:t>
-            </a:r>
-            <a:r>
-              <a:rPr lang="de-DE" altLang="de-DE" b="1" smtClean="0"/>
+              <a:rPr lang="de-DE" altLang="de-DE" dirty="0" smtClean="0"/>
+              <a:t>amtlicher Lichtbildausweis, </a:t>
+            </a:r>
+            <a:r>
+              <a:rPr lang="de-DE" altLang="de-DE" dirty="0" smtClean="0"/>
+              <a:t>Klausuranmeldung (</a:t>
+            </a:r>
+            <a:r>
+              <a:rPr lang="de-DE" altLang="de-DE" b="1" dirty="0" smtClean="0"/>
               <a:t>TUCaN!</a:t>
             </a:r>
             <a:r>
-              <a:rPr lang="de-DE" altLang="de-DE" smtClean="0"/>
+              <a:rPr lang="de-DE" altLang="de-DE" dirty="0" smtClean="0"/>
               <a:t>)</a:t>
             </a:r>
           </a:p>
@@ -20435,7 +20371,7 @@
         </p:nvSpPr>
         <p:spPr>
           <a:xfrm>
-            <a:off x="5076825" y="4149725"/>
+            <a:off x="2627313" y="4221088"/>
             <a:ext cx="2951163" cy="720725"/>
           </a:xfrm>
           <a:prstGeom prst="wedgeRoundRectCallout">
@@ -20485,6 +20421,72 @@
               </a:rPr>
               <a:t>Programmierung mit C für eingebettete Systeme</a:t>
             </a:r>
+          </a:p>
+        </p:txBody>
+      </p:sp>
+      <p:sp>
+        <p:nvSpPr>
+          <p:cNvPr id="6" name="Abgerundete rechteckige Legende 5"/>
+          <p:cNvSpPr/>
+          <p:nvPr/>
+        </p:nvSpPr>
+        <p:spPr>
+          <a:xfrm>
+            <a:off x="5940153" y="5157192"/>
+            <a:ext cx="2088232" cy="720725"/>
+          </a:xfrm>
+          <a:prstGeom prst="wedgeRoundRectCallout">
+            <a:avLst>
+              <a:gd name="adj1" fmla="val -39089"/>
+              <a:gd name="adj2" fmla="val 81032"/>
+              <a:gd name="adj3" fmla="val 16667"/>
+            </a:avLst>
+          </a:prstGeom>
+          <a:solidFill>
+            <a:schemeClr val="bg1"/>
+          </a:solidFill>
+          <a:ln>
+            <a:solidFill>
+              <a:schemeClr val="tx1"/>
+            </a:solidFill>
+          </a:ln>
+        </p:spPr>
+        <p:style>
+          <a:lnRef idx="2">
+            <a:schemeClr val="accent1">
+              <a:shade val="50000"/>
+            </a:schemeClr>
+          </a:lnRef>
+          <a:fillRef idx="1">
+            <a:schemeClr val="accent1"/>
+          </a:fillRef>
+          <a:effectRef idx="0">
+            <a:schemeClr val="accent1"/>
+          </a:effectRef>
+          <a:fontRef idx="minor">
+            <a:schemeClr val="lt1"/>
+          </a:fontRef>
+        </p:style>
+        <p:txBody>
+          <a:bodyPr anchor="ctr"/>
+          <a:lstStyle/>
+          <a:p>
+            <a:pPr>
+              <a:defRPr/>
+            </a:pPr>
+            <a:r>
+              <a:rPr lang="de-DE" dirty="0" smtClean="0">
+                <a:solidFill>
+                  <a:schemeClr val="tx1"/>
+                </a:solidFill>
+              </a:rPr>
+              <a:t>Sollte bereits geschehen sein!</a:t>
+            </a:r>
+            <a:endParaRPr lang="de-DE" dirty="0">
+              <a:solidFill>
+                <a:schemeClr val="tx1"/>
+              </a:solidFill>
+            </a:endParaRPr>
           </a:p>
         </p:txBody>
       </p:sp>
@@ -20607,6 +20609,51 @@
                       </p:childTnLst>
                     </p:cTn>
                   </p:par>
+                  <p:par>
+                    <p:cTn id="13" fill="hold">
+                      <p:stCondLst>
+                        <p:cond delay="indefinite"/>
+                      </p:stCondLst>
+                      <p:childTnLst>
+                        <p:par>
+                          <p:cTn id="14" fill="hold">
+                            <p:stCondLst>
+                              <p:cond delay="0"/>
+                            </p:stCondLst>
+                            <p:childTnLst>
+                              <p:par>
+                                <p:cTn id="15" presetID="1" presetClass="entr" presetSubtype="0" fill="hold" grpId="0" nodeType="clickEffect">
+                                  <p:stCondLst>
+                                    <p:cond delay="0"/>
+                                  </p:stCondLst>
+                                  <p:childTnLst>
+                                    <p:set>
+                                      <p:cBhvr>
+                                        <p:cTn id="16" dur="1" fill="hold">
+                                          <p:stCondLst>
+                                            <p:cond delay="0"/>
+                                          </p:stCondLst>
+                                        </p:cTn>
+                                        <p:tgtEl>
+                                          <p:spTgt spid="6"/>
+                                        </p:tgtEl>
+                                        <p:attrNameLst>
+                                          <p:attrName>style.visibility</p:attrName>
+                                        </p:attrNameLst>
+                                      </p:cBhvr>
+                                      <p:to>
+                                        <p:strVal val="visible"/>
+                                      </p:to>
+                                    </p:set>
+                                  </p:childTnLst>
+                                </p:cTn>
+                              </p:par>
+                            </p:childTnLst>
+                          </p:cTn>
+                        </p:par>
+                      </p:childTnLst>
+                    </p:cTn>
+                  </p:par>
                 </p:childTnLst>
               </p:cTn>
               <p:prevCondLst>
@@ -20631,6 +20678,7 @@
     <p:bldLst>
       <p:bldP spid="4" grpId="0" animBg="1"/>
       <p:bldP spid="7" grpId="0" animBg="1"/>
+      <p:bldP spid="6" grpId="0" animBg="1"/>
     </p:bldLst>
   </p:timing>
 </p:sld>
@@ -20703,8 +20751,13 @@
             </a:pPr>
             <a:r>
               <a:rPr lang="de-DE" dirty="0" smtClean="0"/>
-              <a:t>Alle Studenten arbeiten im Raum 67</a:t>
-            </a:r>
+              <a:t>Alle Studenten arbeiten im Raum </a:t>
+            </a:r>
+            <a:r>
+              <a:rPr lang="de-DE" dirty="0" smtClean="0"/>
+              <a:t>67 TODO</a:t>
+            </a:r>
+            <a:endParaRPr lang="de-DE" dirty="0" smtClean="0"/>
           </a:p>
           <a:p>
             <a:pPr marL="0" indent="0" eaLnBrk="1" hangingPunct="1">
@@ -20842,6 +20895,11 @@
               <a:rPr lang="de-DE" dirty="0" smtClean="0"/>
               <a:t> </a:t>
             </a:r>
+            <a:r>
+              <a:rPr lang="de-DE" dirty="0" smtClean="0"/>
+              <a:t>(Git oder SVN)</a:t>
+            </a:r>
+            <a:endParaRPr lang="de-DE" dirty="0" smtClean="0"/>
           </a:p>
           <a:p>
             <a:pPr marL="169862" lvl="1" indent="0" eaLnBrk="1" hangingPunct="1">
@@ -20865,6 +20923,14 @@
               <a:rPr lang="de-DE" dirty="0" smtClean="0"/>
               <a:t> </a:t>
             </a:r>
+            <a:r>
+              <a:rPr lang="de-DE" dirty="0" smtClean="0"/>
+              <a:t>(Git)</a:t>
+            </a:r>
+            <a:r>
+              <a:rPr lang="de-DE" dirty="0" smtClean="0"/>
+              <a:t/>
+            </a:r>
             <a:br>
               <a:rPr lang="de-DE" dirty="0" smtClean="0"/>
             </a:br>
@@ -20877,9 +20943,10 @@
               <a:defRPr/>
             </a:pPr>
             <a:r>
-              <a:rPr lang="de-DE" dirty="0" smtClean="0"/>
-              <a:t>Forum</a:t>
-            </a:r>
+              <a:rPr lang="de-DE" smtClean="0"/>
+              <a:t>Forum TODO</a:t>
+            </a:r>
+            <a:endParaRPr lang="de-DE" dirty="0" smtClean="0"/>
           </a:p>
           <a:p>
             <a:pPr marL="169862" lvl="1" indent="0" eaLnBrk="1" hangingPunct="1">
@@ -21097,8 +21164,12 @@
           <a:lstStyle/>
           <a:p>
             <a:r>
-              <a:rPr lang="de-DE" altLang="de-DE" smtClean="0"/>
-              <a:t>Literaturvorschläge</a:t>
+              <a:rPr lang="de-DE" altLang="de-DE" dirty="0" smtClean="0"/>
+              <a:t>Literatur</a:t>
+            </a:r>
+            <a:r>
+              <a:rPr lang="de-DE" altLang="de-DE" u="sng" dirty="0" smtClean="0"/>
+              <a:t>vorschläge</a:t>
             </a:r>
           </a:p>
         </p:txBody>
@@ -21196,7 +21267,7 @@
 </file>
 
 <file path=ppt/slides/slide7.xml><?xml version="1.0" encoding="utf-8"?>
-<p:sld xmlns:a="http://schemas.openxmlformats.org/drawingml/2006/main" xmlns:r="http://schemas.openxmlformats.org/officeDocument/2006/relationships" xmlns:p="http://schemas.openxmlformats.org/presentationml/2006/main">
+<p:sld xmlns:a="http://schemas.openxmlformats.org/drawingml/2006/main" xmlns:r="http://schemas.openxmlformats.org/officeDocument/2006/relationships" xmlns:p="http://schemas.openxmlformats.org/presentationml/2006/main" show="0">
   <p:cSld>
     <p:spTree>
       <p:nvGrpSpPr>
@@ -21392,7 +21463,27 @@
                 <a:latin typeface="Arial" pitchFamily="34" charset="0"/>
                 <a:ea typeface="+mn-ea"/>
               </a:rPr>
-              <a:t>	ca. 1 Tag(e) pro Woche [ + Vorlesungsfreie Zeit]</a:t>
+              <a:t>	ca. 1 Tag(e) pro Woche [ + </a:t>
+            </a:r>
+            <a:r>
+              <a:rPr lang="de-DE" sz="1200" dirty="0" smtClean="0">
+                <a:solidFill>
+                  <a:srgbClr val="000000"/>
+                </a:solidFill>
+                <a:latin typeface="Arial" pitchFamily="34" charset="0"/>
+                <a:ea typeface="+mn-ea"/>
+              </a:rPr>
+              <a:t>vorlesungsfreie </a:t>
+            </a:r>
+            <a:r>
+              <a:rPr lang="de-DE" sz="1200" dirty="0">
+                <a:solidFill>
+                  <a:srgbClr val="000000"/>
+                </a:solidFill>
+                <a:latin typeface="Arial" pitchFamily="34" charset="0"/>
+                <a:ea typeface="+mn-ea"/>
+              </a:rPr>
+              <a:t>Zeit]</a:t>
             </a:r>
           </a:p>
           <a:p>
@@ -22713,7 +22804,7 @@
 </file>
 
 <file path=ppt/slides/slide8.xml><?xml version="1.0" encoding="utf-8"?>
-<p:sld xmlns:a="http://schemas.openxmlformats.org/drawingml/2006/main" xmlns:r="http://schemas.openxmlformats.org/officeDocument/2006/relationships" xmlns:p="http://schemas.openxmlformats.org/presentationml/2006/main">
+<p:sld xmlns:a="http://schemas.openxmlformats.org/drawingml/2006/main" xmlns:r="http://schemas.openxmlformats.org/officeDocument/2006/relationships" xmlns:p="http://schemas.openxmlformats.org/presentationml/2006/main" show="0">
   <p:cSld>
     <p:spTree>
       <p:nvGrpSpPr>
@@ -22846,7 +22937,27 @@
                 <a:latin typeface="Arial" pitchFamily="34" charset="0"/>
                 <a:ea typeface="+mn-ea"/>
               </a:rPr>
-              <a:t>	1 bis 2 Tag(e) pro Woche [ + Vorlesungsfreie Zeit]</a:t>
+              <a:t>	1 bis 2 Tag(e) pro Woche [ + </a:t>
+            </a:r>
+            <a:r>
+              <a:rPr lang="de-DE" sz="1200" dirty="0" smtClean="0">
+                <a:solidFill>
+                  <a:srgbClr val="000000"/>
+                </a:solidFill>
+                <a:latin typeface="Arial" pitchFamily="34" charset="0"/>
+                <a:ea typeface="+mn-ea"/>
+              </a:rPr>
+              <a:t>vorlesungsfreie </a:t>
+            </a:r>
+            <a:r>
+              <a:rPr lang="de-DE" sz="1200" dirty="0">
+                <a:solidFill>
+                  <a:srgbClr val="000000"/>
+                </a:solidFill>
+                <a:latin typeface="Arial" pitchFamily="34" charset="0"/>
+                <a:ea typeface="+mn-ea"/>
+              </a:rPr>
+              <a:t>Zeit]</a:t>
             </a:r>
           </a:p>
           <a:p>

</xml_diff>

<commit_message>
- Some notes on exercise sheets - Override hint in Eclipse
</commit_message>
<xml_diff>
--- a/Vorlesung/0 Organisatorisches.pptx
+++ b/Vorlesung/0 Organisatorisches.pptx
@@ -6,10 +6,10 @@
     <p:sldMasterId id="2147483988" r:id="rId2"/>
   </p:sldMasterIdLst>
   <p:notesMasterIdLst>
-    <p:notesMasterId r:id="rId13"/>
+    <p:notesMasterId r:id="rId14"/>
   </p:notesMasterIdLst>
   <p:handoutMasterIdLst>
-    <p:handoutMasterId r:id="rId14"/>
+    <p:handoutMasterId r:id="rId15"/>
   </p:handoutMasterIdLst>
   <p:sldIdLst>
     <p:sldId id="277" r:id="rId3"/>
@@ -17,11 +17,12 @@
     <p:sldId id="265" r:id="rId5"/>
     <p:sldId id="259" r:id="rId6"/>
     <p:sldId id="267" r:id="rId7"/>
-    <p:sldId id="275" r:id="rId8"/>
-    <p:sldId id="268" r:id="rId9"/>
-    <p:sldId id="274" r:id="rId10"/>
-    <p:sldId id="271" r:id="rId11"/>
-    <p:sldId id="272" r:id="rId12"/>
+    <p:sldId id="278" r:id="rId8"/>
+    <p:sldId id="275" r:id="rId9"/>
+    <p:sldId id="268" r:id="rId10"/>
+    <p:sldId id="274" r:id="rId11"/>
+    <p:sldId id="271" r:id="rId12"/>
+    <p:sldId id="272" r:id="rId13"/>
   </p:sldIdLst>
   <p:sldSz cx="9144000" cy="6858000" type="screen4x3"/>
   <p:notesSz cx="7099300" cy="10234613"/>
@@ -223,6 +224,875 @@
 </p:presentation>
 </file>
 
+<file path=ppt/charts/chart1.xml><?xml version="1.0" encoding="utf-8"?>
+<c:chartSpace xmlns:c="http://schemas.openxmlformats.org/drawingml/2006/chart" xmlns:a="http://schemas.openxmlformats.org/drawingml/2006/main" xmlns:r="http://schemas.openxmlformats.org/officeDocument/2006/relationships">
+  <c:date1904 val="0"/>
+  <c:lang val="de-DE"/>
+  <c:roundedCorners val="0"/>
+  <mc:AlternateContent xmlns:mc="http://schemas.openxmlformats.org/markup-compatibility/2006">
+    <mc:Choice xmlns:c14="http://schemas.microsoft.com/office/drawing/2007/8/2/chart" Requires="c14">
+      <c14:style val="102"/>
+    </mc:Choice>
+    <mc:Fallback>
+      <c:style val="2"/>
+    </mc:Fallback>
+  </mc:AlternateContent>
+  <c:chart>
+    <c:title>
+      <c:tx>
+        <c:rich>
+          <a:bodyPr rot="0" spcFirstLastPara="1" vertOverflow="ellipsis" vert="horz" wrap="square" anchor="ctr" anchorCtr="1"/>
+          <a:lstStyle/>
+          <a:p>
+            <a:pPr>
+              <a:defRPr sz="1862" b="0" i="0" u="none" strike="noStrike" kern="1200" spc="0" baseline="0">
+                <a:solidFill>
+                  <a:schemeClr val="tx1">
+                    <a:lumMod val="65000"/>
+                    <a:lumOff val="35000"/>
+                  </a:schemeClr>
+                </a:solidFill>
+                <a:latin typeface="+mn-lt"/>
+                <a:ea typeface="+mn-ea"/>
+                <a:cs typeface="+mn-cs"/>
+              </a:defRPr>
+            </a:pPr>
+            <a:r>
+              <a:rPr lang="en-US" b="1" dirty="0" err="1" smtClean="0">
+                <a:solidFill>
+                  <a:srgbClr val="005AA9"/>
+                </a:solidFill>
+              </a:rPr>
+              <a:t>Länge</a:t>
+            </a:r>
+            <a:r>
+              <a:rPr lang="en-US" b="1" dirty="0" smtClean="0">
+                <a:solidFill>
+                  <a:srgbClr val="005AA9"/>
+                </a:solidFill>
+              </a:rPr>
+              <a:t> der </a:t>
+            </a:r>
+            <a:r>
+              <a:rPr lang="en-US" b="1" dirty="0" err="1" smtClean="0">
+                <a:solidFill>
+                  <a:srgbClr val="005AA9"/>
+                </a:solidFill>
+              </a:rPr>
+              <a:t>Übungsblätter</a:t>
+            </a:r>
+            <a:r>
+              <a:rPr lang="en-US" b="1" dirty="0" smtClean="0">
+                <a:solidFill>
+                  <a:srgbClr val="005AA9"/>
+                </a:solidFill>
+              </a:rPr>
+              <a:t> </a:t>
+            </a:r>
+            <a:r>
+              <a:rPr lang="en-US" b="1" dirty="0" err="1" smtClean="0">
+                <a:solidFill>
+                  <a:srgbClr val="005AA9"/>
+                </a:solidFill>
+              </a:rPr>
+              <a:t>nach</a:t>
+            </a:r>
+            <a:r>
+              <a:rPr lang="en-US" b="1" dirty="0" smtClean="0">
+                <a:solidFill>
+                  <a:srgbClr val="005AA9"/>
+                </a:solidFill>
+              </a:rPr>
+              <a:t> Tag</a:t>
+            </a:r>
+            <a:endParaRPr lang="en-US" b="1" dirty="0">
+              <a:solidFill>
+                <a:srgbClr val="005AA9"/>
+              </a:solidFill>
+            </a:endParaRPr>
+          </a:p>
+        </c:rich>
+      </c:tx>
+      <c:layout/>
+      <c:overlay val="0"/>
+      <c:spPr>
+        <a:noFill/>
+        <a:ln>
+          <a:noFill/>
+        </a:ln>
+        <a:effectLst/>
+      </c:spPr>
+      <c:txPr>
+        <a:bodyPr rot="0" spcFirstLastPara="1" vertOverflow="ellipsis" vert="horz" wrap="square" anchor="ctr" anchorCtr="1"/>
+        <a:lstStyle/>
+        <a:p>
+          <a:pPr>
+            <a:defRPr sz="1862" b="0" i="0" u="none" strike="noStrike" kern="1200" spc="0" baseline="0">
+              <a:solidFill>
+                <a:schemeClr val="tx1">
+                  <a:lumMod val="65000"/>
+                  <a:lumOff val="35000"/>
+                </a:schemeClr>
+              </a:solidFill>
+              <a:latin typeface="+mn-lt"/>
+              <a:ea typeface="+mn-ea"/>
+              <a:cs typeface="+mn-cs"/>
+            </a:defRPr>
+          </a:pPr>
+          <a:endParaRPr lang="en-US"/>
+        </a:p>
+      </c:txPr>
+    </c:title>
+    <c:autoTitleDeleted val="0"/>
+    <c:plotArea>
+      <c:layout/>
+      <c:barChart>
+        <c:barDir val="col"/>
+        <c:grouping val="clustered"/>
+        <c:varyColors val="0"/>
+        <c:ser>
+          <c:idx val="0"/>
+          <c:order val="0"/>
+          <c:tx>
+            <c:strRef>
+              <c:f>Tabelle1!$B$1</c:f>
+              <c:strCache>
+                <c:ptCount val="1"/>
+                <c:pt idx="0">
+                  <c:v>Tag 1</c:v>
+                </c:pt>
+              </c:strCache>
+            </c:strRef>
+          </c:tx>
+          <c:spPr>
+            <a:solidFill>
+              <a:srgbClr val="005AA9"/>
+            </a:solidFill>
+            <a:ln>
+              <a:noFill/>
+            </a:ln>
+            <a:effectLst/>
+          </c:spPr>
+          <c:invertIfNegative val="0"/>
+          <c:cat>
+            <c:strRef>
+              <c:f>Tabelle1!$A$2:$A$6</c:f>
+              <c:strCache>
+                <c:ptCount val="5"/>
+                <c:pt idx="0">
+                  <c:v>Tag 1</c:v>
+                </c:pt>
+                <c:pt idx="1">
+                  <c:v>Tag 2</c:v>
+                </c:pt>
+                <c:pt idx="2">
+                  <c:v>Tag 3</c:v>
+                </c:pt>
+                <c:pt idx="3">
+                  <c:v>Tag 4</c:v>
+                </c:pt>
+                <c:pt idx="4">
+                  <c:v>Tag 5</c:v>
+                </c:pt>
+              </c:strCache>
+            </c:strRef>
+          </c:cat>
+          <c:val>
+            <c:numRef>
+              <c:f>Tabelle1!$B$2:$B$6</c:f>
+              <c:numCache>
+                <c:formatCode>General</c:formatCode>
+                <c:ptCount val="5"/>
+                <c:pt idx="0">
+                  <c:v>15</c:v>
+                </c:pt>
+                <c:pt idx="1">
+                  <c:v>14</c:v>
+                </c:pt>
+                <c:pt idx="2">
+                  <c:v>3</c:v>
+                </c:pt>
+                <c:pt idx="3">
+                  <c:v>17</c:v>
+                </c:pt>
+                <c:pt idx="4">
+                  <c:v>6</c:v>
+                </c:pt>
+              </c:numCache>
+            </c:numRef>
+          </c:val>
+        </c:ser>
+        <c:dLbls>
+          <c:showLegendKey val="0"/>
+          <c:showVal val="0"/>
+          <c:showCatName val="0"/>
+          <c:showSerName val="0"/>
+          <c:showPercent val="0"/>
+          <c:showBubbleSize val="0"/>
+        </c:dLbls>
+        <c:gapWidth val="219"/>
+        <c:overlap val="-27"/>
+        <c:axId val="1567337680"/>
+        <c:axId val="1567331152"/>
+      </c:barChart>
+      <c:catAx>
+        <c:axId val="1567337680"/>
+        <c:scaling>
+          <c:orientation val="minMax"/>
+        </c:scaling>
+        <c:delete val="0"/>
+        <c:axPos val="b"/>
+        <c:numFmt formatCode="General" sourceLinked="1"/>
+        <c:majorTickMark val="out"/>
+        <c:minorTickMark val="none"/>
+        <c:tickLblPos val="nextTo"/>
+        <c:spPr>
+          <a:noFill/>
+          <a:ln w="9525" cap="flat" cmpd="sng" algn="ctr">
+            <a:solidFill>
+              <a:schemeClr val="tx1">
+                <a:lumMod val="15000"/>
+                <a:lumOff val="85000"/>
+              </a:schemeClr>
+            </a:solidFill>
+            <a:round/>
+          </a:ln>
+          <a:effectLst/>
+        </c:spPr>
+        <c:txPr>
+          <a:bodyPr rot="-60000000" spcFirstLastPara="1" vertOverflow="ellipsis" vert="horz" wrap="square" anchor="ctr" anchorCtr="1"/>
+          <a:lstStyle/>
+          <a:p>
+            <a:pPr>
+              <a:defRPr sz="1197" b="0" i="0" u="none" strike="noStrike" kern="1200" baseline="0">
+                <a:solidFill>
+                  <a:schemeClr val="tx1">
+                    <a:lumMod val="65000"/>
+                    <a:lumOff val="35000"/>
+                  </a:schemeClr>
+                </a:solidFill>
+                <a:latin typeface="+mn-lt"/>
+                <a:ea typeface="+mn-ea"/>
+                <a:cs typeface="+mn-cs"/>
+              </a:defRPr>
+            </a:pPr>
+            <a:endParaRPr lang="en-US"/>
+          </a:p>
+        </c:txPr>
+        <c:crossAx val="1567331152"/>
+        <c:crosses val="autoZero"/>
+        <c:auto val="1"/>
+        <c:lblAlgn val="ctr"/>
+        <c:lblOffset val="100"/>
+        <c:noMultiLvlLbl val="0"/>
+      </c:catAx>
+      <c:valAx>
+        <c:axId val="1567331152"/>
+        <c:scaling>
+          <c:orientation val="minMax"/>
+        </c:scaling>
+        <c:delete val="1"/>
+        <c:axPos val="l"/>
+        <c:majorGridlines>
+          <c:spPr>
+            <a:ln w="9525" cap="flat" cmpd="sng" algn="ctr">
+              <a:solidFill>
+                <a:schemeClr val="tx1">
+                  <a:lumMod val="15000"/>
+                  <a:lumOff val="85000"/>
+                </a:schemeClr>
+              </a:solidFill>
+              <a:round/>
+            </a:ln>
+            <a:effectLst/>
+          </c:spPr>
+        </c:majorGridlines>
+        <c:numFmt formatCode="General" sourceLinked="1"/>
+        <c:majorTickMark val="out"/>
+        <c:minorTickMark val="none"/>
+        <c:tickLblPos val="nextTo"/>
+        <c:crossAx val="1567337680"/>
+        <c:crosses val="autoZero"/>
+        <c:crossBetween val="between"/>
+      </c:valAx>
+      <c:spPr>
+        <a:noFill/>
+        <a:ln>
+          <a:noFill/>
+        </a:ln>
+        <a:effectLst/>
+      </c:spPr>
+    </c:plotArea>
+    <c:plotVisOnly val="1"/>
+    <c:dispBlanksAs val="gap"/>
+    <c:showDLblsOverMax val="0"/>
+  </c:chart>
+  <c:spPr>
+    <a:noFill/>
+    <a:ln>
+      <a:noFill/>
+    </a:ln>
+    <a:effectLst/>
+  </c:spPr>
+  <c:txPr>
+    <a:bodyPr/>
+    <a:lstStyle/>
+    <a:p>
+      <a:pPr>
+        <a:defRPr/>
+      </a:pPr>
+      <a:endParaRPr lang="en-US"/>
+    </a:p>
+  </c:txPr>
+  <c:externalData r:id="rId3">
+    <c:autoUpdate val="0"/>
+  </c:externalData>
+</c:chartSpace>
+</file>
+
+<file path=ppt/charts/colors1.xml><?xml version="1.0" encoding="utf-8"?>
+<cs:colorStyle xmlns:cs="http://schemas.microsoft.com/office/drawing/2012/chartStyle" xmlns:a="http://schemas.openxmlformats.org/drawingml/2006/main" meth="cycle" id="10">
+  <a:schemeClr val="accent1"/>
+  <a:schemeClr val="accent2"/>
+  <a:schemeClr val="accent3"/>
+  <a:schemeClr val="accent4"/>
+  <a:schemeClr val="accent5"/>
+  <a:schemeClr val="accent6"/>
+  <cs:variation/>
+  <cs:variation>
+    <a:lumMod val="60000"/>
+  </cs:variation>
+  <cs:variation>
+    <a:lumMod val="80000"/>
+    <a:lumOff val="20000"/>
+  </cs:variation>
+  <cs:variation>
+    <a:lumMod val="80000"/>
+  </cs:variation>
+  <cs:variation>
+    <a:lumMod val="60000"/>
+    <a:lumOff val="40000"/>
+  </cs:variation>
+  <cs:variation>
+    <a:lumMod val="50000"/>
+  </cs:variation>
+  <cs:variation>
+    <a:lumMod val="70000"/>
+    <a:lumOff val="30000"/>
+  </cs:variation>
+  <cs:variation>
+    <a:lumMod val="70000"/>
+  </cs:variation>
+  <cs:variation>
+    <a:lumMod val="50000"/>
+    <a:lumOff val="50000"/>
+  </cs:variation>
+</cs:colorStyle>
+</file>
+
+<file path=ppt/charts/style1.xml><?xml version="1.0" encoding="utf-8"?>
+<cs:chartStyle xmlns:cs="http://schemas.microsoft.com/office/drawing/2012/chartStyle" xmlns:a="http://schemas.openxmlformats.org/drawingml/2006/main" id="201">
+  <cs:axisTitle>
+    <cs:lnRef idx="0"/>
+    <cs:fillRef idx="0"/>
+    <cs:effectRef idx="0"/>
+    <cs:fontRef idx="minor">
+      <a:schemeClr val="tx1">
+        <a:lumMod val="65000"/>
+        <a:lumOff val="35000"/>
+      </a:schemeClr>
+    </cs:fontRef>
+    <cs:defRPr sz="1330" kern="1200"/>
+  </cs:axisTitle>
+  <cs:categoryAxis>
+    <cs:lnRef idx="0"/>
+    <cs:fillRef idx="0"/>
+    <cs:effectRef idx="0"/>
+    <cs:fontRef idx="minor">
+      <a:schemeClr val="tx1">
+        <a:lumMod val="65000"/>
+        <a:lumOff val="35000"/>
+      </a:schemeClr>
+    </cs:fontRef>
+    <cs:spPr>
+      <a:ln w="9525" cap="flat" cmpd="sng" algn="ctr">
+        <a:solidFill>
+          <a:schemeClr val="tx1">
+            <a:lumMod val="15000"/>
+            <a:lumOff val="85000"/>
+          </a:schemeClr>
+        </a:solidFill>
+        <a:round/>
+      </a:ln>
+    </cs:spPr>
+    <cs:defRPr sz="1197" kern="1200"/>
+  </cs:categoryAxis>
+  <cs:chartArea mods="allowNoFillOverride allowNoLineOverride">
+    <cs:lnRef idx="0"/>
+    <cs:fillRef idx="0"/>
+    <cs:effectRef idx="0"/>
+    <cs:fontRef idx="minor">
+      <a:schemeClr val="tx1"/>
+    </cs:fontRef>
+    <cs:spPr>
+      <a:solidFill>
+        <a:schemeClr val="bg1"/>
+      </a:solidFill>
+      <a:ln w="9525" cap="flat" cmpd="sng" algn="ctr">
+        <a:solidFill>
+          <a:schemeClr val="tx1">
+            <a:lumMod val="15000"/>
+            <a:lumOff val="85000"/>
+          </a:schemeClr>
+        </a:solidFill>
+        <a:round/>
+      </a:ln>
+    </cs:spPr>
+    <cs:defRPr sz="1330" kern="1200"/>
+  </cs:chartArea>
+  <cs:dataLabel>
+    <cs:lnRef idx="0"/>
+    <cs:fillRef idx="0"/>
+    <cs:effectRef idx="0"/>
+    <cs:fontRef idx="minor">
+      <a:schemeClr val="tx1">
+        <a:lumMod val="75000"/>
+        <a:lumOff val="25000"/>
+      </a:schemeClr>
+    </cs:fontRef>
+    <cs:defRPr sz="1197" kern="1200"/>
+  </cs:dataLabel>
+  <cs:dataLabelCallout>
+    <cs:lnRef idx="0"/>
+    <cs:fillRef idx="0"/>
+    <cs:effectRef idx="0"/>
+    <cs:fontRef idx="minor">
+      <a:schemeClr val="dk1">
+        <a:lumMod val="65000"/>
+        <a:lumOff val="35000"/>
+      </a:schemeClr>
+    </cs:fontRef>
+    <cs:spPr>
+      <a:solidFill>
+        <a:schemeClr val="lt1"/>
+      </a:solidFill>
+      <a:ln>
+        <a:solidFill>
+          <a:schemeClr val="dk1">
+            <a:lumMod val="25000"/>
+            <a:lumOff val="75000"/>
+          </a:schemeClr>
+        </a:solidFill>
+      </a:ln>
+    </cs:spPr>
+    <cs:defRPr sz="1197" kern="1200"/>
+    <cs:bodyPr rot="0" spcFirstLastPara="1" vertOverflow="clip" horzOverflow="clip" vert="horz" wrap="square" lIns="36576" tIns="18288" rIns="36576" bIns="18288" anchor="ctr" anchorCtr="1">
+      <a:spAutoFit/>
+    </cs:bodyPr>
+  </cs:dataLabelCallout>
+  <cs:dataPoint>
+    <cs:lnRef idx="0"/>
+    <cs:fillRef idx="1">
+      <cs:styleClr val="auto"/>
+    </cs:fillRef>
+    <cs:effectRef idx="0"/>
+    <cs:fontRef idx="minor">
+      <a:schemeClr val="tx1"/>
+    </cs:fontRef>
+  </cs:dataPoint>
+  <cs:dataPoint3D>
+    <cs:lnRef idx="0"/>
+    <cs:fillRef idx="1">
+      <cs:styleClr val="auto"/>
+    </cs:fillRef>
+    <cs:effectRef idx="0"/>
+    <cs:fontRef idx="minor">
+      <a:schemeClr val="tx1"/>
+    </cs:fontRef>
+  </cs:dataPoint3D>
+  <cs:dataPointLine>
+    <cs:lnRef idx="0">
+      <cs:styleClr val="auto"/>
+    </cs:lnRef>
+    <cs:fillRef idx="1"/>
+    <cs:effectRef idx="0"/>
+    <cs:fontRef idx="minor">
+      <a:schemeClr val="tx1"/>
+    </cs:fontRef>
+    <cs:spPr>
+      <a:ln w="28575" cap="rnd">
+        <a:solidFill>
+          <a:schemeClr val="phClr"/>
+        </a:solidFill>
+        <a:round/>
+      </a:ln>
+    </cs:spPr>
+  </cs:dataPointLine>
+  <cs:dataPointMarker>
+    <cs:lnRef idx="0">
+      <cs:styleClr val="auto"/>
+    </cs:lnRef>
+    <cs:fillRef idx="1">
+      <cs:styleClr val="auto"/>
+    </cs:fillRef>
+    <cs:effectRef idx="0"/>
+    <cs:fontRef idx="minor">
+      <a:schemeClr val="tx1"/>
+    </cs:fontRef>
+    <cs:spPr>
+      <a:ln w="9525">
+        <a:solidFill>
+          <a:schemeClr val="phClr"/>
+        </a:solidFill>
+      </a:ln>
+    </cs:spPr>
+  </cs:dataPointMarker>
+  <cs:dataPointMarkerLayout symbol="circle" size="5"/>
+  <cs:dataPointWireframe>
+    <cs:lnRef idx="0">
+      <cs:styleClr val="auto"/>
+    </cs:lnRef>
+    <cs:fillRef idx="1"/>
+    <cs:effectRef idx="0"/>
+    <cs:fontRef idx="minor">
+      <a:schemeClr val="tx1"/>
+    </cs:fontRef>
+    <cs:spPr>
+      <a:ln w="9525" cap="rnd">
+        <a:solidFill>
+          <a:schemeClr val="phClr"/>
+        </a:solidFill>
+        <a:round/>
+      </a:ln>
+    </cs:spPr>
+  </cs:dataPointWireframe>
+  <cs:dataTable>
+    <cs:lnRef idx="0"/>
+    <cs:fillRef idx="0"/>
+    <cs:effectRef idx="0"/>
+    <cs:fontRef idx="minor">
+      <a:schemeClr val="tx1">
+        <a:lumMod val="65000"/>
+        <a:lumOff val="35000"/>
+      </a:schemeClr>
+    </cs:fontRef>
+    <cs:spPr>
+      <a:noFill/>
+      <a:ln w="9525" cap="flat" cmpd="sng" algn="ctr">
+        <a:solidFill>
+          <a:schemeClr val="tx1">
+            <a:lumMod val="15000"/>
+            <a:lumOff val="85000"/>
+          </a:schemeClr>
+        </a:solidFill>
+        <a:round/>
+      </a:ln>
+    </cs:spPr>
+    <cs:defRPr sz="1197" kern="1200"/>
+  </cs:dataTable>
+  <cs:downBar>
+    <cs:lnRef idx="0"/>
+    <cs:fillRef idx="0"/>
+    <cs:effectRef idx="0"/>
+    <cs:fontRef idx="minor">
+      <a:schemeClr val="dk1"/>
+    </cs:fontRef>
+    <cs:spPr>
+      <a:solidFill>
+        <a:schemeClr val="dk1">
+          <a:lumMod val="65000"/>
+          <a:lumOff val="35000"/>
+        </a:schemeClr>
+      </a:solidFill>
+      <a:ln w="9525">
+        <a:solidFill>
+          <a:schemeClr val="tx1">
+            <a:lumMod val="65000"/>
+            <a:lumOff val="35000"/>
+          </a:schemeClr>
+        </a:solidFill>
+      </a:ln>
+    </cs:spPr>
+  </cs:downBar>
+  <cs:dropLine>
+    <cs:lnRef idx="0"/>
+    <cs:fillRef idx="0"/>
+    <cs:effectRef idx="0"/>
+    <cs:fontRef idx="minor">
+      <a:schemeClr val="tx1"/>
+    </cs:fontRef>
+    <cs:spPr>
+      <a:ln w="9525" cap="flat" cmpd="sng" algn="ctr">
+        <a:solidFill>
+          <a:schemeClr val="tx1">
+            <a:lumMod val="35000"/>
+            <a:lumOff val="65000"/>
+          </a:schemeClr>
+        </a:solidFill>
+        <a:round/>
+      </a:ln>
+    </cs:spPr>
+  </cs:dropLine>
+  <cs:errorBar>
+    <cs:lnRef idx="0"/>
+    <cs:fillRef idx="0"/>
+    <cs:effectRef idx="0"/>
+    <cs:fontRef idx="minor">
+      <a:schemeClr val="tx1"/>
+    </cs:fontRef>
+    <cs:spPr>
+      <a:ln w="9525" cap="flat" cmpd="sng" algn="ctr">
+        <a:solidFill>
+          <a:schemeClr val="tx1">
+            <a:lumMod val="65000"/>
+            <a:lumOff val="35000"/>
+          </a:schemeClr>
+        </a:solidFill>
+        <a:round/>
+      </a:ln>
+    </cs:spPr>
+  </cs:errorBar>
+  <cs:floor>
+    <cs:lnRef idx="0"/>
+    <cs:fillRef idx="0"/>
+    <cs:effectRef idx="0"/>
+    <cs:fontRef idx="minor">
+      <a:schemeClr val="tx1"/>
+    </cs:fontRef>
+    <cs:spPr>
+      <a:noFill/>
+      <a:ln>
+        <a:noFill/>
+      </a:ln>
+    </cs:spPr>
+  </cs:floor>
+  <cs:gridlineMajor>
+    <cs:lnRef idx="0"/>
+    <cs:fillRef idx="0"/>
+    <cs:effectRef idx="0"/>
+    <cs:fontRef idx="minor">
+      <a:schemeClr val="tx1"/>
+    </cs:fontRef>
+    <cs:spPr>
+      <a:ln w="9525" cap="flat" cmpd="sng" algn="ctr">
+        <a:solidFill>
+          <a:schemeClr val="tx1">
+            <a:lumMod val="15000"/>
+            <a:lumOff val="85000"/>
+          </a:schemeClr>
+        </a:solidFill>
+        <a:round/>
+      </a:ln>
+    </cs:spPr>
+  </cs:gridlineMajor>
+  <cs:gridlineMinor>
+    <cs:lnRef idx="0"/>
+    <cs:fillRef idx="0"/>
+    <cs:effectRef idx="0"/>
+    <cs:fontRef idx="minor">
+      <a:schemeClr val="tx1"/>
+    </cs:fontRef>
+    <cs:spPr>
+      <a:ln w="9525" cap="flat" cmpd="sng" algn="ctr">
+        <a:solidFill>
+          <a:schemeClr val="tx1">
+            <a:lumMod val="5000"/>
+            <a:lumOff val="95000"/>
+          </a:schemeClr>
+        </a:solidFill>
+        <a:round/>
+      </a:ln>
+    </cs:spPr>
+  </cs:gridlineMinor>
+  <cs:hiLoLine>
+    <cs:lnRef idx="0"/>
+    <cs:fillRef idx="0"/>
+    <cs:effectRef idx="0"/>
+    <cs:fontRef idx="minor">
+      <a:schemeClr val="tx1"/>
+    </cs:fontRef>
+    <cs:spPr>
+      <a:ln w="9525" cap="flat" cmpd="sng" algn="ctr">
+        <a:solidFill>
+          <a:schemeClr val="tx1">
+            <a:lumMod val="75000"/>
+            <a:lumOff val="25000"/>
+          </a:schemeClr>
+        </a:solidFill>
+        <a:round/>
+      </a:ln>
+    </cs:spPr>
+  </cs:hiLoLine>
+  <cs:leaderLine>
+    <cs:lnRef idx="0"/>
+    <cs:fillRef idx="0"/>
+    <cs:effectRef idx="0"/>
+    <cs:fontRef idx="minor">
+      <a:schemeClr val="tx1"/>
+    </cs:fontRef>
+    <cs:spPr>
+      <a:ln w="9525" cap="flat" cmpd="sng" algn="ctr">
+        <a:solidFill>
+          <a:schemeClr val="tx1">
+            <a:lumMod val="35000"/>
+            <a:lumOff val="65000"/>
+          </a:schemeClr>
+        </a:solidFill>
+        <a:round/>
+      </a:ln>
+    </cs:spPr>
+  </cs:leaderLine>
+  <cs:legend>
+    <cs:lnRef idx="0"/>
+    <cs:fillRef idx="0"/>
+    <cs:effectRef idx="0"/>
+    <cs:fontRef idx="minor">
+      <a:schemeClr val="tx1">
+        <a:lumMod val="65000"/>
+        <a:lumOff val="35000"/>
+      </a:schemeClr>
+    </cs:fontRef>
+    <cs:defRPr sz="1197" kern="1200"/>
+  </cs:legend>
+  <cs:plotArea mods="allowNoFillOverride allowNoLineOverride">
+    <cs:lnRef idx="0"/>
+    <cs:fillRef idx="0"/>
+    <cs:effectRef idx="0"/>
+    <cs:fontRef idx="minor">
+      <a:schemeClr val="tx1"/>
+    </cs:fontRef>
+  </cs:plotArea>
+  <cs:plotArea3D mods="allowNoFillOverride allowNoLineOverride">
+    <cs:lnRef idx="0"/>
+    <cs:fillRef idx="0"/>
+    <cs:effectRef idx="0"/>
+    <cs:fontRef idx="minor">
+      <a:schemeClr val="tx1"/>
+    </cs:fontRef>
+  </cs:plotArea3D>
+  <cs:seriesAxis>
+    <cs:lnRef idx="0"/>
+    <cs:fillRef idx="0"/>
+    <cs:effectRef idx="0"/>
+    <cs:fontRef idx="minor">
+      <a:schemeClr val="tx1">
+        <a:lumMod val="65000"/>
+        <a:lumOff val="35000"/>
+      </a:schemeClr>
+    </cs:fontRef>
+    <cs:defRPr sz="1197" kern="1200"/>
+  </cs:seriesAxis>
+  <cs:seriesLine>
+    <cs:lnRef idx="0"/>
+    <cs:fillRef idx="0"/>
+    <cs:effectRef idx="0"/>
+    <cs:fontRef idx="minor">
+      <a:schemeClr val="tx1"/>
+    </cs:fontRef>
+    <cs:spPr>
+      <a:ln w="9525" cap="flat" cmpd="sng" algn="ctr">
+        <a:solidFill>
+          <a:schemeClr val="tx1">
+            <a:lumMod val="35000"/>
+            <a:lumOff val="65000"/>
+          </a:schemeClr>
+        </a:solidFill>
+        <a:round/>
+      </a:ln>
+    </cs:spPr>
+  </cs:seriesLine>
+  <cs:title>
+    <cs:lnRef idx="0"/>
+    <cs:fillRef idx="0"/>
+    <cs:effectRef idx="0"/>
+    <cs:fontRef idx="minor">
+      <a:schemeClr val="tx1">
+        <a:lumMod val="65000"/>
+        <a:lumOff val="35000"/>
+      </a:schemeClr>
+    </cs:fontRef>
+    <cs:defRPr sz="1862" b="0" kern="1200" spc="0" baseline="0"/>
+  </cs:title>
+  <cs:trendline>
+    <cs:lnRef idx="0">
+      <cs:styleClr val="auto"/>
+    </cs:lnRef>
+    <cs:fillRef idx="0"/>
+    <cs:effectRef idx="0"/>
+    <cs:fontRef idx="minor">
+      <a:schemeClr val="tx1"/>
+    </cs:fontRef>
+    <cs:spPr>
+      <a:ln w="19050" cap="rnd">
+        <a:solidFill>
+          <a:schemeClr val="phClr"/>
+        </a:solidFill>
+        <a:prstDash val="sysDot"/>
+      </a:ln>
+    </cs:spPr>
+  </cs:trendline>
+  <cs:trendlineLabel>
+    <cs:lnRef idx="0"/>
+    <cs:fillRef idx="0"/>
+    <cs:effectRef idx="0"/>
+    <cs:fontRef idx="minor">
+      <a:schemeClr val="tx1">
+        <a:lumMod val="65000"/>
+        <a:lumOff val="35000"/>
+      </a:schemeClr>
+    </cs:fontRef>
+    <cs:defRPr sz="1197" kern="1200"/>
+  </cs:trendlineLabel>
+  <cs:upBar>
+    <cs:lnRef idx="0"/>
+    <cs:fillRef idx="0"/>
+    <cs:effectRef idx="0"/>
+    <cs:fontRef idx="minor">
+      <a:schemeClr val="dk1"/>
+    </cs:fontRef>
+    <cs:spPr>
+      <a:solidFill>
+        <a:schemeClr val="lt1"/>
+      </a:solidFill>
+      <a:ln w="9525">
+        <a:solidFill>
+          <a:schemeClr val="tx1">
+            <a:lumMod val="15000"/>
+            <a:lumOff val="85000"/>
+          </a:schemeClr>
+        </a:solidFill>
+      </a:ln>
+    </cs:spPr>
+  </cs:upBar>
+  <cs:valueAxis>
+    <cs:lnRef idx="0"/>
+    <cs:fillRef idx="0"/>
+    <cs:effectRef idx="0"/>
+    <cs:fontRef idx="minor">
+      <a:schemeClr val="tx1">
+        <a:lumMod val="65000"/>
+        <a:lumOff val="35000"/>
+      </a:schemeClr>
+    </cs:fontRef>
+    <cs:defRPr sz="1197" kern="1200"/>
+  </cs:valueAxis>
+  <cs:wall>
+    <cs:lnRef idx="0"/>
+    <cs:fillRef idx="0"/>
+    <cs:effectRef idx="0"/>
+    <cs:fontRef idx="minor">
+      <a:schemeClr val="tx1"/>
+    </cs:fontRef>
+    <cs:spPr>
+      <a:noFill/>
+      <a:ln>
+        <a:noFill/>
+      </a:ln>
+    </cs:spPr>
+  </cs:wall>
+</cs:chartStyle>
+</file>
+
 <file path=ppt/handoutMasters/handoutMaster1.xml><?xml version="1.0" encoding="utf-8"?>
 <p:handoutMaster xmlns:a="http://schemas.openxmlformats.org/drawingml/2006/main" xmlns:r="http://schemas.openxmlformats.org/officeDocument/2006/relationships" xmlns:p="http://schemas.openxmlformats.org/presentationml/2006/main">
   <p:cSld>
@@ -5228,7 +6098,15 @@
             </a:pPr>
             <a:r>
               <a:rPr lang="de-DE" baseline="0" dirty="0" smtClean="0"/>
-              <a:t>manche Programme lassen sich tatsächlich mit C-Compiler übersetzen</a:t>
+              <a:t>manche Programme lassen sich tatsächlich mit C-Compiler </a:t>
+            </a:r>
+            <a:r>
+              <a:rPr lang="de-DE" baseline="0" dirty="0" smtClean="0"/>
+              <a:t>übersetzen </a:t>
+            </a:r>
+            <a:r>
+              <a:rPr lang="de-DE" baseline="0" smtClean="0"/>
+              <a:t>(Traditional Mode)</a:t>
             </a:r>
             <a:endParaRPr lang="de-DE" dirty="0" smtClean="0"/>
           </a:p>
@@ -5697,7 +6575,7 @@
               <a:pPr>
                 <a:defRPr/>
               </a:pPr>
-              <a:t>8</a:t>
+              <a:t>9</a:t>
             </a:fld>
             <a:endParaRPr lang="en-US"/>
           </a:p>
@@ -10756,7 +11634,7 @@
           <a:graphicData uri="http://schemas.openxmlformats.org/presentationml/2006/ole">
             <mc:AlternateContent xmlns:mc="http://schemas.openxmlformats.org/markup-compatibility/2006">
               <mc:Choice xmlns:v="urn:schemas-microsoft-com:vml" Requires="v">
-                <p:oleObj spid="_x0000_s27761" r:id="rId3" imgW="1038370" imgH="980952" progId="PBrush">
+                <p:oleObj spid="_x0000_s27780" r:id="rId3" imgW="1038370" imgH="980952" progId="PBrush">
                   <p:embed/>
                 </p:oleObj>
               </mc:Choice>
@@ -13750,7 +14628,7 @@
           <a:graphicData uri="http://schemas.openxmlformats.org/presentationml/2006/ole">
             <mc:AlternateContent xmlns:mc="http://schemas.openxmlformats.org/markup-compatibility/2006">
               <mc:Choice xmlns:v="urn:schemas-microsoft-com:vml" Requires="v">
-                <p:oleObj spid="_x0000_s1148" r:id="rId16" imgW="1038370" imgH="980952" progId="">
+                <p:oleObj spid="_x0000_s1167" r:id="rId16" imgW="1038370" imgH="980952" progId="">
                   <p:embed/>
                 </p:oleObj>
               </mc:Choice>
@@ -14188,7 +15066,7 @@
                 </a:lnSpc>
                 <a:defRPr/>
               </a:pPr>
-              <a:t>08.09.2014</a:t>
+              <a:t>18.09.2014</a:t>
             </a:fld>
             <a:r>
               <a:rPr lang="en-GB" altLang="de-DE" sz="1000" smtClean="0">
@@ -15696,7 +16574,7 @@
           <a:graphicData uri="http://schemas.openxmlformats.org/presentationml/2006/ole">
             <mc:AlternateContent xmlns:mc="http://schemas.openxmlformats.org/markup-compatibility/2006">
               <mc:Choice xmlns:v="urn:schemas-microsoft-com:vml" Requires="v">
-                <p:oleObj spid="_x0000_s2171" r:id="rId6" imgW="1038370" imgH="980952" progId="PBrush">
+                <p:oleObj spid="_x0000_s2190" r:id="rId6" imgW="1038370" imgH="980952" progId="PBrush">
                   <p:embed/>
                 </p:oleObj>
               </mc:Choice>
@@ -16676,6 +17554,807 @@
           <a:chExt cx="0" cy="0"/>
         </a:xfrm>
       </p:grpSpPr>
+      <p:pic>
+        <p:nvPicPr>
+          <p:cNvPr id="14338" name="Picture 8"/>
+          <p:cNvPicPr>
+            <a:picLocks noChangeAspect="1" noChangeArrowheads="1"/>
+          </p:cNvPicPr>
+          <p:nvPr/>
+        </p:nvPicPr>
+        <p:blipFill>
+          <a:blip r:embed="rId2">
+            <a:extLst>
+              <a:ext uri="{28A0092B-C50C-407E-A947-70E740481C1C}">
+                <a14:useLocalDpi xmlns:a14="http://schemas.microsoft.com/office/drawing/2010/main" val="0"/>
+              </a:ext>
+            </a:extLst>
+          </a:blip>
+          <a:srcRect/>
+          <a:stretch>
+            <a:fillRect/>
+          </a:stretch>
+        </p:blipFill>
+        <p:spPr bwMode="auto">
+          <a:xfrm>
+            <a:off x="225425" y="1557338"/>
+            <a:ext cx="7524750" cy="4624387"/>
+          </a:xfrm>
+          <a:prstGeom prst="rect">
+            <a:avLst/>
+          </a:prstGeom>
+          <a:noFill/>
+          <a:ln>
+            <a:noFill/>
+          </a:ln>
+          <a:extLst>
+            <a:ext uri="{909E8E84-426E-40DD-AFC4-6F175D3DCCD1}">
+              <a14:hiddenFill xmlns:a14="http://schemas.microsoft.com/office/drawing/2010/main">
+                <a:solidFill>
+                  <a:schemeClr val="accent1"/>
+                </a:solidFill>
+              </a14:hiddenFill>
+            </a:ext>
+            <a:ext uri="{91240B29-F687-4F45-9708-019B960494DF}">
+              <a14:hiddenLine xmlns:a14="http://schemas.microsoft.com/office/drawing/2010/main" w="9525" algn="ctr">
+                <a:solidFill>
+                  <a:schemeClr val="tx1"/>
+                </a:solidFill>
+                <a:miter lim="800000"/>
+                <a:headEnd/>
+                <a:tailEnd/>
+              </a14:hiddenLine>
+            </a:ext>
+          </a:extLst>
+        </p:spPr>
+      </p:pic>
+      <p:sp>
+        <p:nvSpPr>
+          <p:cNvPr id="14339" name="Titel 1"/>
+          <p:cNvSpPr>
+            <a:spLocks noGrp="1"/>
+          </p:cNvSpPr>
+          <p:nvPr>
+            <p:ph type="title"/>
+          </p:nvPr>
+        </p:nvSpPr>
+        <p:spPr/>
+        <p:txBody>
+          <a:bodyPr/>
+          <a:lstStyle/>
+          <a:p>
+            <a:r>
+              <a:rPr lang="de-DE" altLang="de-DE" smtClean="0">
+                <a:ea typeface="ＭＳ Ｐゴシック" pitchFamily="34" charset="-128"/>
+              </a:rPr>
+              <a:t>Wie wichtig sind C/C++?</a:t>
+            </a:r>
+          </a:p>
+        </p:txBody>
+      </p:sp>
+      <p:sp>
+        <p:nvSpPr>
+          <p:cNvPr id="14340" name="Rectangle 45"/>
+          <p:cNvSpPr>
+            <a:spLocks noChangeArrowheads="1"/>
+          </p:cNvSpPr>
+          <p:nvPr/>
+        </p:nvSpPr>
+        <p:spPr bwMode="auto">
+          <a:xfrm>
+            <a:off x="2001838" y="1419225"/>
+            <a:ext cx="9144000" cy="0"/>
+          </a:xfrm>
+          <a:prstGeom prst="rect">
+            <a:avLst/>
+          </a:prstGeom>
+          <a:noFill/>
+          <a:ln>
+            <a:noFill/>
+          </a:ln>
+          <a:effectLst/>
+          <a:extLst>
+            <a:ext uri="{909E8E84-426E-40DD-AFC4-6F175D3DCCD1}">
+              <a14:hiddenFill xmlns:a14="http://schemas.microsoft.com/office/drawing/2010/main">
+                <a:solidFill>
+                  <a:schemeClr val="accent1"/>
+                </a:solidFill>
+              </a14:hiddenFill>
+            </a:ext>
+            <a:ext uri="{91240B29-F687-4F45-9708-019B960494DF}">
+              <a14:hiddenLine xmlns:a14="http://schemas.microsoft.com/office/drawing/2010/main" w="9525" algn="ctr">
+                <a:solidFill>
+                  <a:schemeClr val="tx1"/>
+                </a:solidFill>
+                <a:miter lim="800000"/>
+                <a:headEnd/>
+                <a:tailEnd/>
+              </a14:hiddenLine>
+            </a:ext>
+            <a:ext uri="{AF507438-7753-43E0-B8FC-AC1667EBCBE1}">
+              <a14:hiddenEffects xmlns:a14="http://schemas.microsoft.com/office/drawing/2010/main">
+                <a:effectLst>
+                  <a:outerShdw dist="35921" dir="2700000" algn="ctr" rotWithShape="0">
+                    <a:schemeClr val="bg2"/>
+                  </a:outerShdw>
+                </a:effectLst>
+              </a14:hiddenEffects>
+            </a:ext>
+          </a:extLst>
+        </p:spPr>
+        <p:txBody>
+          <a:bodyPr wrap="none" anchor="ctr">
+            <a:spAutoFit/>
+          </a:bodyPr>
+          <a:lstStyle>
+            <a:lvl1pPr algn="l" eaLnBrk="0" hangingPunct="0">
+              <a:spcBef>
+                <a:spcPct val="20000"/>
+              </a:spcBef>
+              <a:buFont typeface="Wingdings" pitchFamily="2" charset="2"/>
+              <a:defRPr sz="2000">
+                <a:solidFill>
+                  <a:schemeClr val="tx1"/>
+                </a:solidFill>
+                <a:latin typeface="Arial" charset="0"/>
+                <a:ea typeface="ＭＳ Ｐゴシック" pitchFamily="34" charset="-128"/>
+              </a:defRPr>
+            </a:lvl1pPr>
+            <a:lvl2pPr marL="742950" indent="-285750" algn="l" eaLnBrk="0" hangingPunct="0">
+              <a:spcBef>
+                <a:spcPct val="20000"/>
+              </a:spcBef>
+              <a:buFont typeface="Wingdings" pitchFamily="2" charset="2"/>
+              <a:buChar char="§"/>
+              <a:defRPr>
+                <a:solidFill>
+                  <a:schemeClr val="tx1"/>
+                </a:solidFill>
+                <a:latin typeface="Arial" charset="0"/>
+                <a:ea typeface="ＭＳ Ｐゴシック" pitchFamily="34" charset="-128"/>
+              </a:defRPr>
+            </a:lvl2pPr>
+            <a:lvl3pPr marL="1143000" indent="-228600" algn="l" eaLnBrk="0" hangingPunct="0">
+              <a:spcBef>
+                <a:spcPct val="20000"/>
+              </a:spcBef>
+              <a:buFont typeface="Wingdings" pitchFamily="2" charset="2"/>
+              <a:buChar char="§"/>
+              <a:defRPr>
+                <a:solidFill>
+                  <a:schemeClr val="tx1"/>
+                </a:solidFill>
+                <a:latin typeface="Arial" charset="0"/>
+                <a:ea typeface="ＭＳ Ｐゴシック" pitchFamily="34" charset="-128"/>
+              </a:defRPr>
+            </a:lvl3pPr>
+            <a:lvl4pPr marL="1600200" indent="-228600" algn="l" eaLnBrk="0" hangingPunct="0">
+              <a:spcBef>
+                <a:spcPct val="20000"/>
+              </a:spcBef>
+              <a:buFont typeface="Wingdings" pitchFamily="2" charset="2"/>
+              <a:buChar char="§"/>
+              <a:defRPr sz="1600">
+                <a:solidFill>
+                  <a:schemeClr val="tx1"/>
+                </a:solidFill>
+                <a:latin typeface="Arial" charset="0"/>
+                <a:ea typeface="ＭＳ Ｐゴシック" pitchFamily="34" charset="-128"/>
+              </a:defRPr>
+            </a:lvl4pPr>
+            <a:lvl5pPr marL="2057400" indent="-228600" algn="l" eaLnBrk="0" hangingPunct="0">
+              <a:spcBef>
+                <a:spcPct val="20000"/>
+              </a:spcBef>
+              <a:buFont typeface="Wingdings" pitchFamily="2" charset="2"/>
+              <a:buChar char="§"/>
+              <a:defRPr sz="1600">
+                <a:solidFill>
+                  <a:schemeClr val="tx1"/>
+                </a:solidFill>
+                <a:latin typeface="Arial" charset="0"/>
+                <a:ea typeface="ＭＳ Ｐゴシック" pitchFamily="34" charset="-128"/>
+              </a:defRPr>
+            </a:lvl5pPr>
+            <a:lvl6pPr marL="2514600" indent="-228600" defTabSz="449263" eaLnBrk="0" fontAlgn="base" hangingPunct="0">
+              <a:spcBef>
+                <a:spcPct val="20000"/>
+              </a:spcBef>
+              <a:spcAft>
+                <a:spcPct val="0"/>
+              </a:spcAft>
+              <a:buFont typeface="Wingdings" pitchFamily="2" charset="2"/>
+              <a:buChar char="§"/>
+              <a:defRPr sz="1600">
+                <a:solidFill>
+                  <a:schemeClr val="tx1"/>
+                </a:solidFill>
+                <a:latin typeface="Arial" charset="0"/>
+                <a:ea typeface="ＭＳ Ｐゴシック" pitchFamily="34" charset="-128"/>
+              </a:defRPr>
+            </a:lvl6pPr>
+            <a:lvl7pPr marL="2971800" indent="-228600" defTabSz="449263" eaLnBrk="0" fontAlgn="base" hangingPunct="0">
+              <a:spcBef>
+                <a:spcPct val="20000"/>
+              </a:spcBef>
+              <a:spcAft>
+                <a:spcPct val="0"/>
+              </a:spcAft>
+              <a:buFont typeface="Wingdings" pitchFamily="2" charset="2"/>
+              <a:buChar char="§"/>
+              <a:defRPr sz="1600">
+                <a:solidFill>
+                  <a:schemeClr val="tx1"/>
+                </a:solidFill>
+                <a:latin typeface="Arial" charset="0"/>
+                <a:ea typeface="ＭＳ Ｐゴシック" pitchFamily="34" charset="-128"/>
+              </a:defRPr>
+            </a:lvl7pPr>
+            <a:lvl8pPr marL="3429000" indent="-228600" defTabSz="449263" eaLnBrk="0" fontAlgn="base" hangingPunct="0">
+              <a:spcBef>
+                <a:spcPct val="20000"/>
+              </a:spcBef>
+              <a:spcAft>
+                <a:spcPct val="0"/>
+              </a:spcAft>
+              <a:buFont typeface="Wingdings" pitchFamily="2" charset="2"/>
+              <a:buChar char="§"/>
+              <a:defRPr sz="1600">
+                <a:solidFill>
+                  <a:schemeClr val="tx1"/>
+                </a:solidFill>
+                <a:latin typeface="Arial" charset="0"/>
+                <a:ea typeface="ＭＳ Ｐゴシック" pitchFamily="34" charset="-128"/>
+              </a:defRPr>
+            </a:lvl8pPr>
+            <a:lvl9pPr marL="3886200" indent="-228600" defTabSz="449263" eaLnBrk="0" fontAlgn="base" hangingPunct="0">
+              <a:spcBef>
+                <a:spcPct val="20000"/>
+              </a:spcBef>
+              <a:spcAft>
+                <a:spcPct val="0"/>
+              </a:spcAft>
+              <a:buFont typeface="Wingdings" pitchFamily="2" charset="2"/>
+              <a:buChar char="§"/>
+              <a:defRPr sz="1600">
+                <a:solidFill>
+                  <a:schemeClr val="tx1"/>
+                </a:solidFill>
+                <a:latin typeface="Arial" charset="0"/>
+                <a:ea typeface="ＭＳ Ｐゴシック" pitchFamily="34" charset="-128"/>
+              </a:defRPr>
+            </a:lvl9pPr>
+          </a:lstStyle>
+          <a:p>
+            <a:pPr algn="ctr">
+              <a:spcBef>
+                <a:spcPct val="0"/>
+              </a:spcBef>
+              <a:buSzTx/>
+              <a:buFont typeface="Arial" charset="0"/>
+              <a:buNone/>
+            </a:pPr>
+            <a:r>
+              <a:rPr lang="en-US" altLang="de-DE" sz="1800"/>
+              <a:t/>
+            </a:r>
+            <a:br>
+              <a:rPr lang="en-US" altLang="de-DE" sz="1800"/>
+            </a:br>
+            <a:endParaRPr lang="en-US" altLang="de-DE" sz="1800"/>
+          </a:p>
+        </p:txBody>
+      </p:sp>
+      <p:sp>
+        <p:nvSpPr>
+          <p:cNvPr id="50" name="Abgerundete rechteckige Legende 49"/>
+          <p:cNvSpPr/>
+          <p:nvPr/>
+        </p:nvSpPr>
+        <p:spPr>
+          <a:xfrm>
+            <a:off x="5940425" y="1989138"/>
+            <a:ext cx="2016125" cy="720725"/>
+          </a:xfrm>
+          <a:prstGeom prst="wedgeRoundRectCallout">
+            <a:avLst>
+              <a:gd name="adj1" fmla="val -82398"/>
+              <a:gd name="adj2" fmla="val 171812"/>
+              <a:gd name="adj3" fmla="val 16667"/>
+            </a:avLst>
+          </a:prstGeom>
+          <a:solidFill>
+            <a:schemeClr val="tx1"/>
+          </a:solidFill>
+          <a:ln/>
+        </p:spPr>
+        <p:style>
+          <a:lnRef idx="1">
+            <a:schemeClr val="dk1"/>
+          </a:lnRef>
+          <a:fillRef idx="3">
+            <a:schemeClr val="dk1"/>
+          </a:fillRef>
+          <a:effectRef idx="2">
+            <a:schemeClr val="dk1"/>
+          </a:effectRef>
+          <a:fontRef idx="minor">
+            <a:schemeClr val="lt1"/>
+          </a:fontRef>
+        </p:style>
+        <p:txBody>
+          <a:bodyPr anchor="ctr"/>
+          <a:lstStyle/>
+          <a:p>
+            <a:pPr>
+              <a:defRPr/>
+            </a:pPr>
+            <a:r>
+              <a:rPr lang="de-DE" dirty="0">
+                <a:solidFill>
+                  <a:schemeClr val="bg1"/>
+                </a:solidFill>
+              </a:rPr>
+              <a:t>C war und ist sehr beliebt.</a:t>
+            </a:r>
+          </a:p>
+        </p:txBody>
+      </p:sp>
+      <p:sp>
+        <p:nvSpPr>
+          <p:cNvPr id="14342" name="Rechteck 4"/>
+          <p:cNvSpPr>
+            <a:spLocks noChangeArrowheads="1"/>
+          </p:cNvSpPr>
+          <p:nvPr/>
+        </p:nvSpPr>
+        <p:spPr bwMode="auto">
+          <a:xfrm>
+            <a:off x="4067175" y="6219825"/>
+            <a:ext cx="4572000" cy="234950"/>
+          </a:xfrm>
+          <a:prstGeom prst="rect">
+            <a:avLst/>
+          </a:prstGeom>
+          <a:noFill/>
+          <a:ln>
+            <a:noFill/>
+          </a:ln>
+          <a:extLst>
+            <a:ext uri="{909E8E84-426E-40DD-AFC4-6F175D3DCCD1}">
+              <a14:hiddenFill xmlns:a14="http://schemas.microsoft.com/office/drawing/2010/main">
+                <a:solidFill>
+                  <a:srgbClr val="FFFFFF"/>
+                </a:solidFill>
+              </a14:hiddenFill>
+            </a:ext>
+            <a:ext uri="{91240B29-F687-4F45-9708-019B960494DF}">
+              <a14:hiddenLine xmlns:a14="http://schemas.microsoft.com/office/drawing/2010/main" w="9525">
+                <a:solidFill>
+                  <a:srgbClr val="000000"/>
+                </a:solidFill>
+                <a:miter lim="800000"/>
+                <a:headEnd/>
+                <a:tailEnd/>
+              </a14:hiddenLine>
+            </a:ext>
+          </a:extLst>
+        </p:spPr>
+        <p:txBody>
+          <a:bodyPr>
+            <a:spAutoFit/>
+          </a:bodyPr>
+          <a:lstStyle>
+            <a:lvl1pPr algn="l" eaLnBrk="0" hangingPunct="0">
+              <a:spcBef>
+                <a:spcPct val="20000"/>
+              </a:spcBef>
+              <a:buFont typeface="Wingdings" pitchFamily="2" charset="2"/>
+              <a:defRPr sz="2000">
+                <a:solidFill>
+                  <a:schemeClr val="tx1"/>
+                </a:solidFill>
+                <a:latin typeface="Arial" charset="0"/>
+                <a:ea typeface="ＭＳ Ｐゴシック" pitchFamily="34" charset="-128"/>
+              </a:defRPr>
+            </a:lvl1pPr>
+            <a:lvl2pPr marL="742950" indent="-285750" algn="l" eaLnBrk="0" hangingPunct="0">
+              <a:spcBef>
+                <a:spcPct val="20000"/>
+              </a:spcBef>
+              <a:buFont typeface="Wingdings" pitchFamily="2" charset="2"/>
+              <a:buChar char="§"/>
+              <a:defRPr>
+                <a:solidFill>
+                  <a:schemeClr val="tx1"/>
+                </a:solidFill>
+                <a:latin typeface="Arial" charset="0"/>
+                <a:ea typeface="ＭＳ Ｐゴシック" pitchFamily="34" charset="-128"/>
+              </a:defRPr>
+            </a:lvl2pPr>
+            <a:lvl3pPr marL="1143000" indent="-228600" algn="l" eaLnBrk="0" hangingPunct="0">
+              <a:spcBef>
+                <a:spcPct val="20000"/>
+              </a:spcBef>
+              <a:buFont typeface="Wingdings" pitchFamily="2" charset="2"/>
+              <a:buChar char="§"/>
+              <a:defRPr>
+                <a:solidFill>
+                  <a:schemeClr val="tx1"/>
+                </a:solidFill>
+                <a:latin typeface="Arial" charset="0"/>
+                <a:ea typeface="ＭＳ Ｐゴシック" pitchFamily="34" charset="-128"/>
+              </a:defRPr>
+            </a:lvl3pPr>
+            <a:lvl4pPr marL="1600200" indent="-228600" algn="l" eaLnBrk="0" hangingPunct="0">
+              <a:spcBef>
+                <a:spcPct val="20000"/>
+              </a:spcBef>
+              <a:buFont typeface="Wingdings" pitchFamily="2" charset="2"/>
+              <a:buChar char="§"/>
+              <a:defRPr sz="1600">
+                <a:solidFill>
+                  <a:schemeClr val="tx1"/>
+                </a:solidFill>
+                <a:latin typeface="Arial" charset="0"/>
+                <a:ea typeface="ＭＳ Ｐゴシック" pitchFamily="34" charset="-128"/>
+              </a:defRPr>
+            </a:lvl4pPr>
+            <a:lvl5pPr marL="2057400" indent="-228600" algn="l" eaLnBrk="0" hangingPunct="0">
+              <a:spcBef>
+                <a:spcPct val="20000"/>
+              </a:spcBef>
+              <a:buFont typeface="Wingdings" pitchFamily="2" charset="2"/>
+              <a:buChar char="§"/>
+              <a:defRPr sz="1600">
+                <a:solidFill>
+                  <a:schemeClr val="tx1"/>
+                </a:solidFill>
+                <a:latin typeface="Arial" charset="0"/>
+                <a:ea typeface="ＭＳ Ｐゴシック" pitchFamily="34" charset="-128"/>
+              </a:defRPr>
+            </a:lvl5pPr>
+            <a:lvl6pPr marL="2514600" indent="-228600" defTabSz="449263" eaLnBrk="0" fontAlgn="base" hangingPunct="0">
+              <a:spcBef>
+                <a:spcPct val="20000"/>
+              </a:spcBef>
+              <a:spcAft>
+                <a:spcPct val="0"/>
+              </a:spcAft>
+              <a:buFont typeface="Wingdings" pitchFamily="2" charset="2"/>
+              <a:buChar char="§"/>
+              <a:defRPr sz="1600">
+                <a:solidFill>
+                  <a:schemeClr val="tx1"/>
+                </a:solidFill>
+                <a:latin typeface="Arial" charset="0"/>
+                <a:ea typeface="ＭＳ Ｐゴシック" pitchFamily="34" charset="-128"/>
+              </a:defRPr>
+            </a:lvl6pPr>
+            <a:lvl7pPr marL="2971800" indent="-228600" defTabSz="449263" eaLnBrk="0" fontAlgn="base" hangingPunct="0">
+              <a:spcBef>
+                <a:spcPct val="20000"/>
+              </a:spcBef>
+              <a:spcAft>
+                <a:spcPct val="0"/>
+              </a:spcAft>
+              <a:buFont typeface="Wingdings" pitchFamily="2" charset="2"/>
+              <a:buChar char="§"/>
+              <a:defRPr sz="1600">
+                <a:solidFill>
+                  <a:schemeClr val="tx1"/>
+                </a:solidFill>
+                <a:latin typeface="Arial" charset="0"/>
+                <a:ea typeface="ＭＳ Ｐゴシック" pitchFamily="34" charset="-128"/>
+              </a:defRPr>
+            </a:lvl7pPr>
+            <a:lvl8pPr marL="3429000" indent="-228600" defTabSz="449263" eaLnBrk="0" fontAlgn="base" hangingPunct="0">
+              <a:spcBef>
+                <a:spcPct val="20000"/>
+              </a:spcBef>
+              <a:spcAft>
+                <a:spcPct val="0"/>
+              </a:spcAft>
+              <a:buFont typeface="Wingdings" pitchFamily="2" charset="2"/>
+              <a:buChar char="§"/>
+              <a:defRPr sz="1600">
+                <a:solidFill>
+                  <a:schemeClr val="tx1"/>
+                </a:solidFill>
+                <a:latin typeface="Arial" charset="0"/>
+                <a:ea typeface="ＭＳ Ｐゴシック" pitchFamily="34" charset="-128"/>
+              </a:defRPr>
+            </a:lvl8pPr>
+            <a:lvl9pPr marL="3886200" indent="-228600" defTabSz="449263" eaLnBrk="0" fontAlgn="base" hangingPunct="0">
+              <a:spcBef>
+                <a:spcPct val="20000"/>
+              </a:spcBef>
+              <a:spcAft>
+                <a:spcPct val="0"/>
+              </a:spcAft>
+              <a:buFont typeface="Wingdings" pitchFamily="2" charset="2"/>
+              <a:buChar char="§"/>
+              <a:defRPr sz="1600">
+                <a:solidFill>
+                  <a:schemeClr val="tx1"/>
+                </a:solidFill>
+                <a:latin typeface="Arial" charset="0"/>
+                <a:ea typeface="ＭＳ Ｐゴシック" pitchFamily="34" charset="-128"/>
+              </a:defRPr>
+            </a:lvl9pPr>
+          </a:lstStyle>
+          <a:p>
+            <a:pPr algn="ctr" eaLnBrk="1" hangingPunct="1">
+              <a:spcBef>
+                <a:spcPct val="0"/>
+              </a:spcBef>
+              <a:buSzTx/>
+              <a:buFont typeface="Arial" charset="0"/>
+              <a:buNone/>
+            </a:pPr>
+            <a:r>
+              <a:rPr lang="de-DE" altLang="de-DE" sz="1000" dirty="0">
+                <a:hlinkClick r:id="rId3"/>
+              </a:rPr>
+              <a:t>http://www.tiobe.com/index.php/content/paperinfo/tpci/index.html</a:t>
+            </a:r>
+            <a:endParaRPr lang="de-DE" altLang="de-DE" sz="1000" dirty="0"/>
+          </a:p>
+        </p:txBody>
+      </p:sp>
+      <p:sp>
+        <p:nvSpPr>
+          <p:cNvPr id="52" name="Abgerundete rechteckige Legende 51"/>
+          <p:cNvSpPr/>
+          <p:nvPr/>
+        </p:nvSpPr>
+        <p:spPr>
+          <a:xfrm>
+            <a:off x="6107113" y="5229225"/>
+            <a:ext cx="2635250" cy="720725"/>
+          </a:xfrm>
+          <a:prstGeom prst="wedgeRoundRectCallout">
+            <a:avLst>
+              <a:gd name="adj1" fmla="val -61137"/>
+              <a:gd name="adj2" fmla="val -81932"/>
+              <a:gd name="adj3" fmla="val 16667"/>
+            </a:avLst>
+          </a:prstGeom>
+          <a:solidFill>
+            <a:schemeClr val="tx1"/>
+          </a:solidFill>
+          <a:ln/>
+        </p:spPr>
+        <p:style>
+          <a:lnRef idx="1">
+            <a:schemeClr val="dk1"/>
+          </a:lnRef>
+          <a:fillRef idx="3">
+            <a:schemeClr val="dk1"/>
+          </a:fillRef>
+          <a:effectRef idx="2">
+            <a:schemeClr val="dk1"/>
+          </a:effectRef>
+          <a:fontRef idx="minor">
+            <a:schemeClr val="lt1"/>
+          </a:fontRef>
+        </p:style>
+        <p:txBody>
+          <a:bodyPr anchor="ctr"/>
+          <a:lstStyle/>
+          <a:p>
+            <a:pPr>
+              <a:defRPr/>
+            </a:pPr>
+            <a:r>
+              <a:rPr lang="de-DE" dirty="0">
+                <a:solidFill>
+                  <a:schemeClr val="bg1"/>
+                </a:solidFill>
+              </a:rPr>
+              <a:t>C++ = „C </a:t>
+            </a:r>
+            <a:r>
+              <a:rPr lang="de-DE" dirty="0" err="1">
+                <a:solidFill>
+                  <a:schemeClr val="bg1"/>
+                </a:solidFill>
+              </a:rPr>
+              <a:t>with</a:t>
+            </a:r>
+            <a:r>
+              <a:rPr lang="de-DE" dirty="0">
+                <a:solidFill>
+                  <a:schemeClr val="bg1"/>
+                </a:solidFill>
+              </a:rPr>
+              <a:t> </a:t>
+            </a:r>
+            <a:r>
+              <a:rPr lang="de-DE" dirty="0" err="1">
+                <a:solidFill>
+                  <a:schemeClr val="bg1"/>
+                </a:solidFill>
+              </a:rPr>
+              <a:t>objects</a:t>
+            </a:r>
+            <a:r>
+              <a:rPr lang="de-DE" dirty="0">
+                <a:solidFill>
+                  <a:schemeClr val="bg1"/>
+                </a:solidFill>
+              </a:rPr>
+              <a:t>“</a:t>
+            </a:r>
+          </a:p>
+        </p:txBody>
+      </p:sp>
+    </p:spTree>
+  </p:cSld>
+  <p:clrMapOvr>
+    <a:masterClrMapping/>
+  </p:clrMapOvr>
+  <p:transition/>
+  <p:timing>
+    <p:tnLst>
+      <p:par>
+        <p:cTn id="1" dur="indefinite" restart="never" nodeType="tmRoot">
+          <p:childTnLst>
+            <p:seq concurrent="1" nextAc="seek">
+              <p:cTn id="2" dur="indefinite" nodeType="mainSeq">
+                <p:childTnLst>
+                  <p:par>
+                    <p:cTn id="3" fill="hold" nodeType="clickPar">
+                      <p:stCondLst>
+                        <p:cond delay="indefinite"/>
+                      </p:stCondLst>
+                      <p:childTnLst>
+                        <p:par>
+                          <p:cTn id="4" fill="hold" nodeType="withGroup">
+                            <p:stCondLst>
+                              <p:cond delay="0"/>
+                            </p:stCondLst>
+                            <p:childTnLst>
+                              <p:par>
+                                <p:cTn id="5" presetID="10" presetClass="entr" presetSubtype="0" fill="hold" grpId="0" nodeType="clickEffect">
+                                  <p:stCondLst>
+                                    <p:cond delay="0"/>
+                                  </p:stCondLst>
+                                  <p:childTnLst>
+                                    <p:set>
+                                      <p:cBhvr>
+                                        <p:cTn id="6" dur="1" fill="hold">
+                                          <p:stCondLst>
+                                            <p:cond delay="0"/>
+                                          </p:stCondLst>
+                                        </p:cTn>
+                                        <p:tgtEl>
+                                          <p:spTgt spid="50"/>
+                                        </p:tgtEl>
+                                        <p:attrNameLst>
+                                          <p:attrName>style.visibility</p:attrName>
+                                        </p:attrNameLst>
+                                      </p:cBhvr>
+                                      <p:to>
+                                        <p:strVal val="visible"/>
+                                      </p:to>
+                                    </p:set>
+                                    <p:animEffect transition="in" filter="fade">
+                                      <p:cBhvr>
+                                        <p:cTn id="7" dur="500"/>
+                                        <p:tgtEl>
+                                          <p:spTgt spid="50"/>
+                                        </p:tgtEl>
+                                      </p:cBhvr>
+                                    </p:animEffect>
+                                  </p:childTnLst>
+                                </p:cTn>
+                              </p:par>
+                            </p:childTnLst>
+                          </p:cTn>
+                        </p:par>
+                      </p:childTnLst>
+                    </p:cTn>
+                  </p:par>
+                  <p:par>
+                    <p:cTn id="8" fill="hold" nodeType="clickPar">
+                      <p:stCondLst>
+                        <p:cond delay="indefinite"/>
+                      </p:stCondLst>
+                      <p:childTnLst>
+                        <p:par>
+                          <p:cTn id="9" fill="hold" nodeType="withGroup">
+                            <p:stCondLst>
+                              <p:cond delay="0"/>
+                            </p:stCondLst>
+                            <p:childTnLst>
+                              <p:par>
+                                <p:cTn id="10" presetID="10" presetClass="entr" presetSubtype="0" fill="hold" grpId="0" nodeType="clickEffect">
+                                  <p:stCondLst>
+                                    <p:cond delay="0"/>
+                                  </p:stCondLst>
+                                  <p:childTnLst>
+                                    <p:set>
+                                      <p:cBhvr>
+                                        <p:cTn id="11" dur="1" fill="hold">
+                                          <p:stCondLst>
+                                            <p:cond delay="0"/>
+                                          </p:stCondLst>
+                                        </p:cTn>
+                                        <p:tgtEl>
+                                          <p:spTgt spid="52"/>
+                                        </p:tgtEl>
+                                        <p:attrNameLst>
+                                          <p:attrName>style.visibility</p:attrName>
+                                        </p:attrNameLst>
+                                      </p:cBhvr>
+                                      <p:to>
+                                        <p:strVal val="visible"/>
+                                      </p:to>
+                                    </p:set>
+                                    <p:animEffect transition="in" filter="fade">
+                                      <p:cBhvr>
+                                        <p:cTn id="12" dur="500"/>
+                                        <p:tgtEl>
+                                          <p:spTgt spid="52"/>
+                                        </p:tgtEl>
+                                      </p:cBhvr>
+                                    </p:animEffect>
+                                  </p:childTnLst>
+                                </p:cTn>
+                              </p:par>
+                            </p:childTnLst>
+                          </p:cTn>
+                        </p:par>
+                      </p:childTnLst>
+                    </p:cTn>
+                  </p:par>
+                </p:childTnLst>
+              </p:cTn>
+              <p:prevCondLst>
+                <p:cond evt="onPrev" delay="0">
+                  <p:tgtEl>
+                    <p:sldTgt/>
+                  </p:tgtEl>
+                </p:cond>
+              </p:prevCondLst>
+              <p:nextCondLst>
+                <p:cond evt="onNext" delay="0">
+                  <p:tgtEl>
+                    <p:sldTgt/>
+                  </p:tgtEl>
+                </p:cond>
+              </p:nextCondLst>
+            </p:seq>
+          </p:childTnLst>
+        </p:cTn>
+      </p:par>
+    </p:tnLst>
+    <p:bldLst>
+      <p:bldP spid="50" grpId="0" animBg="1"/>
+      <p:bldP spid="52" grpId="0" animBg="1"/>
+    </p:bldLst>
+  </p:timing>
+</p:sld>
+</file>
+
+<file path=ppt/slides/slide11.xml><?xml version="1.0" encoding="utf-8"?>
+<p:sld xmlns:a="http://schemas.openxmlformats.org/drawingml/2006/main" xmlns:r="http://schemas.openxmlformats.org/officeDocument/2006/relationships" xmlns:p="http://schemas.openxmlformats.org/presentationml/2006/main" show="0">
+  <p:cSld>
+    <p:spTree>
+      <p:nvGrpSpPr>
+        <p:cNvPr id="1" name=""/>
+        <p:cNvGrpSpPr/>
+        <p:nvPr/>
+      </p:nvGrpSpPr>
+      <p:grpSpPr>
+        <a:xfrm>
+          <a:off x="0" y="0"/>
+          <a:ext cx="0" cy="0"/>
+          <a:chOff x="0" y="0"/>
+          <a:chExt cx="0" cy="0"/>
+        </a:xfrm>
+      </p:grpSpPr>
       <p:sp>
         <p:nvSpPr>
           <p:cNvPr id="15362" name="Titel 1"/>
@@ -19854,7 +21533,7 @@
         </p:nvSpPr>
         <p:spPr>
           <a:xfrm>
-            <a:off x="468313" y="1557338"/>
+            <a:off x="468313" y="1556792"/>
             <a:ext cx="8640762" cy="4032250"/>
           </a:xfrm>
         </p:spPr>
@@ -19869,7 +21548,11 @@
             </a:pPr>
             <a:r>
               <a:rPr lang="de-DE" dirty="0" smtClean="0"/>
-              <a:t>Der praktische Teil findet statt im Raum 67</a:t>
+              <a:t>Übung (nachmittags) im </a:t>
+            </a:r>
+            <a:r>
+              <a:rPr lang="de-DE" dirty="0" smtClean="0"/>
+              <a:t>Raum 67</a:t>
             </a:r>
           </a:p>
           <a:p>
@@ -19978,8 +21661,8 @@
               <a:defRPr/>
             </a:pPr>
             <a:r>
-              <a:rPr lang="de-DE" dirty="0" smtClean="0"/>
-              <a:t>  </a:t>
+              <a:rPr lang="de-DE" sz="1600" b="0" dirty="0" smtClean="0"/>
+              <a:t>  Einführung in SVN: </a:t>
             </a:r>
             <a:r>
               <a:rPr lang="de-DE" sz="1600" b="0" dirty="0" smtClean="0">
@@ -20000,21 +21683,27 @@
               <a:t>svnbook.red-bean.com/index.de.html</a:t>
             </a:r>
             <a:r>
-              <a:rPr lang="de-DE" sz="1600" b="0" dirty="0"/>
+              <a:rPr lang="de-DE" sz="1600" b="0" dirty="0" smtClean="0"/>
               <a:t/>
             </a:r>
             <a:br>
-              <a:rPr lang="de-DE" sz="1600" b="0" dirty="0"/>
+              <a:rPr lang="de-DE" sz="1600" b="0" dirty="0" smtClean="0"/>
             </a:br>
             <a:r>
-              <a:rPr lang="de-DE" sz="1600" b="0" dirty="0"/>
-              <a:t>  </a:t>
+              <a:rPr lang="de-DE" sz="1600" b="0" dirty="0" smtClean="0"/>
+              <a:t>  Einführung in Git: </a:t>
+            </a:r>
+            <a:r>
+              <a:rPr lang="de-DE" sz="1600" b="0" dirty="0" smtClean="0">
+                <a:hlinkClick r:id="rId5"/>
+              </a:rPr>
+              <a:t>http</a:t>
             </a:r>
             <a:r>
               <a:rPr lang="de-DE" sz="1600" b="0" dirty="0">
                 <a:hlinkClick r:id="rId5"/>
               </a:rPr>
-              <a:t>http://</a:t>
+              <a:t>://</a:t>
             </a:r>
             <a:r>
               <a:rPr lang="de-DE" sz="1600" b="0" dirty="0" smtClean="0">
@@ -20031,24 +21720,40 @@
             </a:br>
             <a:r>
               <a:rPr lang="de-DE" sz="1600" b="0" dirty="0" smtClean="0"/>
-              <a:t>  </a:t>
+              <a:t>  Git/SVN @ Google: </a:t>
             </a:r>
             <a:r>
               <a:rPr lang="de-DE" sz="1600" b="0" dirty="0" smtClean="0">
                 <a:hlinkClick r:id="rId6"/>
               </a:rPr>
-              <a:t>https://code.google.com/</a:t>
+              <a:t>https</a:t>
+            </a:r>
+            <a:r>
+              <a:rPr lang="de-DE" sz="1600" b="0" dirty="0" smtClean="0">
+                <a:hlinkClick r:id="rId6"/>
+              </a:rPr>
+              <a:t>://code.google.com</a:t>
+            </a:r>
+            <a:r>
+              <a:rPr lang="de-DE" sz="1600" b="0" dirty="0" smtClean="0">
+                <a:hlinkClick r:id="rId6"/>
+              </a:rPr>
+              <a:t>/</a:t>
             </a:r>
             <a:r>
               <a:rPr lang="de-DE" sz="1600" b="0" dirty="0" smtClean="0"/>
-              <a:t> (Git oder SVN)</a:t>
+              <a:t/>
             </a:r>
             <a:br>
               <a:rPr lang="de-DE" sz="1600" b="0" dirty="0" smtClean="0"/>
             </a:br>
             <a:r>
               <a:rPr lang="de-DE" sz="1600" b="0" dirty="0" smtClean="0"/>
-              <a:t>  </a:t>
+              <a:t>  Git @ GitHub:</a:t>
+            </a:r>
+            <a:r>
+              <a:rPr lang="de-DE" sz="1600" b="0" dirty="0" smtClean="0"/>
+              <a:t> </a:t>
             </a:r>
             <a:r>
               <a:rPr lang="de-DE" sz="1600" b="0" dirty="0" smtClean="0">
@@ -20070,7 +21775,7 @@
             </a:r>
             <a:r>
               <a:rPr lang="de-DE" sz="1600" b="0" dirty="0" smtClean="0"/>
-              <a:t> (Git)</a:t>
+              <a:t> </a:t>
             </a:r>
             <a:endParaRPr lang="de-DE" sz="1600" dirty="0" smtClean="0"/>
           </a:p>
@@ -20091,26 +21796,27 @@
               <a:defRPr/>
             </a:pPr>
             <a:r>
+              <a:rPr lang="de-DE" dirty="0" smtClean="0">
+                <a:hlinkClick r:id="rId8"/>
+              </a:rPr>
+              <a:t>https</a:t>
+            </a:r>
+            <a:r>
               <a:rPr lang="de-DE" dirty="0">
                 <a:hlinkClick r:id="rId8"/>
               </a:rPr>
-              <a:t>https://</a:t>
+              <a:t>://</a:t>
             </a:r>
             <a:r>
               <a:rPr lang="de-DE" dirty="0" smtClean="0">
                 <a:hlinkClick r:id="rId8"/>
               </a:rPr>
-              <a:t>moodle.tu-darmstadt.de/mod/forum/view.php?id=98263</a:t>
+              <a:t>moodle.tu-darmstadt.de/mod/forum/view.php?id=101856</a:t>
             </a:r>
             <a:r>
               <a:rPr lang="de-DE" dirty="0" smtClean="0"/>
               <a:t> </a:t>
             </a:r>
-          </a:p>
-          <a:p>
-            <a:pPr lvl="1" eaLnBrk="1" hangingPunct="1">
-              <a:defRPr/>
-            </a:pPr>
             <a:endParaRPr lang="de-DE" dirty="0" smtClean="0"/>
           </a:p>
         </p:txBody>
@@ -20124,7 +21830,7 @@
         <p:spPr>
           <a:xfrm>
             <a:off x="6054725" y="3668713"/>
-            <a:ext cx="2578100" cy="720725"/>
+            <a:ext cx="2578100" cy="768399"/>
           </a:xfrm>
           <a:prstGeom prst="wedgeRoundRectCallout">
             <a:avLst>
@@ -20162,8 +21868,21 @@
                   <a:schemeClr val="bg1"/>
                 </a:solidFill>
               </a:rPr>
-              <a:t>Am besten regelmäßig aktualisieren</a:t>
-            </a:r>
+              <a:t>Am besten regelmäßig </a:t>
+            </a:r>
+            <a:r>
+              <a:rPr lang="de-DE" dirty="0" smtClean="0">
+                <a:solidFill>
+                  <a:schemeClr val="bg1"/>
+                </a:solidFill>
+              </a:rPr>
+              <a:t>aktualisieren – siehe Übungsblatt 1</a:t>
+            </a:r>
+            <a:endParaRPr lang="de-DE" dirty="0">
+              <a:solidFill>
+                <a:schemeClr val="bg1"/>
+              </a:solidFill>
+            </a:endParaRPr>
           </a:p>
         </p:txBody>
       </p:sp>
@@ -20383,6 +22102,145 @@
       </p:grpSpPr>
       <p:sp>
         <p:nvSpPr>
+          <p:cNvPr id="10242" name="Rectangle 2"/>
+          <p:cNvSpPr>
+            <a:spLocks noGrp="1" noChangeArrowheads="1"/>
+          </p:cNvSpPr>
+          <p:nvPr>
+            <p:ph type="title"/>
+          </p:nvPr>
+        </p:nvSpPr>
+        <p:spPr/>
+        <p:txBody>
+          <a:bodyPr/>
+          <a:lstStyle/>
+          <a:p>
+            <a:pPr eaLnBrk="1" hangingPunct="1"/>
+            <a:r>
+              <a:rPr lang="de-DE" altLang="de-DE" dirty="0" smtClean="0"/>
+              <a:t>Ein Wort zu den Übungsblättern</a:t>
+            </a:r>
+            <a:endParaRPr lang="de-DE" altLang="de-DE" dirty="0" smtClean="0"/>
+          </a:p>
+        </p:txBody>
+      </p:sp>
+      <p:sp>
+        <p:nvSpPr>
+          <p:cNvPr id="9219" name="Rectangle 3"/>
+          <p:cNvSpPr>
+            <a:spLocks noGrp="1" noChangeArrowheads="1"/>
+          </p:cNvSpPr>
+          <p:nvPr>
+            <p:ph type="body" idx="1"/>
+          </p:nvPr>
+        </p:nvSpPr>
+        <p:spPr>
+          <a:xfrm>
+            <a:off x="468313" y="1556792"/>
+            <a:ext cx="8424167" cy="4032250"/>
+          </a:xfrm>
+        </p:spPr>
+        <p:txBody>
+          <a:bodyPr/>
+          <a:lstStyle/>
+          <a:p>
+            <a:pPr eaLnBrk="1" hangingPunct="1">
+              <a:defRPr/>
+            </a:pPr>
+            <a:r>
+              <a:rPr lang="de-DE" b="0" dirty="0" smtClean="0"/>
+              <a:t>Alle </a:t>
+            </a:r>
+            <a:r>
+              <a:rPr lang="de-DE" dirty="0" smtClean="0"/>
+              <a:t>nicht-optionalen</a:t>
+            </a:r>
+            <a:r>
+              <a:rPr lang="de-DE" b="0" dirty="0" smtClean="0"/>
+              <a:t> Übungsaufgaben sind </a:t>
+            </a:r>
+            <a:r>
+              <a:rPr lang="de-DE" dirty="0" smtClean="0"/>
+              <a:t>klausurrelevant</a:t>
+            </a:r>
+            <a:r>
+              <a:rPr lang="de-DE" b="0" dirty="0" smtClean="0"/>
+              <a:t>.</a:t>
+            </a:r>
+          </a:p>
+          <a:p>
+            <a:pPr eaLnBrk="1" hangingPunct="1">
+              <a:defRPr/>
+            </a:pPr>
+            <a:r>
+              <a:rPr lang="de-DE" b="0" dirty="0" smtClean="0"/>
+              <a:t>Die Aufgabenblätter sind unterschiedlich lang – man muss nicht immer am Tagesende mit dem Blatt fertig sein!</a:t>
+            </a:r>
+            <a:endParaRPr lang="de-DE" b="0" dirty="0" smtClean="0"/>
+          </a:p>
+        </p:txBody>
+      </p:sp>
+      <p:graphicFrame>
+        <p:nvGraphicFramePr>
+          <p:cNvPr id="6" name="Diagramm 5"/>
+          <p:cNvGraphicFramePr/>
+          <p:nvPr>
+            <p:extLst>
+              <p:ext uri="{D42A27DB-BD31-4B8C-83A1-F6EECF244321}">
+                <p14:modId xmlns:p14="http://schemas.microsoft.com/office/powerpoint/2010/main" val="2958530886"/>
+              </p:ext>
+            </p:extLst>
+          </p:nvPr>
+        </p:nvGraphicFramePr>
+        <p:xfrm>
+          <a:off x="358774" y="2689578"/>
+          <a:ext cx="8173665" cy="3691749"/>
+        </p:xfrm>
+        <a:graphic>
+          <a:graphicData uri="http://schemas.openxmlformats.org/drawingml/2006/chart">
+            <c:chart xmlns:c="http://schemas.openxmlformats.org/drawingml/2006/chart" xmlns:r="http://schemas.openxmlformats.org/officeDocument/2006/relationships" r:id="rId2"/>
+          </a:graphicData>
+        </a:graphic>
+      </p:graphicFrame>
+    </p:spTree>
+    <p:extLst>
+      <p:ext uri="{BB962C8B-B14F-4D97-AF65-F5344CB8AC3E}">
+        <p14:creationId xmlns:p14="http://schemas.microsoft.com/office/powerpoint/2010/main" val="873420656"/>
+      </p:ext>
+    </p:extLst>
+  </p:cSld>
+  <p:clrMapOvr>
+    <a:masterClrMapping/>
+  </p:clrMapOvr>
+  <p:timing>
+    <p:tnLst>
+      <p:par>
+        <p:cTn id="1" dur="indefinite" restart="never" nodeType="tmRoot"/>
+      </p:par>
+    </p:tnLst>
+  </p:timing>
+</p:sld>
+</file>
+
+<file path=ppt/slides/slide7.xml><?xml version="1.0" encoding="utf-8"?>
+<p:sld xmlns:a="http://schemas.openxmlformats.org/drawingml/2006/main" xmlns:r="http://schemas.openxmlformats.org/officeDocument/2006/relationships" xmlns:p="http://schemas.openxmlformats.org/presentationml/2006/main">
+  <p:cSld>
+    <p:spTree>
+      <p:nvGrpSpPr>
+        <p:cNvPr id="1" name=""/>
+        <p:cNvGrpSpPr/>
+        <p:nvPr/>
+      </p:nvGrpSpPr>
+      <p:grpSpPr>
+        <a:xfrm>
+          <a:off x="0" y="0"/>
+          <a:ext cx="0" cy="0"/>
+          <a:chOff x="0" y="0"/>
+          <a:chExt cx="0" cy="0"/>
+        </a:xfrm>
+      </p:grpSpPr>
+      <p:sp>
+        <p:nvSpPr>
           <p:cNvPr id="11266" name="Titel 1"/>
           <p:cNvSpPr>
             <a:spLocks noGrp="1"/>
@@ -20718,7 +22576,7 @@
 </p:sld>
 </file>
 
-<file path=ppt/slides/slide7.xml><?xml version="1.0" encoding="utf-8"?>
+<file path=ppt/slides/slide8.xml><?xml version="1.0" encoding="utf-8"?>
 <p:sld xmlns:a="http://schemas.openxmlformats.org/drawingml/2006/main" xmlns:r="http://schemas.openxmlformats.org/officeDocument/2006/relationships" xmlns:p="http://schemas.openxmlformats.org/presentationml/2006/main">
   <p:cSld>
     <p:spTree>
@@ -21198,7 +23056,7 @@
 </p:sld>
 </file>
 
-<file path=ppt/slides/slide8.xml><?xml version="1.0" encoding="utf-8"?>
+<file path=ppt/slides/slide9.xml><?xml version="1.0" encoding="utf-8"?>
 <p:sld xmlns:a="http://schemas.openxmlformats.org/drawingml/2006/main" xmlns:r="http://schemas.openxmlformats.org/officeDocument/2006/relationships" xmlns:p="http://schemas.openxmlformats.org/presentationml/2006/main">
   <p:cSld>
     <p:spTree>
@@ -21230,7 +23088,9 @@
             <a:avLst/>
           </a:prstGeom>
           <a:solidFill>
-            <a:schemeClr val="accent1"/>
+            <a:schemeClr val="bg1">
+              <a:lumMod val="65000"/>
+            </a:schemeClr>
           </a:solidFill>
           <a:ln w="9525" cap="flat" cmpd="sng" algn="ctr">
             <a:noFill/>
@@ -21290,14 +23150,16 @@
         </p:nvSpPr>
         <p:spPr bwMode="auto">
           <a:xfrm>
-            <a:off x="4052081" y="5883289"/>
-            <a:ext cx="1135879" cy="607602"/>
+            <a:off x="3925875" y="5883289"/>
+            <a:ext cx="1262086" cy="607602"/>
           </a:xfrm>
           <a:prstGeom prst="rect">
             <a:avLst/>
           </a:prstGeom>
           <a:solidFill>
-            <a:schemeClr val="accent1"/>
+            <a:schemeClr val="bg1">
+              <a:lumMod val="65000"/>
+            </a:schemeClr>
           </a:solidFill>
           <a:ln w="9525" cap="flat" cmpd="sng" algn="ctr">
             <a:noFill/>
@@ -21435,8 +23297,11 @@
               <a:rPr lang="de-DE" altLang="de-DE" dirty="0" smtClean="0">
                 <a:ea typeface="ＭＳ Ｐゴシック" pitchFamily="34" charset="-128"/>
               </a:rPr>
-              <a:t>Eine kurze Geschichte von…</a:t>
-            </a:r>
+              <a:t>C, C++ und Java</a:t>
+            </a:r>
+            <a:endParaRPr lang="de-DE" altLang="de-DE" dirty="0" smtClean="0">
+              <a:ea typeface="ＭＳ Ｐゴシック" pitchFamily="34" charset="-128"/>
+            </a:endParaRPr>
           </a:p>
         </p:txBody>
       </p:sp>
@@ -21667,7 +23532,11 @@
           <a:prstGeom prst="rect">
             <a:avLst/>
           </a:prstGeom>
-          <a:noFill/>
+          <a:solidFill>
+            <a:schemeClr val="bg1">
+              <a:lumMod val="65000"/>
+            </a:schemeClr>
+          </a:solidFill>
         </p:spPr>
         <p:txBody>
           <a:bodyPr wrap="square" rtlCol="0">
@@ -21832,14 +23701,13 @@
           <p:cNvPr id="19" name="Gerade Verbindung mit Pfeil 18"/>
           <p:cNvCxnSpPr>
             <a:stCxn id="10" idx="2"/>
-            <a:endCxn id="22" idx="0"/>
           </p:cNvCxnSpPr>
           <p:nvPr/>
         </p:nvCxnSpPr>
         <p:spPr bwMode="auto">
-          <a:xfrm>
-            <a:off x="4357922" y="5440095"/>
-            <a:ext cx="2403" cy="471443"/>
+          <a:xfrm flipH="1">
+            <a:off x="4354584" y="5440095"/>
+            <a:ext cx="3338" cy="426813"/>
           </a:xfrm>
           <a:prstGeom prst="straightConnector1">
             <a:avLst/>
@@ -21900,8 +23768,8 @@
         </p:nvCxnSpPr>
         <p:spPr bwMode="auto">
           <a:xfrm>
-            <a:off x="4863924" y="5136294"/>
-            <a:ext cx="859905" cy="166472"/>
+            <a:off x="4863924" y="5118682"/>
+            <a:ext cx="859905" cy="184084"/>
           </a:xfrm>
           <a:prstGeom prst="straightConnector1">
             <a:avLst/>
@@ -22288,7 +24156,7 @@
         </p:blipFill>
         <p:spPr bwMode="auto">
           <a:xfrm>
-            <a:off x="4743022" y="3590098"/>
+            <a:off x="4824583" y="3589165"/>
             <a:ext cx="675483" cy="948893"/>
           </a:xfrm>
           <a:prstGeom prst="rect">
@@ -22858,7 +24726,7 @@
         <p:spPr bwMode="auto">
           <a:xfrm>
             <a:off x="3600472" y="5853279"/>
-            <a:ext cx="439660" cy="57089"/>
+            <a:ext cx="289398" cy="57089"/>
           </a:xfrm>
           <a:prstGeom prst="straightConnector1">
             <a:avLst/>
@@ -23003,7 +24871,7 @@
                                           </p:stCondLst>
                                         </p:cTn>
                                         <p:tgtEl>
-                                          <p:spTgt spid="71"/>
+                                          <p:spTgt spid="81"/>
                                         </p:tgtEl>
                                         <p:attrNameLst>
                                           <p:attrName>style.visibility</p:attrName>
@@ -23017,40 +24885,372 @@
                                       <p:cBhvr>
                                         <p:cTn id="7" dur="500"/>
                                         <p:tgtEl>
-                                          <p:spTgt spid="71"/>
+                                          <p:spTgt spid="81"/>
                                         </p:tgtEl>
                                       </p:cBhvr>
                                     </p:animEffect>
                                   </p:childTnLst>
                                 </p:cTn>
                               </p:par>
-                            </p:childTnLst>
-                          </p:cTn>
-                        </p:par>
-                      </p:childTnLst>
-                    </p:cTn>
-                  </p:par>
-                  <p:par>
-                    <p:cTn id="8" fill="hold">
-                      <p:stCondLst>
-                        <p:cond delay="indefinite"/>
-                      </p:stCondLst>
-                      <p:childTnLst>
-                        <p:par>
-                          <p:cTn id="9" fill="hold">
-                            <p:stCondLst>
-                              <p:cond delay="0"/>
-                            </p:stCondLst>
-                            <p:childTnLst>
                               <p:par>
-                                <p:cTn id="10" presetID="10" presetClass="entr" presetSubtype="0" fill="hold" grpId="0" nodeType="clickEffect">
+                                <p:cTn id="8" presetID="10" presetClass="entr" presetSubtype="0" fill="hold" grpId="0" nodeType="withEffect">
                                   <p:stCondLst>
                                     <p:cond delay="0"/>
                                   </p:stCondLst>
                                   <p:childTnLst>
                                     <p:set>
                                       <p:cBhvr>
-                                        <p:cTn id="11" dur="1" fill="hold">
+                                        <p:cTn id="9" dur="1" fill="hold">
+                                          <p:stCondLst>
+                                            <p:cond delay="0"/>
+                                          </p:stCondLst>
+                                        </p:cTn>
+                                        <p:tgtEl>
+                                          <p:spTgt spid="47"/>
+                                        </p:tgtEl>
+                                        <p:attrNameLst>
+                                          <p:attrName>style.visibility</p:attrName>
+                                        </p:attrNameLst>
+                                      </p:cBhvr>
+                                      <p:to>
+                                        <p:strVal val="visible"/>
+                                      </p:to>
+                                    </p:set>
+                                    <p:animEffect transition="in" filter="fade">
+                                      <p:cBhvr>
+                                        <p:cTn id="10" dur="500"/>
+                                        <p:tgtEl>
+                                          <p:spTgt spid="47"/>
+                                        </p:tgtEl>
+                                      </p:cBhvr>
+                                    </p:animEffect>
+                                  </p:childTnLst>
+                                </p:cTn>
+                              </p:par>
+                              <p:par>
+                                <p:cTn id="11" presetID="10" presetClass="entr" presetSubtype="0" fill="hold" nodeType="withEffect">
+                                  <p:stCondLst>
+                                    <p:cond delay="0"/>
+                                  </p:stCondLst>
+                                  <p:childTnLst>
+                                    <p:set>
+                                      <p:cBhvr>
+                                        <p:cTn id="12" dur="1" fill="hold">
+                                          <p:stCondLst>
+                                            <p:cond delay="0"/>
+                                          </p:stCondLst>
+                                        </p:cTn>
+                                        <p:tgtEl>
+                                          <p:spTgt spid="44"/>
+                                        </p:tgtEl>
+                                        <p:attrNameLst>
+                                          <p:attrName>style.visibility</p:attrName>
+                                        </p:attrNameLst>
+                                      </p:cBhvr>
+                                      <p:to>
+                                        <p:strVal val="visible"/>
+                                      </p:to>
+                                    </p:set>
+                                    <p:animEffect transition="in" filter="fade">
+                                      <p:cBhvr>
+                                        <p:cTn id="13" dur="500"/>
+                                        <p:tgtEl>
+                                          <p:spTgt spid="44"/>
+                                        </p:tgtEl>
+                                      </p:cBhvr>
+                                    </p:animEffect>
+                                  </p:childTnLst>
+                                </p:cTn>
+                              </p:par>
+                              <p:par>
+                                <p:cTn id="14" presetID="10" presetClass="entr" presetSubtype="0" fill="hold" grpId="0" nodeType="withEffect">
+                                  <p:stCondLst>
+                                    <p:cond delay="0"/>
+                                  </p:stCondLst>
+                                  <p:childTnLst>
+                                    <p:set>
+                                      <p:cBhvr>
+                                        <p:cTn id="15" dur="1" fill="hold">
+                                          <p:stCondLst>
+                                            <p:cond delay="0"/>
+                                          </p:stCondLst>
+                                        </p:cTn>
+                                        <p:tgtEl>
+                                          <p:spTgt spid="41"/>
+                                        </p:tgtEl>
+                                        <p:attrNameLst>
+                                          <p:attrName>style.visibility</p:attrName>
+                                        </p:attrNameLst>
+                                      </p:cBhvr>
+                                      <p:to>
+                                        <p:strVal val="visible"/>
+                                      </p:to>
+                                    </p:set>
+                                    <p:animEffect transition="in" filter="fade">
+                                      <p:cBhvr>
+                                        <p:cTn id="16" dur="500"/>
+                                        <p:tgtEl>
+                                          <p:spTgt spid="41"/>
+                                        </p:tgtEl>
+                                      </p:cBhvr>
+                                    </p:animEffect>
+                                  </p:childTnLst>
+                                </p:cTn>
+                              </p:par>
+                              <p:par>
+                                <p:cTn id="17" presetID="10" presetClass="entr" presetSubtype="0" fill="hold" nodeType="withEffect">
+                                  <p:stCondLst>
+                                    <p:cond delay="0"/>
+                                  </p:stCondLst>
+                                  <p:childTnLst>
+                                    <p:set>
+                                      <p:cBhvr>
+                                        <p:cTn id="18" dur="1" fill="hold">
+                                          <p:stCondLst>
+                                            <p:cond delay="0"/>
+                                          </p:stCondLst>
+                                        </p:cTn>
+                                        <p:tgtEl>
+                                          <p:spTgt spid="42"/>
+                                        </p:tgtEl>
+                                        <p:attrNameLst>
+                                          <p:attrName>style.visibility</p:attrName>
+                                        </p:attrNameLst>
+                                      </p:cBhvr>
+                                      <p:to>
+                                        <p:strVal val="visible"/>
+                                      </p:to>
+                                    </p:set>
+                                    <p:animEffect transition="in" filter="fade">
+                                      <p:cBhvr>
+                                        <p:cTn id="19" dur="500"/>
+                                        <p:tgtEl>
+                                          <p:spTgt spid="42"/>
+                                        </p:tgtEl>
+                                      </p:cBhvr>
+                                    </p:animEffect>
+                                  </p:childTnLst>
+                                </p:cTn>
+                              </p:par>
+                              <p:par>
+                                <p:cTn id="20" presetID="10" presetClass="entr" presetSubtype="0" fill="hold" nodeType="withEffect">
+                                  <p:stCondLst>
+                                    <p:cond delay="0"/>
+                                  </p:stCondLst>
+                                  <p:childTnLst>
+                                    <p:set>
+                                      <p:cBhvr>
+                                        <p:cTn id="21" dur="1" fill="hold">
+                                          <p:stCondLst>
+                                            <p:cond delay="0"/>
+                                          </p:stCondLst>
+                                        </p:cTn>
+                                        <p:tgtEl>
+                                          <p:spTgt spid="31"/>
+                                        </p:tgtEl>
+                                        <p:attrNameLst>
+                                          <p:attrName>style.visibility</p:attrName>
+                                        </p:attrNameLst>
+                                      </p:cBhvr>
+                                      <p:to>
+                                        <p:strVal val="visible"/>
+                                      </p:to>
+                                    </p:set>
+                                    <p:animEffect transition="in" filter="fade">
+                                      <p:cBhvr>
+                                        <p:cTn id="22" dur="500"/>
+                                        <p:tgtEl>
+                                          <p:spTgt spid="31"/>
+                                        </p:tgtEl>
+                                      </p:cBhvr>
+                                    </p:animEffect>
+                                  </p:childTnLst>
+                                </p:cTn>
+                              </p:par>
+                              <p:par>
+                                <p:cTn id="23" presetID="10" presetClass="entr" presetSubtype="0" fill="hold" grpId="0" nodeType="withEffect">
+                                  <p:stCondLst>
+                                    <p:cond delay="0"/>
+                                  </p:stCondLst>
+                                  <p:childTnLst>
+                                    <p:set>
+                                      <p:cBhvr>
+                                        <p:cTn id="24" dur="1" fill="hold">
+                                          <p:stCondLst>
+                                            <p:cond delay="0"/>
+                                          </p:stCondLst>
+                                        </p:cTn>
+                                        <p:tgtEl>
+                                          <p:spTgt spid="37"/>
+                                        </p:tgtEl>
+                                        <p:attrNameLst>
+                                          <p:attrName>style.visibility</p:attrName>
+                                        </p:attrNameLst>
+                                      </p:cBhvr>
+                                      <p:to>
+                                        <p:strVal val="visible"/>
+                                      </p:to>
+                                    </p:set>
+                                    <p:animEffect transition="in" filter="fade">
+                                      <p:cBhvr>
+                                        <p:cTn id="25" dur="500"/>
+                                        <p:tgtEl>
+                                          <p:spTgt spid="37"/>
+                                        </p:tgtEl>
+                                      </p:cBhvr>
+                                    </p:animEffect>
+                                  </p:childTnLst>
+                                </p:cTn>
+                              </p:par>
+                              <p:par>
+                                <p:cTn id="26" presetID="10" presetClass="entr" presetSubtype="0" fill="hold" nodeType="withEffect">
+                                  <p:stCondLst>
+                                    <p:cond delay="0"/>
+                                  </p:stCondLst>
+                                  <p:childTnLst>
+                                    <p:set>
+                                      <p:cBhvr>
+                                        <p:cTn id="27" dur="1" fill="hold">
+                                          <p:stCondLst>
+                                            <p:cond delay="0"/>
+                                          </p:stCondLst>
+                                        </p:cTn>
+                                        <p:tgtEl>
+                                          <p:spTgt spid="59"/>
+                                        </p:tgtEl>
+                                        <p:attrNameLst>
+                                          <p:attrName>style.visibility</p:attrName>
+                                        </p:attrNameLst>
+                                      </p:cBhvr>
+                                      <p:to>
+                                        <p:strVal val="visible"/>
+                                      </p:to>
+                                    </p:set>
+                                    <p:animEffect transition="in" filter="fade">
+                                      <p:cBhvr>
+                                        <p:cTn id="28" dur="500"/>
+                                        <p:tgtEl>
+                                          <p:spTgt spid="59"/>
+                                        </p:tgtEl>
+                                      </p:cBhvr>
+                                    </p:animEffect>
+                                  </p:childTnLst>
+                                </p:cTn>
+                              </p:par>
+                              <p:par>
+                                <p:cTn id="29" presetID="10" presetClass="entr" presetSubtype="0" fill="hold" grpId="0" nodeType="withEffect">
+                                  <p:stCondLst>
+                                    <p:cond delay="0"/>
+                                  </p:stCondLst>
+                                  <p:childTnLst>
+                                    <p:set>
+                                      <p:cBhvr>
+                                        <p:cTn id="30" dur="1" fill="hold">
+                                          <p:stCondLst>
+                                            <p:cond delay="0"/>
+                                          </p:stCondLst>
+                                        </p:cTn>
+                                        <p:tgtEl>
+                                          <p:spTgt spid="53"/>
+                                        </p:tgtEl>
+                                        <p:attrNameLst>
+                                          <p:attrName>style.visibility</p:attrName>
+                                        </p:attrNameLst>
+                                      </p:cBhvr>
+                                      <p:to>
+                                        <p:strVal val="visible"/>
+                                      </p:to>
+                                    </p:set>
+                                    <p:animEffect transition="in" filter="fade">
+                                      <p:cBhvr>
+                                        <p:cTn id="31" dur="500"/>
+                                        <p:tgtEl>
+                                          <p:spTgt spid="53"/>
+                                        </p:tgtEl>
+                                      </p:cBhvr>
+                                    </p:animEffect>
+                                  </p:childTnLst>
+                                </p:cTn>
+                              </p:par>
+                              <p:par>
+                                <p:cTn id="32" presetID="10" presetClass="entr" presetSubtype="0" fill="hold" nodeType="withEffect">
+                                  <p:stCondLst>
+                                    <p:cond delay="0"/>
+                                  </p:stCondLst>
+                                  <p:childTnLst>
+                                    <p:set>
+                                      <p:cBhvr>
+                                        <p:cTn id="33" dur="1" fill="hold">
+                                          <p:stCondLst>
+                                            <p:cond delay="0"/>
+                                          </p:stCondLst>
+                                        </p:cTn>
+                                        <p:tgtEl>
+                                          <p:spTgt spid="64"/>
+                                        </p:tgtEl>
+                                        <p:attrNameLst>
+                                          <p:attrName>style.visibility</p:attrName>
+                                        </p:attrNameLst>
+                                      </p:cBhvr>
+                                      <p:to>
+                                        <p:strVal val="visible"/>
+                                      </p:to>
+                                    </p:set>
+                                    <p:animEffect transition="in" filter="fade">
+                                      <p:cBhvr>
+                                        <p:cTn id="34" dur="500"/>
+                                        <p:tgtEl>
+                                          <p:spTgt spid="64"/>
+                                        </p:tgtEl>
+                                      </p:cBhvr>
+                                    </p:animEffect>
+                                  </p:childTnLst>
+                                </p:cTn>
+                              </p:par>
+                              <p:par>
+                                <p:cTn id="35" presetID="10" presetClass="entr" presetSubtype="0" fill="hold" grpId="0" nodeType="withEffect">
+                                  <p:stCondLst>
+                                    <p:cond delay="0"/>
+                                  </p:stCondLst>
+                                  <p:childTnLst>
+                                    <p:set>
+                                      <p:cBhvr>
+                                        <p:cTn id="36" dur="1" fill="hold">
+                                          <p:stCondLst>
+                                            <p:cond delay="0"/>
+                                          </p:stCondLst>
+                                        </p:cTn>
+                                        <p:tgtEl>
+                                          <p:spTgt spid="54"/>
+                                        </p:tgtEl>
+                                        <p:attrNameLst>
+                                          <p:attrName>style.visibility</p:attrName>
+                                        </p:attrNameLst>
+                                      </p:cBhvr>
+                                      <p:to>
+                                        <p:strVal val="visible"/>
+                                      </p:to>
+                                    </p:set>
+                                    <p:animEffect transition="in" filter="fade">
+                                      <p:cBhvr>
+                                        <p:cTn id="37" dur="500"/>
+                                        <p:tgtEl>
+                                          <p:spTgt spid="54"/>
+                                        </p:tgtEl>
+                                      </p:cBhvr>
+                                    </p:animEffect>
+                                  </p:childTnLst>
+                                </p:cTn>
+                              </p:par>
+                              <p:par>
+                                <p:cTn id="38" presetID="10" presetClass="entr" presetSubtype="0" fill="hold" grpId="0" nodeType="withEffect">
+                                  <p:stCondLst>
+                                    <p:cond delay="0"/>
+                                  </p:stCondLst>
+                                  <p:childTnLst>
+                                    <p:set>
+                                      <p:cBhvr>
+                                        <p:cTn id="39" dur="1" fill="hold">
                                           <p:stCondLst>
                                             <p:cond delay="0"/>
                                           </p:stCondLst>
@@ -23068,7 +25268,7 @@
                                     </p:set>
                                     <p:animEffect transition="in" filter="fade">
                                       <p:cBhvr>
-                                        <p:cTn id="12" dur="500"/>
+                                        <p:cTn id="40" dur="500"/>
                                         <p:tgtEl>
                                           <p:spTgt spid="72"/>
                                         </p:tgtEl>
@@ -23084,26 +25284,201 @@
                     </p:cTn>
                   </p:par>
                   <p:par>
-                    <p:cTn id="13" fill="hold">
+                    <p:cTn id="41" fill="hold">
                       <p:stCondLst>
                         <p:cond delay="indefinite"/>
                       </p:stCondLst>
                       <p:childTnLst>
                         <p:par>
-                          <p:cTn id="14" fill="hold">
+                          <p:cTn id="42" fill="hold">
                             <p:stCondLst>
                               <p:cond delay="0"/>
                             </p:stCondLst>
                             <p:childTnLst>
                               <p:par>
-                                <p:cTn id="15" presetID="10" presetClass="entr" presetSubtype="0" fill="hold" grpId="0" nodeType="clickEffect">
+                                <p:cTn id="43" presetID="10" presetClass="entr" presetSubtype="0" fill="hold" nodeType="clickEffect">
                                   <p:stCondLst>
                                     <p:cond delay="0"/>
                                   </p:stCondLst>
                                   <p:childTnLst>
                                     <p:set>
                                       <p:cBhvr>
-                                        <p:cTn id="16" dur="1" fill="hold">
+                                        <p:cTn id="44" dur="1" fill="hold">
+                                          <p:stCondLst>
+                                            <p:cond delay="0"/>
+                                          </p:stCondLst>
+                                        </p:cTn>
+                                        <p:tgtEl>
+                                          <p:spTgt spid="4"/>
+                                        </p:tgtEl>
+                                        <p:attrNameLst>
+                                          <p:attrName>style.visibility</p:attrName>
+                                        </p:attrNameLst>
+                                      </p:cBhvr>
+                                      <p:to>
+                                        <p:strVal val="visible"/>
+                                      </p:to>
+                                    </p:set>
+                                    <p:animEffect transition="in" filter="fade">
+                                      <p:cBhvr>
+                                        <p:cTn id="45" dur="500"/>
+                                        <p:tgtEl>
+                                          <p:spTgt spid="4"/>
+                                        </p:tgtEl>
+                                      </p:cBhvr>
+                                    </p:animEffect>
+                                  </p:childTnLst>
+                                </p:cTn>
+                              </p:par>
+                              <p:par>
+                                <p:cTn id="46" presetID="10" presetClass="entr" presetSubtype="0" fill="hold" grpId="0" nodeType="withEffect">
+                                  <p:stCondLst>
+                                    <p:cond delay="0"/>
+                                  </p:stCondLst>
+                                  <p:childTnLst>
+                                    <p:set>
+                                      <p:cBhvr>
+                                        <p:cTn id="47" dur="1" fill="hold">
+                                          <p:stCondLst>
+                                            <p:cond delay="0"/>
+                                          </p:stCondLst>
+                                        </p:cTn>
+                                        <p:tgtEl>
+                                          <p:spTgt spid="10"/>
+                                        </p:tgtEl>
+                                        <p:attrNameLst>
+                                          <p:attrName>style.visibility</p:attrName>
+                                        </p:attrNameLst>
+                                      </p:cBhvr>
+                                      <p:to>
+                                        <p:strVal val="visible"/>
+                                      </p:to>
+                                    </p:set>
+                                    <p:animEffect transition="in" filter="fade">
+                                      <p:cBhvr>
+                                        <p:cTn id="48" dur="500"/>
+                                        <p:tgtEl>
+                                          <p:spTgt spid="10"/>
+                                        </p:tgtEl>
+                                      </p:cBhvr>
+                                    </p:animEffect>
+                                  </p:childTnLst>
+                                </p:cTn>
+                              </p:par>
+                              <p:par>
+                                <p:cTn id="49" presetID="10" presetClass="entr" presetSubtype="0" fill="hold" nodeType="withEffect">
+                                  <p:stCondLst>
+                                    <p:cond delay="0"/>
+                                  </p:stCondLst>
+                                  <p:childTnLst>
+                                    <p:set>
+                                      <p:cBhvr>
+                                        <p:cTn id="50" dur="1" fill="hold">
+                                          <p:stCondLst>
+                                            <p:cond delay="0"/>
+                                          </p:stCondLst>
+                                        </p:cTn>
+                                        <p:tgtEl>
+                                          <p:spTgt spid="30"/>
+                                        </p:tgtEl>
+                                        <p:attrNameLst>
+                                          <p:attrName>style.visibility</p:attrName>
+                                        </p:attrNameLst>
+                                      </p:cBhvr>
+                                      <p:to>
+                                        <p:strVal val="visible"/>
+                                      </p:to>
+                                    </p:set>
+                                    <p:animEffect transition="in" filter="fade">
+                                      <p:cBhvr>
+                                        <p:cTn id="51" dur="500"/>
+                                        <p:tgtEl>
+                                          <p:spTgt spid="30"/>
+                                        </p:tgtEl>
+                                      </p:cBhvr>
+                                    </p:animEffect>
+                                  </p:childTnLst>
+                                </p:cTn>
+                              </p:par>
+                              <p:par>
+                                <p:cTn id="52" presetID="10" presetClass="entr" presetSubtype="0" fill="hold" grpId="0" nodeType="withEffect">
+                                  <p:stCondLst>
+                                    <p:cond delay="0"/>
+                                  </p:stCondLst>
+                                  <p:childTnLst>
+                                    <p:set>
+                                      <p:cBhvr>
+                                        <p:cTn id="53" dur="1" fill="hold">
+                                          <p:stCondLst>
+                                            <p:cond delay="0"/>
+                                          </p:stCondLst>
+                                        </p:cTn>
+                                        <p:tgtEl>
+                                          <p:spTgt spid="29"/>
+                                        </p:tgtEl>
+                                        <p:attrNameLst>
+                                          <p:attrName>style.visibility</p:attrName>
+                                        </p:attrNameLst>
+                                      </p:cBhvr>
+                                      <p:to>
+                                        <p:strVal val="visible"/>
+                                      </p:to>
+                                    </p:set>
+                                    <p:animEffect transition="in" filter="fade">
+                                      <p:cBhvr>
+                                        <p:cTn id="54" dur="500"/>
+                                        <p:tgtEl>
+                                          <p:spTgt spid="29"/>
+                                        </p:tgtEl>
+                                      </p:cBhvr>
+                                    </p:animEffect>
+                                  </p:childTnLst>
+                                </p:cTn>
+                              </p:par>
+                              <p:par>
+                                <p:cTn id="55" presetID="10" presetClass="entr" presetSubtype="0" fill="hold" nodeType="withEffect">
+                                  <p:stCondLst>
+                                    <p:cond delay="0"/>
+                                  </p:stCondLst>
+                                  <p:childTnLst>
+                                    <p:set>
+                                      <p:cBhvr>
+                                        <p:cTn id="56" dur="1" fill="hold">
+                                          <p:stCondLst>
+                                            <p:cond delay="0"/>
+                                          </p:stCondLst>
+                                        </p:cTn>
+                                        <p:tgtEl>
+                                          <p:spTgt spid="28678"/>
+                                        </p:tgtEl>
+                                        <p:attrNameLst>
+                                          <p:attrName>style.visibility</p:attrName>
+                                        </p:attrNameLst>
+                                      </p:cBhvr>
+                                      <p:to>
+                                        <p:strVal val="visible"/>
+                                      </p:to>
+                                    </p:set>
+                                    <p:animEffect transition="in" filter="fade">
+                                      <p:cBhvr>
+                                        <p:cTn id="57" dur="500"/>
+                                        <p:tgtEl>
+                                          <p:spTgt spid="28678"/>
+                                        </p:tgtEl>
+                                      </p:cBhvr>
+                                    </p:animEffect>
+                                  </p:childTnLst>
+                                </p:cTn>
+                              </p:par>
+                              <p:par>
+                                <p:cTn id="58" presetID="10" presetClass="entr" presetSubtype="0" fill="hold" grpId="0" nodeType="withEffect">
+                                  <p:stCondLst>
+                                    <p:cond delay="0"/>
+                                  </p:stCondLst>
+                                  <p:childTnLst>
+                                    <p:set>
+                                      <p:cBhvr>
+                                        <p:cTn id="59" dur="1" fill="hold">
                                           <p:stCondLst>
                                             <p:cond delay="0"/>
                                           </p:stCondLst>
@@ -23121,9 +25496,44 @@
                                     </p:set>
                                     <p:animEffect transition="in" filter="fade">
                                       <p:cBhvr>
-                                        <p:cTn id="17" dur="500"/>
+                                        <p:cTn id="60" dur="500"/>
                                         <p:tgtEl>
                                           <p:spTgt spid="74"/>
+                                        </p:tgtEl>
+                                      </p:cBhvr>
+                                    </p:animEffect>
+                                  </p:childTnLst>
+                                </p:cTn>
+                              </p:par>
+                              <p:par>
+                                <p:cTn id="61" presetID="10" presetClass="entr" presetSubtype="0" fill="hold" grpId="0" nodeType="withEffect">
+                                  <p:stCondLst>
+                                    <p:cond delay="0"/>
+                                  </p:stCondLst>
+                                  <p:childTnLst>
+                                    <p:set>
+                                      <p:cBhvr>
+                                        <p:cTn id="62" dur="1" fill="hold">
+                                          <p:stCondLst>
+                                            <p:cond delay="0"/>
+                                          </p:stCondLst>
+                                        </p:cTn>
+                                        <p:tgtEl>
+                                          <p:spTgt spid="36"/>
+                                        </p:tgtEl>
+                                        <p:attrNameLst>
+                                          <p:attrName>style.visibility</p:attrName>
+                                        </p:attrNameLst>
+                                      </p:cBhvr>
+                                      <p:to>
+                                        <p:strVal val="visible"/>
+                                      </p:to>
+                                    </p:set>
+                                    <p:animEffect transition="in" filter="fade">
+                                      <p:cBhvr>
+                                        <p:cTn id="63" dur="500"/>
+                                        <p:tgtEl>
+                                          <p:spTgt spid="36"/>
                                         </p:tgtEl>
                                       </p:cBhvr>
                                     </p:animEffect>
@@ -23137,32 +25547,32 @@
                     </p:cTn>
                   </p:par>
                   <p:par>
-                    <p:cTn id="18" fill="hold">
+                    <p:cTn id="64" fill="hold">
                       <p:stCondLst>
                         <p:cond delay="indefinite"/>
                       </p:stCondLst>
                       <p:childTnLst>
                         <p:par>
-                          <p:cTn id="19" fill="hold">
+                          <p:cTn id="65" fill="hold">
                             <p:stCondLst>
                               <p:cond delay="0"/>
                             </p:stCondLst>
                             <p:childTnLst>
                               <p:par>
-                                <p:cTn id="20" presetID="10" presetClass="entr" presetSubtype="0" fill="hold" grpId="0" nodeType="clickEffect">
+                                <p:cTn id="66" presetID="10" presetClass="entr" presetSubtype="0" fill="hold" nodeType="clickEffect">
                                   <p:stCondLst>
                                     <p:cond delay="0"/>
                                   </p:stCondLst>
                                   <p:childTnLst>
                                     <p:set>
                                       <p:cBhvr>
-                                        <p:cTn id="21" dur="1" fill="hold">
+                                        <p:cTn id="67" dur="1" fill="hold">
                                           <p:stCondLst>
                                             <p:cond delay="0"/>
                                           </p:stCondLst>
                                         </p:cTn>
                                         <p:tgtEl>
-                                          <p:spTgt spid="81"/>
+                                          <p:spTgt spid="32"/>
                                         </p:tgtEl>
                                         <p:attrNameLst>
                                           <p:attrName>style.visibility</p:attrName>
@@ -23174,9 +25584,79 @@
                                     </p:set>
                                     <p:animEffect transition="in" filter="fade">
                                       <p:cBhvr>
-                                        <p:cTn id="22" dur="500"/>
+                                        <p:cTn id="68" dur="500"/>
                                         <p:tgtEl>
-                                          <p:spTgt spid="81"/>
+                                          <p:spTgt spid="32"/>
+                                        </p:tgtEl>
+                                      </p:cBhvr>
+                                    </p:animEffect>
+                                  </p:childTnLst>
+                                </p:cTn>
+                              </p:par>
+                              <p:par>
+                                <p:cTn id="69" presetID="10" presetClass="entr" presetSubtype="0" fill="hold" nodeType="withEffect">
+                                  <p:stCondLst>
+                                    <p:cond delay="0"/>
+                                  </p:stCondLst>
+                                  <p:childTnLst>
+                                    <p:set>
+                                      <p:cBhvr>
+                                        <p:cTn id="70" dur="1" fill="hold">
+                                          <p:stCondLst>
+                                            <p:cond delay="0"/>
+                                          </p:stCondLst>
+                                        </p:cTn>
+                                        <p:tgtEl>
+                                          <p:spTgt spid="15"/>
+                                        </p:tgtEl>
+                                        <p:attrNameLst>
+                                          <p:attrName>style.visibility</p:attrName>
+                                        </p:attrNameLst>
+                                      </p:cBhvr>
+                                      <p:to>
+                                        <p:strVal val="visible"/>
+                                      </p:to>
+                                    </p:set>
+                                    <p:animEffect transition="in" filter="fade">
+                                      <p:cBhvr>
+                                        <p:cTn id="71" dur="500"/>
+                                        <p:tgtEl>
+                                          <p:spTgt spid="15"/>
+                                        </p:tgtEl>
+                                      </p:cBhvr>
+                                    </p:animEffect>
+                                  </p:childTnLst>
+                                </p:cTn>
+                              </p:par>
+                              <p:par>
+                                <p:cTn id="72" presetID="10" presetClass="entr" presetSubtype="0" fill="hold" grpId="0" nodeType="withEffect">
+                                  <p:stCondLst>
+                                    <p:cond delay="0"/>
+                                  </p:stCondLst>
+                                  <p:childTnLst>
+                                    <p:set>
+                                      <p:cBhvr>
+                                        <p:cTn id="73" dur="1" fill="hold">
+                                          <p:stCondLst>
+                                            <p:cond delay="0"/>
+                                          </p:stCondLst>
+                                        </p:cTn>
+                                        <p:tgtEl>
+                                          <p:spTgt spid="9"/>
+                                        </p:tgtEl>
+                                        <p:attrNameLst>
+                                          <p:attrName>style.visibility</p:attrName>
+                                        </p:attrNameLst>
+                                      </p:cBhvr>
+                                      <p:to>
+                                        <p:strVal val="visible"/>
+                                      </p:to>
+                                    </p:set>
+                                    <p:animEffect transition="in" filter="fade">
+                                      <p:cBhvr>
+                                        <p:cTn id="74" dur="500"/>
+                                        <p:tgtEl>
+                                          <p:spTgt spid="9"/>
                                         </p:tgtEl>
                                       </p:cBhvr>
                                     </p:animEffect>
@@ -23190,26 +25670,201 @@
                     </p:cTn>
                   </p:par>
                   <p:par>
-                    <p:cTn id="23" fill="hold">
+                    <p:cTn id="75" fill="hold">
                       <p:stCondLst>
                         <p:cond delay="indefinite"/>
                       </p:stCondLst>
                       <p:childTnLst>
                         <p:par>
-                          <p:cTn id="24" fill="hold">
+                          <p:cTn id="76" fill="hold">
                             <p:stCondLst>
                               <p:cond delay="0"/>
                             </p:stCondLst>
                             <p:childTnLst>
                               <p:par>
-                                <p:cTn id="25" presetID="10" presetClass="entr" presetSubtype="0" fill="hold" grpId="0" nodeType="clickEffect">
+                                <p:cTn id="77" presetID="10" presetClass="entr" presetSubtype="0" fill="hold" grpId="0" nodeType="clickEffect">
                                   <p:stCondLst>
                                     <p:cond delay="0"/>
                                   </p:stCondLst>
                                   <p:childTnLst>
                                     <p:set>
                                       <p:cBhvr>
-                                        <p:cTn id="26" dur="1" fill="hold">
+                                        <p:cTn id="78" dur="1" fill="hold">
+                                          <p:stCondLst>
+                                            <p:cond delay="0"/>
+                                          </p:stCondLst>
+                                        </p:cTn>
+                                        <p:tgtEl>
+                                          <p:spTgt spid="33"/>
+                                        </p:tgtEl>
+                                        <p:attrNameLst>
+                                          <p:attrName>style.visibility</p:attrName>
+                                        </p:attrNameLst>
+                                      </p:cBhvr>
+                                      <p:to>
+                                        <p:strVal val="visible"/>
+                                      </p:to>
+                                    </p:set>
+                                    <p:animEffect transition="in" filter="fade">
+                                      <p:cBhvr>
+                                        <p:cTn id="79" dur="500"/>
+                                        <p:tgtEl>
+                                          <p:spTgt spid="33"/>
+                                        </p:tgtEl>
+                                      </p:cBhvr>
+                                    </p:animEffect>
+                                  </p:childTnLst>
+                                </p:cTn>
+                              </p:par>
+                              <p:par>
+                                <p:cTn id="80" presetID="10" presetClass="entr" presetSubtype="0" fill="hold" nodeType="withEffect">
+                                  <p:stCondLst>
+                                    <p:cond delay="0"/>
+                                  </p:stCondLst>
+                                  <p:childTnLst>
+                                    <p:set>
+                                      <p:cBhvr>
+                                        <p:cTn id="81" dur="1" fill="hold">
+                                          <p:stCondLst>
+                                            <p:cond delay="0"/>
+                                          </p:stCondLst>
+                                        </p:cTn>
+                                        <p:tgtEl>
+                                          <p:spTgt spid="11"/>
+                                        </p:tgtEl>
+                                        <p:attrNameLst>
+                                          <p:attrName>style.visibility</p:attrName>
+                                        </p:attrNameLst>
+                                      </p:cBhvr>
+                                      <p:to>
+                                        <p:strVal val="visible"/>
+                                      </p:to>
+                                    </p:set>
+                                    <p:animEffect transition="in" filter="fade">
+                                      <p:cBhvr>
+                                        <p:cTn id="82" dur="500"/>
+                                        <p:tgtEl>
+                                          <p:spTgt spid="11"/>
+                                        </p:tgtEl>
+                                      </p:cBhvr>
+                                    </p:animEffect>
+                                  </p:childTnLst>
+                                </p:cTn>
+                              </p:par>
+                              <p:par>
+                                <p:cTn id="83" presetID="10" presetClass="entr" presetSubtype="0" fill="hold" nodeType="withEffect">
+                                  <p:stCondLst>
+                                    <p:cond delay="0"/>
+                                  </p:stCondLst>
+                                  <p:childTnLst>
+                                    <p:set>
+                                      <p:cBhvr>
+                                        <p:cTn id="84" dur="1" fill="hold">
+                                          <p:stCondLst>
+                                            <p:cond delay="0"/>
+                                          </p:stCondLst>
+                                        </p:cTn>
+                                        <p:tgtEl>
+                                          <p:spTgt spid="34"/>
+                                        </p:tgtEl>
+                                        <p:attrNameLst>
+                                          <p:attrName>style.visibility</p:attrName>
+                                        </p:attrNameLst>
+                                      </p:cBhvr>
+                                      <p:to>
+                                        <p:strVal val="visible"/>
+                                      </p:to>
+                                    </p:set>
+                                    <p:animEffect transition="in" filter="fade">
+                                      <p:cBhvr>
+                                        <p:cTn id="85" dur="500"/>
+                                        <p:tgtEl>
+                                          <p:spTgt spid="34"/>
+                                        </p:tgtEl>
+                                      </p:cBhvr>
+                                    </p:animEffect>
+                                  </p:childTnLst>
+                                </p:cTn>
+                              </p:par>
+                              <p:par>
+                                <p:cTn id="86" presetID="10" presetClass="entr" presetSubtype="0" fill="hold" grpId="0" nodeType="withEffect">
+                                  <p:stCondLst>
+                                    <p:cond delay="0"/>
+                                  </p:stCondLst>
+                                  <p:childTnLst>
+                                    <p:set>
+                                      <p:cBhvr>
+                                        <p:cTn id="87" dur="1" fill="hold">
+                                          <p:stCondLst>
+                                            <p:cond delay="0"/>
+                                          </p:stCondLst>
+                                        </p:cTn>
+                                        <p:tgtEl>
+                                          <p:spTgt spid="38"/>
+                                        </p:tgtEl>
+                                        <p:attrNameLst>
+                                          <p:attrName>style.visibility</p:attrName>
+                                        </p:attrNameLst>
+                                      </p:cBhvr>
+                                      <p:to>
+                                        <p:strVal val="visible"/>
+                                      </p:to>
+                                    </p:set>
+                                    <p:animEffect transition="in" filter="fade">
+                                      <p:cBhvr>
+                                        <p:cTn id="88" dur="500"/>
+                                        <p:tgtEl>
+                                          <p:spTgt spid="38"/>
+                                        </p:tgtEl>
+                                      </p:cBhvr>
+                                    </p:animEffect>
+                                  </p:childTnLst>
+                                </p:cTn>
+                              </p:par>
+                              <p:par>
+                                <p:cTn id="89" presetID="10" presetClass="entr" presetSubtype="0" fill="hold" grpId="0" nodeType="withEffect">
+                                  <p:stCondLst>
+                                    <p:cond delay="0"/>
+                                  </p:stCondLst>
+                                  <p:childTnLst>
+                                    <p:set>
+                                      <p:cBhvr>
+                                        <p:cTn id="90" dur="1" fill="hold">
+                                          <p:stCondLst>
+                                            <p:cond delay="0"/>
+                                          </p:stCondLst>
+                                        </p:cTn>
+                                        <p:tgtEl>
+                                          <p:spTgt spid="22"/>
+                                        </p:tgtEl>
+                                        <p:attrNameLst>
+                                          <p:attrName>style.visibility</p:attrName>
+                                        </p:attrNameLst>
+                                      </p:cBhvr>
+                                      <p:to>
+                                        <p:strVal val="visible"/>
+                                      </p:to>
+                                    </p:set>
+                                    <p:animEffect transition="in" filter="fade">
+                                      <p:cBhvr>
+                                        <p:cTn id="91" dur="500"/>
+                                        <p:tgtEl>
+                                          <p:spTgt spid="22"/>
+                                        </p:tgtEl>
+                                      </p:cBhvr>
+                                    </p:animEffect>
+                                  </p:childTnLst>
+                                </p:cTn>
+                              </p:par>
+                              <p:par>
+                                <p:cTn id="92" presetID="10" presetClass="entr" presetSubtype="0" fill="hold" grpId="0" nodeType="withEffect">
+                                  <p:stCondLst>
+                                    <p:cond delay="0"/>
+                                  </p:stCondLst>
+                                  <p:childTnLst>
+                                    <p:set>
+                                      <p:cBhvr>
+                                        <p:cTn id="93" dur="1" fill="hold">
                                           <p:stCondLst>
                                             <p:cond delay="0"/>
                                           </p:stCondLst>
@@ -23227,9 +25882,79 @@
                                     </p:set>
                                     <p:animEffect transition="in" filter="fade">
                                       <p:cBhvr>
-                                        <p:cTn id="27" dur="500"/>
+                                        <p:cTn id="94" dur="500"/>
                                         <p:tgtEl>
                                           <p:spTgt spid="82"/>
+                                        </p:tgtEl>
+                                      </p:cBhvr>
+                                    </p:animEffect>
+                                  </p:childTnLst>
+                                </p:cTn>
+                              </p:par>
+                              <p:par>
+                                <p:cTn id="95" presetID="10" presetClass="entr" presetSubtype="0" fill="hold" nodeType="withEffect">
+                                  <p:stCondLst>
+                                    <p:cond delay="0"/>
+                                  </p:stCondLst>
+                                  <p:childTnLst>
+                                    <p:set>
+                                      <p:cBhvr>
+                                        <p:cTn id="96" dur="1" fill="hold">
+                                          <p:stCondLst>
+                                            <p:cond delay="0"/>
+                                          </p:stCondLst>
+                                        </p:cTn>
+                                        <p:tgtEl>
+                                          <p:spTgt spid="19"/>
+                                        </p:tgtEl>
+                                        <p:attrNameLst>
+                                          <p:attrName>style.visibility</p:attrName>
+                                        </p:attrNameLst>
+                                      </p:cBhvr>
+                                      <p:to>
+                                        <p:strVal val="visible"/>
+                                      </p:to>
+                                    </p:set>
+                                    <p:animEffect transition="in" filter="fade">
+                                      <p:cBhvr>
+                                        <p:cTn id="97" dur="500"/>
+                                        <p:tgtEl>
+                                          <p:spTgt spid="19"/>
+                                        </p:tgtEl>
+                                      </p:cBhvr>
+                                    </p:animEffect>
+                                  </p:childTnLst>
+                                </p:cTn>
+                              </p:par>
+                              <p:par>
+                                <p:cTn id="98" presetID="10" presetClass="entr" presetSubtype="0" fill="hold" nodeType="withEffect">
+                                  <p:stCondLst>
+                                    <p:cond delay="0"/>
+                                  </p:stCondLst>
+                                  <p:childTnLst>
+                                    <p:set>
+                                      <p:cBhvr>
+                                        <p:cTn id="99" dur="1" fill="hold">
+                                          <p:stCondLst>
+                                            <p:cond delay="0"/>
+                                          </p:stCondLst>
+                                        </p:cTn>
+                                        <p:tgtEl>
+                                          <p:spTgt spid="28674"/>
+                                        </p:tgtEl>
+                                        <p:attrNameLst>
+                                          <p:attrName>style.visibility</p:attrName>
+                                        </p:attrNameLst>
+                                      </p:cBhvr>
+                                      <p:to>
+                                        <p:strVal val="visible"/>
+                                      </p:to>
+                                    </p:set>
+                                    <p:animEffect transition="in" filter="fade">
+                                      <p:cBhvr>
+                                        <p:cTn id="100" dur="500"/>
+                                        <p:tgtEl>
+                                          <p:spTgt spid="28674"/>
                                         </p:tgtEl>
                                       </p:cBhvr>
                                     </p:animEffect>
@@ -23264,812 +25989,22 @@
       </p:par>
     </p:tnLst>
     <p:bldLst>
-      <p:bldP spid="71" grpId="0" animBg="1"/>
+      <p:bldP spid="36" grpId="0" animBg="1"/>
+      <p:bldP spid="38" grpId="0" animBg="1"/>
+      <p:bldP spid="9" grpId="0"/>
+      <p:bldP spid="10" grpId="0"/>
+      <p:bldP spid="22" grpId="0"/>
+      <p:bldP spid="37" grpId="0"/>
+      <p:bldP spid="41" grpId="0"/>
+      <p:bldP spid="47" grpId="0"/>
+      <p:bldP spid="53" grpId="0"/>
+      <p:bldP spid="54" grpId="0" animBg="1"/>
       <p:bldP spid="72" grpId="0" animBg="1"/>
       <p:bldP spid="74" grpId="0" animBg="1"/>
       <p:bldP spid="81" grpId="0" animBg="1"/>
       <p:bldP spid="82" grpId="0" animBg="1"/>
-    </p:bldLst>
-  </p:timing>
-</p:sld>
-</file>
-
-<file path=ppt/slides/slide9.xml><?xml version="1.0" encoding="utf-8"?>
-<p:sld xmlns:a="http://schemas.openxmlformats.org/drawingml/2006/main" xmlns:r="http://schemas.openxmlformats.org/officeDocument/2006/relationships" xmlns:p="http://schemas.openxmlformats.org/presentationml/2006/main">
-  <p:cSld>
-    <p:spTree>
-      <p:nvGrpSpPr>
-        <p:cNvPr id="1" name=""/>
-        <p:cNvGrpSpPr/>
-        <p:nvPr/>
-      </p:nvGrpSpPr>
-      <p:grpSpPr>
-        <a:xfrm>
-          <a:off x="0" y="0"/>
-          <a:ext cx="0" cy="0"/>
-          <a:chOff x="0" y="0"/>
-          <a:chExt cx="0" cy="0"/>
-        </a:xfrm>
-      </p:grpSpPr>
-      <p:pic>
-        <p:nvPicPr>
-          <p:cNvPr id="14338" name="Picture 8"/>
-          <p:cNvPicPr>
-            <a:picLocks noChangeAspect="1" noChangeArrowheads="1"/>
-          </p:cNvPicPr>
-          <p:nvPr/>
-        </p:nvPicPr>
-        <p:blipFill>
-          <a:blip r:embed="rId2">
-            <a:extLst>
-              <a:ext uri="{28A0092B-C50C-407E-A947-70E740481C1C}">
-                <a14:useLocalDpi xmlns:a14="http://schemas.microsoft.com/office/drawing/2010/main" val="0"/>
-              </a:ext>
-            </a:extLst>
-          </a:blip>
-          <a:srcRect/>
-          <a:stretch>
-            <a:fillRect/>
-          </a:stretch>
-        </p:blipFill>
-        <p:spPr bwMode="auto">
-          <a:xfrm>
-            <a:off x="225425" y="1557338"/>
-            <a:ext cx="7524750" cy="4624387"/>
-          </a:xfrm>
-          <a:prstGeom prst="rect">
-            <a:avLst/>
-          </a:prstGeom>
-          <a:noFill/>
-          <a:ln>
-            <a:noFill/>
-          </a:ln>
-          <a:extLst>
-            <a:ext uri="{909E8E84-426E-40DD-AFC4-6F175D3DCCD1}">
-              <a14:hiddenFill xmlns:a14="http://schemas.microsoft.com/office/drawing/2010/main">
-                <a:solidFill>
-                  <a:schemeClr val="accent1"/>
-                </a:solidFill>
-              </a14:hiddenFill>
-            </a:ext>
-            <a:ext uri="{91240B29-F687-4F45-9708-019B960494DF}">
-              <a14:hiddenLine xmlns:a14="http://schemas.microsoft.com/office/drawing/2010/main" w="9525" algn="ctr">
-                <a:solidFill>
-                  <a:schemeClr val="tx1"/>
-                </a:solidFill>
-                <a:miter lim="800000"/>
-                <a:headEnd/>
-                <a:tailEnd/>
-              </a14:hiddenLine>
-            </a:ext>
-          </a:extLst>
-        </p:spPr>
-      </p:pic>
-      <p:sp>
-        <p:nvSpPr>
-          <p:cNvPr id="14339" name="Titel 1"/>
-          <p:cNvSpPr>
-            <a:spLocks noGrp="1"/>
-          </p:cNvSpPr>
-          <p:nvPr>
-            <p:ph type="title"/>
-          </p:nvPr>
-        </p:nvSpPr>
-        <p:spPr/>
-        <p:txBody>
-          <a:bodyPr/>
-          <a:lstStyle/>
-          <a:p>
-            <a:r>
-              <a:rPr lang="de-DE" altLang="de-DE" smtClean="0">
-                <a:ea typeface="ＭＳ Ｐゴシック" pitchFamily="34" charset="-128"/>
-              </a:rPr>
-              <a:t>Wie wichtig sind C/C++?</a:t>
-            </a:r>
-          </a:p>
-        </p:txBody>
-      </p:sp>
-      <p:sp>
-        <p:nvSpPr>
-          <p:cNvPr id="14340" name="Rectangle 45"/>
-          <p:cNvSpPr>
-            <a:spLocks noChangeArrowheads="1"/>
-          </p:cNvSpPr>
-          <p:nvPr/>
-        </p:nvSpPr>
-        <p:spPr bwMode="auto">
-          <a:xfrm>
-            <a:off x="2001838" y="1419225"/>
-            <a:ext cx="9144000" cy="0"/>
-          </a:xfrm>
-          <a:prstGeom prst="rect">
-            <a:avLst/>
-          </a:prstGeom>
-          <a:noFill/>
-          <a:ln>
-            <a:noFill/>
-          </a:ln>
-          <a:effectLst/>
-          <a:extLst>
-            <a:ext uri="{909E8E84-426E-40DD-AFC4-6F175D3DCCD1}">
-              <a14:hiddenFill xmlns:a14="http://schemas.microsoft.com/office/drawing/2010/main">
-                <a:solidFill>
-                  <a:schemeClr val="accent1"/>
-                </a:solidFill>
-              </a14:hiddenFill>
-            </a:ext>
-            <a:ext uri="{91240B29-F687-4F45-9708-019B960494DF}">
-              <a14:hiddenLine xmlns:a14="http://schemas.microsoft.com/office/drawing/2010/main" w="9525" algn="ctr">
-                <a:solidFill>
-                  <a:schemeClr val="tx1"/>
-                </a:solidFill>
-                <a:miter lim="800000"/>
-                <a:headEnd/>
-                <a:tailEnd/>
-              </a14:hiddenLine>
-            </a:ext>
-            <a:ext uri="{AF507438-7753-43E0-B8FC-AC1667EBCBE1}">
-              <a14:hiddenEffects xmlns:a14="http://schemas.microsoft.com/office/drawing/2010/main">
-                <a:effectLst>
-                  <a:outerShdw dist="35921" dir="2700000" algn="ctr" rotWithShape="0">
-                    <a:schemeClr val="bg2"/>
-                  </a:outerShdw>
-                </a:effectLst>
-              </a14:hiddenEffects>
-            </a:ext>
-          </a:extLst>
-        </p:spPr>
-        <p:txBody>
-          <a:bodyPr wrap="none" anchor="ctr">
-            <a:spAutoFit/>
-          </a:bodyPr>
-          <a:lstStyle>
-            <a:lvl1pPr algn="l" eaLnBrk="0" hangingPunct="0">
-              <a:spcBef>
-                <a:spcPct val="20000"/>
-              </a:spcBef>
-              <a:buFont typeface="Wingdings" pitchFamily="2" charset="2"/>
-              <a:defRPr sz="2000">
-                <a:solidFill>
-                  <a:schemeClr val="tx1"/>
-                </a:solidFill>
-                <a:latin typeface="Arial" charset="0"/>
-                <a:ea typeface="ＭＳ Ｐゴシック" pitchFamily="34" charset="-128"/>
-              </a:defRPr>
-            </a:lvl1pPr>
-            <a:lvl2pPr marL="742950" indent="-285750" algn="l" eaLnBrk="0" hangingPunct="0">
-              <a:spcBef>
-                <a:spcPct val="20000"/>
-              </a:spcBef>
-              <a:buFont typeface="Wingdings" pitchFamily="2" charset="2"/>
-              <a:buChar char="§"/>
-              <a:defRPr>
-                <a:solidFill>
-                  <a:schemeClr val="tx1"/>
-                </a:solidFill>
-                <a:latin typeface="Arial" charset="0"/>
-                <a:ea typeface="ＭＳ Ｐゴシック" pitchFamily="34" charset="-128"/>
-              </a:defRPr>
-            </a:lvl2pPr>
-            <a:lvl3pPr marL="1143000" indent="-228600" algn="l" eaLnBrk="0" hangingPunct="0">
-              <a:spcBef>
-                <a:spcPct val="20000"/>
-              </a:spcBef>
-              <a:buFont typeface="Wingdings" pitchFamily="2" charset="2"/>
-              <a:buChar char="§"/>
-              <a:defRPr>
-                <a:solidFill>
-                  <a:schemeClr val="tx1"/>
-                </a:solidFill>
-                <a:latin typeface="Arial" charset="0"/>
-                <a:ea typeface="ＭＳ Ｐゴシック" pitchFamily="34" charset="-128"/>
-              </a:defRPr>
-            </a:lvl3pPr>
-            <a:lvl4pPr marL="1600200" indent="-228600" algn="l" eaLnBrk="0" hangingPunct="0">
-              <a:spcBef>
-                <a:spcPct val="20000"/>
-              </a:spcBef>
-              <a:buFont typeface="Wingdings" pitchFamily="2" charset="2"/>
-              <a:buChar char="§"/>
-              <a:defRPr sz="1600">
-                <a:solidFill>
-                  <a:schemeClr val="tx1"/>
-                </a:solidFill>
-                <a:latin typeface="Arial" charset="0"/>
-                <a:ea typeface="ＭＳ Ｐゴシック" pitchFamily="34" charset="-128"/>
-              </a:defRPr>
-            </a:lvl4pPr>
-            <a:lvl5pPr marL="2057400" indent="-228600" algn="l" eaLnBrk="0" hangingPunct="0">
-              <a:spcBef>
-                <a:spcPct val="20000"/>
-              </a:spcBef>
-              <a:buFont typeface="Wingdings" pitchFamily="2" charset="2"/>
-              <a:buChar char="§"/>
-              <a:defRPr sz="1600">
-                <a:solidFill>
-                  <a:schemeClr val="tx1"/>
-                </a:solidFill>
-                <a:latin typeface="Arial" charset="0"/>
-                <a:ea typeface="ＭＳ Ｐゴシック" pitchFamily="34" charset="-128"/>
-              </a:defRPr>
-            </a:lvl5pPr>
-            <a:lvl6pPr marL="2514600" indent="-228600" defTabSz="449263" eaLnBrk="0" fontAlgn="base" hangingPunct="0">
-              <a:spcBef>
-                <a:spcPct val="20000"/>
-              </a:spcBef>
-              <a:spcAft>
-                <a:spcPct val="0"/>
-              </a:spcAft>
-              <a:buFont typeface="Wingdings" pitchFamily="2" charset="2"/>
-              <a:buChar char="§"/>
-              <a:defRPr sz="1600">
-                <a:solidFill>
-                  <a:schemeClr val="tx1"/>
-                </a:solidFill>
-                <a:latin typeface="Arial" charset="0"/>
-                <a:ea typeface="ＭＳ Ｐゴシック" pitchFamily="34" charset="-128"/>
-              </a:defRPr>
-            </a:lvl6pPr>
-            <a:lvl7pPr marL="2971800" indent="-228600" defTabSz="449263" eaLnBrk="0" fontAlgn="base" hangingPunct="0">
-              <a:spcBef>
-                <a:spcPct val="20000"/>
-              </a:spcBef>
-              <a:spcAft>
-                <a:spcPct val="0"/>
-              </a:spcAft>
-              <a:buFont typeface="Wingdings" pitchFamily="2" charset="2"/>
-              <a:buChar char="§"/>
-              <a:defRPr sz="1600">
-                <a:solidFill>
-                  <a:schemeClr val="tx1"/>
-                </a:solidFill>
-                <a:latin typeface="Arial" charset="0"/>
-                <a:ea typeface="ＭＳ Ｐゴシック" pitchFamily="34" charset="-128"/>
-              </a:defRPr>
-            </a:lvl7pPr>
-            <a:lvl8pPr marL="3429000" indent="-228600" defTabSz="449263" eaLnBrk="0" fontAlgn="base" hangingPunct="0">
-              <a:spcBef>
-                <a:spcPct val="20000"/>
-              </a:spcBef>
-              <a:spcAft>
-                <a:spcPct val="0"/>
-              </a:spcAft>
-              <a:buFont typeface="Wingdings" pitchFamily="2" charset="2"/>
-              <a:buChar char="§"/>
-              <a:defRPr sz="1600">
-                <a:solidFill>
-                  <a:schemeClr val="tx1"/>
-                </a:solidFill>
-                <a:latin typeface="Arial" charset="0"/>
-                <a:ea typeface="ＭＳ Ｐゴシック" pitchFamily="34" charset="-128"/>
-              </a:defRPr>
-            </a:lvl8pPr>
-            <a:lvl9pPr marL="3886200" indent="-228600" defTabSz="449263" eaLnBrk="0" fontAlgn="base" hangingPunct="0">
-              <a:spcBef>
-                <a:spcPct val="20000"/>
-              </a:spcBef>
-              <a:spcAft>
-                <a:spcPct val="0"/>
-              </a:spcAft>
-              <a:buFont typeface="Wingdings" pitchFamily="2" charset="2"/>
-              <a:buChar char="§"/>
-              <a:defRPr sz="1600">
-                <a:solidFill>
-                  <a:schemeClr val="tx1"/>
-                </a:solidFill>
-                <a:latin typeface="Arial" charset="0"/>
-                <a:ea typeface="ＭＳ Ｐゴシック" pitchFamily="34" charset="-128"/>
-              </a:defRPr>
-            </a:lvl9pPr>
-          </a:lstStyle>
-          <a:p>
-            <a:pPr algn="ctr">
-              <a:spcBef>
-                <a:spcPct val="0"/>
-              </a:spcBef>
-              <a:buSzTx/>
-              <a:buFont typeface="Arial" charset="0"/>
-              <a:buNone/>
-            </a:pPr>
-            <a:r>
-              <a:rPr lang="en-US" altLang="de-DE" sz="1800"/>
-              <a:t/>
-            </a:r>
-            <a:br>
-              <a:rPr lang="en-US" altLang="de-DE" sz="1800"/>
-            </a:br>
-            <a:endParaRPr lang="en-US" altLang="de-DE" sz="1800"/>
-          </a:p>
-        </p:txBody>
-      </p:sp>
-      <p:sp>
-        <p:nvSpPr>
-          <p:cNvPr id="50" name="Abgerundete rechteckige Legende 49"/>
-          <p:cNvSpPr/>
-          <p:nvPr/>
-        </p:nvSpPr>
-        <p:spPr>
-          <a:xfrm>
-            <a:off x="5940425" y="1989138"/>
-            <a:ext cx="2016125" cy="720725"/>
-          </a:xfrm>
-          <a:prstGeom prst="wedgeRoundRectCallout">
-            <a:avLst>
-              <a:gd name="adj1" fmla="val -82398"/>
-              <a:gd name="adj2" fmla="val 171812"/>
-              <a:gd name="adj3" fmla="val 16667"/>
-            </a:avLst>
-          </a:prstGeom>
-          <a:solidFill>
-            <a:schemeClr val="tx1"/>
-          </a:solidFill>
-          <a:ln/>
-        </p:spPr>
-        <p:style>
-          <a:lnRef idx="1">
-            <a:schemeClr val="dk1"/>
-          </a:lnRef>
-          <a:fillRef idx="3">
-            <a:schemeClr val="dk1"/>
-          </a:fillRef>
-          <a:effectRef idx="2">
-            <a:schemeClr val="dk1"/>
-          </a:effectRef>
-          <a:fontRef idx="minor">
-            <a:schemeClr val="lt1"/>
-          </a:fontRef>
-        </p:style>
-        <p:txBody>
-          <a:bodyPr anchor="ctr"/>
-          <a:lstStyle/>
-          <a:p>
-            <a:pPr>
-              <a:defRPr/>
-            </a:pPr>
-            <a:r>
-              <a:rPr lang="de-DE" dirty="0">
-                <a:solidFill>
-                  <a:schemeClr val="bg1"/>
-                </a:solidFill>
-              </a:rPr>
-              <a:t>C war und ist sehr beliebt.</a:t>
-            </a:r>
-          </a:p>
-        </p:txBody>
-      </p:sp>
-      <p:sp>
-        <p:nvSpPr>
-          <p:cNvPr id="14342" name="Rechteck 4"/>
-          <p:cNvSpPr>
-            <a:spLocks noChangeArrowheads="1"/>
-          </p:cNvSpPr>
-          <p:nvPr/>
-        </p:nvSpPr>
-        <p:spPr bwMode="auto">
-          <a:xfrm>
-            <a:off x="4067175" y="6219825"/>
-            <a:ext cx="4572000" cy="234950"/>
-          </a:xfrm>
-          <a:prstGeom prst="rect">
-            <a:avLst/>
-          </a:prstGeom>
-          <a:noFill/>
-          <a:ln>
-            <a:noFill/>
-          </a:ln>
-          <a:extLst>
-            <a:ext uri="{909E8E84-426E-40DD-AFC4-6F175D3DCCD1}">
-              <a14:hiddenFill xmlns:a14="http://schemas.microsoft.com/office/drawing/2010/main">
-                <a:solidFill>
-                  <a:srgbClr val="FFFFFF"/>
-                </a:solidFill>
-              </a14:hiddenFill>
-            </a:ext>
-            <a:ext uri="{91240B29-F687-4F45-9708-019B960494DF}">
-              <a14:hiddenLine xmlns:a14="http://schemas.microsoft.com/office/drawing/2010/main" w="9525">
-                <a:solidFill>
-                  <a:srgbClr val="000000"/>
-                </a:solidFill>
-                <a:miter lim="800000"/>
-                <a:headEnd/>
-                <a:tailEnd/>
-              </a14:hiddenLine>
-            </a:ext>
-          </a:extLst>
-        </p:spPr>
-        <p:txBody>
-          <a:bodyPr>
-            <a:spAutoFit/>
-          </a:bodyPr>
-          <a:lstStyle>
-            <a:lvl1pPr algn="l" eaLnBrk="0" hangingPunct="0">
-              <a:spcBef>
-                <a:spcPct val="20000"/>
-              </a:spcBef>
-              <a:buFont typeface="Wingdings" pitchFamily="2" charset="2"/>
-              <a:defRPr sz="2000">
-                <a:solidFill>
-                  <a:schemeClr val="tx1"/>
-                </a:solidFill>
-                <a:latin typeface="Arial" charset="0"/>
-                <a:ea typeface="ＭＳ Ｐゴシック" pitchFamily="34" charset="-128"/>
-              </a:defRPr>
-            </a:lvl1pPr>
-            <a:lvl2pPr marL="742950" indent="-285750" algn="l" eaLnBrk="0" hangingPunct="0">
-              <a:spcBef>
-                <a:spcPct val="20000"/>
-              </a:spcBef>
-              <a:buFont typeface="Wingdings" pitchFamily="2" charset="2"/>
-              <a:buChar char="§"/>
-              <a:defRPr>
-                <a:solidFill>
-                  <a:schemeClr val="tx1"/>
-                </a:solidFill>
-                <a:latin typeface="Arial" charset="0"/>
-                <a:ea typeface="ＭＳ Ｐゴシック" pitchFamily="34" charset="-128"/>
-              </a:defRPr>
-            </a:lvl2pPr>
-            <a:lvl3pPr marL="1143000" indent="-228600" algn="l" eaLnBrk="0" hangingPunct="0">
-              <a:spcBef>
-                <a:spcPct val="20000"/>
-              </a:spcBef>
-              <a:buFont typeface="Wingdings" pitchFamily="2" charset="2"/>
-              <a:buChar char="§"/>
-              <a:defRPr>
-                <a:solidFill>
-                  <a:schemeClr val="tx1"/>
-                </a:solidFill>
-                <a:latin typeface="Arial" charset="0"/>
-                <a:ea typeface="ＭＳ Ｐゴシック" pitchFamily="34" charset="-128"/>
-              </a:defRPr>
-            </a:lvl3pPr>
-            <a:lvl4pPr marL="1600200" indent="-228600" algn="l" eaLnBrk="0" hangingPunct="0">
-              <a:spcBef>
-                <a:spcPct val="20000"/>
-              </a:spcBef>
-              <a:buFont typeface="Wingdings" pitchFamily="2" charset="2"/>
-              <a:buChar char="§"/>
-              <a:defRPr sz="1600">
-                <a:solidFill>
-                  <a:schemeClr val="tx1"/>
-                </a:solidFill>
-                <a:latin typeface="Arial" charset="0"/>
-                <a:ea typeface="ＭＳ Ｐゴシック" pitchFamily="34" charset="-128"/>
-              </a:defRPr>
-            </a:lvl4pPr>
-            <a:lvl5pPr marL="2057400" indent="-228600" algn="l" eaLnBrk="0" hangingPunct="0">
-              <a:spcBef>
-                <a:spcPct val="20000"/>
-              </a:spcBef>
-              <a:buFont typeface="Wingdings" pitchFamily="2" charset="2"/>
-              <a:buChar char="§"/>
-              <a:defRPr sz="1600">
-                <a:solidFill>
-                  <a:schemeClr val="tx1"/>
-                </a:solidFill>
-                <a:latin typeface="Arial" charset="0"/>
-                <a:ea typeface="ＭＳ Ｐゴシック" pitchFamily="34" charset="-128"/>
-              </a:defRPr>
-            </a:lvl5pPr>
-            <a:lvl6pPr marL="2514600" indent="-228600" defTabSz="449263" eaLnBrk="0" fontAlgn="base" hangingPunct="0">
-              <a:spcBef>
-                <a:spcPct val="20000"/>
-              </a:spcBef>
-              <a:spcAft>
-                <a:spcPct val="0"/>
-              </a:spcAft>
-              <a:buFont typeface="Wingdings" pitchFamily="2" charset="2"/>
-              <a:buChar char="§"/>
-              <a:defRPr sz="1600">
-                <a:solidFill>
-                  <a:schemeClr val="tx1"/>
-                </a:solidFill>
-                <a:latin typeface="Arial" charset="0"/>
-                <a:ea typeface="ＭＳ Ｐゴシック" pitchFamily="34" charset="-128"/>
-              </a:defRPr>
-            </a:lvl6pPr>
-            <a:lvl7pPr marL="2971800" indent="-228600" defTabSz="449263" eaLnBrk="0" fontAlgn="base" hangingPunct="0">
-              <a:spcBef>
-                <a:spcPct val="20000"/>
-              </a:spcBef>
-              <a:spcAft>
-                <a:spcPct val="0"/>
-              </a:spcAft>
-              <a:buFont typeface="Wingdings" pitchFamily="2" charset="2"/>
-              <a:buChar char="§"/>
-              <a:defRPr sz="1600">
-                <a:solidFill>
-                  <a:schemeClr val="tx1"/>
-                </a:solidFill>
-                <a:latin typeface="Arial" charset="0"/>
-                <a:ea typeface="ＭＳ Ｐゴシック" pitchFamily="34" charset="-128"/>
-              </a:defRPr>
-            </a:lvl7pPr>
-            <a:lvl8pPr marL="3429000" indent="-228600" defTabSz="449263" eaLnBrk="0" fontAlgn="base" hangingPunct="0">
-              <a:spcBef>
-                <a:spcPct val="20000"/>
-              </a:spcBef>
-              <a:spcAft>
-                <a:spcPct val="0"/>
-              </a:spcAft>
-              <a:buFont typeface="Wingdings" pitchFamily="2" charset="2"/>
-              <a:buChar char="§"/>
-              <a:defRPr sz="1600">
-                <a:solidFill>
-                  <a:schemeClr val="tx1"/>
-                </a:solidFill>
-                <a:latin typeface="Arial" charset="0"/>
-                <a:ea typeface="ＭＳ Ｐゴシック" pitchFamily="34" charset="-128"/>
-              </a:defRPr>
-            </a:lvl8pPr>
-            <a:lvl9pPr marL="3886200" indent="-228600" defTabSz="449263" eaLnBrk="0" fontAlgn="base" hangingPunct="0">
-              <a:spcBef>
-                <a:spcPct val="20000"/>
-              </a:spcBef>
-              <a:spcAft>
-                <a:spcPct val="0"/>
-              </a:spcAft>
-              <a:buFont typeface="Wingdings" pitchFamily="2" charset="2"/>
-              <a:buChar char="§"/>
-              <a:defRPr sz="1600">
-                <a:solidFill>
-                  <a:schemeClr val="tx1"/>
-                </a:solidFill>
-                <a:latin typeface="Arial" charset="0"/>
-                <a:ea typeface="ＭＳ Ｐゴシック" pitchFamily="34" charset="-128"/>
-              </a:defRPr>
-            </a:lvl9pPr>
-          </a:lstStyle>
-          <a:p>
-            <a:pPr algn="ctr" eaLnBrk="1" hangingPunct="1">
-              <a:spcBef>
-                <a:spcPct val="0"/>
-              </a:spcBef>
-              <a:buSzTx/>
-              <a:buFont typeface="Arial" charset="0"/>
-              <a:buNone/>
-            </a:pPr>
-            <a:r>
-              <a:rPr lang="de-DE" altLang="de-DE" sz="1000" dirty="0">
-                <a:hlinkClick r:id="rId3"/>
-              </a:rPr>
-              <a:t>http://www.tiobe.com/index.php/content/paperinfo/tpci/index.html</a:t>
-            </a:r>
-            <a:endParaRPr lang="de-DE" altLang="de-DE" sz="1000" dirty="0"/>
-          </a:p>
-        </p:txBody>
-      </p:sp>
-      <p:sp>
-        <p:nvSpPr>
-          <p:cNvPr id="52" name="Abgerundete rechteckige Legende 51"/>
-          <p:cNvSpPr/>
-          <p:nvPr/>
-        </p:nvSpPr>
-        <p:spPr>
-          <a:xfrm>
-            <a:off x="6107113" y="5229225"/>
-            <a:ext cx="2635250" cy="720725"/>
-          </a:xfrm>
-          <a:prstGeom prst="wedgeRoundRectCallout">
-            <a:avLst>
-              <a:gd name="adj1" fmla="val -61137"/>
-              <a:gd name="adj2" fmla="val -81932"/>
-              <a:gd name="adj3" fmla="val 16667"/>
-            </a:avLst>
-          </a:prstGeom>
-          <a:solidFill>
-            <a:schemeClr val="tx1"/>
-          </a:solidFill>
-          <a:ln/>
-        </p:spPr>
-        <p:style>
-          <a:lnRef idx="1">
-            <a:schemeClr val="dk1"/>
-          </a:lnRef>
-          <a:fillRef idx="3">
-            <a:schemeClr val="dk1"/>
-          </a:fillRef>
-          <a:effectRef idx="2">
-            <a:schemeClr val="dk1"/>
-          </a:effectRef>
-          <a:fontRef idx="minor">
-            <a:schemeClr val="lt1"/>
-          </a:fontRef>
-        </p:style>
-        <p:txBody>
-          <a:bodyPr anchor="ctr"/>
-          <a:lstStyle/>
-          <a:p>
-            <a:pPr>
-              <a:defRPr/>
-            </a:pPr>
-            <a:r>
-              <a:rPr lang="de-DE" dirty="0">
-                <a:solidFill>
-                  <a:schemeClr val="bg1"/>
-                </a:solidFill>
-              </a:rPr>
-              <a:t>C++ = „C </a:t>
-            </a:r>
-            <a:r>
-              <a:rPr lang="de-DE" dirty="0" err="1">
-                <a:solidFill>
-                  <a:schemeClr val="bg1"/>
-                </a:solidFill>
-              </a:rPr>
-              <a:t>with</a:t>
-            </a:r>
-            <a:r>
-              <a:rPr lang="de-DE" dirty="0">
-                <a:solidFill>
-                  <a:schemeClr val="bg1"/>
-                </a:solidFill>
-              </a:rPr>
-              <a:t> </a:t>
-            </a:r>
-            <a:r>
-              <a:rPr lang="de-DE" dirty="0" err="1">
-                <a:solidFill>
-                  <a:schemeClr val="bg1"/>
-                </a:solidFill>
-              </a:rPr>
-              <a:t>objects</a:t>
-            </a:r>
-            <a:r>
-              <a:rPr lang="de-DE" dirty="0">
-                <a:solidFill>
-                  <a:schemeClr val="bg1"/>
-                </a:solidFill>
-              </a:rPr>
-              <a:t>“</a:t>
-            </a:r>
-          </a:p>
-        </p:txBody>
-      </p:sp>
-    </p:spTree>
-  </p:cSld>
-  <p:clrMapOvr>
-    <a:masterClrMapping/>
-  </p:clrMapOvr>
-  <p:transition/>
-  <p:timing>
-    <p:tnLst>
-      <p:par>
-        <p:cTn id="1" dur="indefinite" restart="never" nodeType="tmRoot">
-          <p:childTnLst>
-            <p:seq concurrent="1" nextAc="seek">
-              <p:cTn id="2" dur="indefinite" nodeType="mainSeq">
-                <p:childTnLst>
-                  <p:par>
-                    <p:cTn id="3" fill="hold" nodeType="clickPar">
-                      <p:stCondLst>
-                        <p:cond delay="indefinite"/>
-                      </p:stCondLst>
-                      <p:childTnLst>
-                        <p:par>
-                          <p:cTn id="4" fill="hold" nodeType="withGroup">
-                            <p:stCondLst>
-                              <p:cond delay="0"/>
-                            </p:stCondLst>
-                            <p:childTnLst>
-                              <p:par>
-                                <p:cTn id="5" presetID="10" presetClass="entr" presetSubtype="0" fill="hold" grpId="0" nodeType="clickEffect">
-                                  <p:stCondLst>
-                                    <p:cond delay="0"/>
-                                  </p:stCondLst>
-                                  <p:childTnLst>
-                                    <p:set>
-                                      <p:cBhvr>
-                                        <p:cTn id="6" dur="1" fill="hold">
-                                          <p:stCondLst>
-                                            <p:cond delay="0"/>
-                                          </p:stCondLst>
-                                        </p:cTn>
-                                        <p:tgtEl>
-                                          <p:spTgt spid="50"/>
-                                        </p:tgtEl>
-                                        <p:attrNameLst>
-                                          <p:attrName>style.visibility</p:attrName>
-                                        </p:attrNameLst>
-                                      </p:cBhvr>
-                                      <p:to>
-                                        <p:strVal val="visible"/>
-                                      </p:to>
-                                    </p:set>
-                                    <p:animEffect transition="in" filter="fade">
-                                      <p:cBhvr>
-                                        <p:cTn id="7" dur="500"/>
-                                        <p:tgtEl>
-                                          <p:spTgt spid="50"/>
-                                        </p:tgtEl>
-                                      </p:cBhvr>
-                                    </p:animEffect>
-                                  </p:childTnLst>
-                                </p:cTn>
-                              </p:par>
-                            </p:childTnLst>
-                          </p:cTn>
-                        </p:par>
-                      </p:childTnLst>
-                    </p:cTn>
-                  </p:par>
-                  <p:par>
-                    <p:cTn id="8" fill="hold" nodeType="clickPar">
-                      <p:stCondLst>
-                        <p:cond delay="indefinite"/>
-                      </p:stCondLst>
-                      <p:childTnLst>
-                        <p:par>
-                          <p:cTn id="9" fill="hold" nodeType="withGroup">
-                            <p:stCondLst>
-                              <p:cond delay="0"/>
-                            </p:stCondLst>
-                            <p:childTnLst>
-                              <p:par>
-                                <p:cTn id="10" presetID="10" presetClass="entr" presetSubtype="0" fill="hold" grpId="0" nodeType="clickEffect">
-                                  <p:stCondLst>
-                                    <p:cond delay="0"/>
-                                  </p:stCondLst>
-                                  <p:childTnLst>
-                                    <p:set>
-                                      <p:cBhvr>
-                                        <p:cTn id="11" dur="1" fill="hold">
-                                          <p:stCondLst>
-                                            <p:cond delay="0"/>
-                                          </p:stCondLst>
-                                        </p:cTn>
-                                        <p:tgtEl>
-                                          <p:spTgt spid="52"/>
-                                        </p:tgtEl>
-                                        <p:attrNameLst>
-                                          <p:attrName>style.visibility</p:attrName>
-                                        </p:attrNameLst>
-                                      </p:cBhvr>
-                                      <p:to>
-                                        <p:strVal val="visible"/>
-                                      </p:to>
-                                    </p:set>
-                                    <p:animEffect transition="in" filter="fade">
-                                      <p:cBhvr>
-                                        <p:cTn id="12" dur="500"/>
-                                        <p:tgtEl>
-                                          <p:spTgt spid="52"/>
-                                        </p:tgtEl>
-                                      </p:cBhvr>
-                                    </p:animEffect>
-                                  </p:childTnLst>
-                                </p:cTn>
-                              </p:par>
-                            </p:childTnLst>
-                          </p:cTn>
-                        </p:par>
-                      </p:childTnLst>
-                    </p:cTn>
-                  </p:par>
-                </p:childTnLst>
-              </p:cTn>
-              <p:prevCondLst>
-                <p:cond evt="onPrev" delay="0">
-                  <p:tgtEl>
-                    <p:sldTgt/>
-                  </p:tgtEl>
-                </p:cond>
-              </p:prevCondLst>
-              <p:nextCondLst>
-                <p:cond evt="onNext" delay="0">
-                  <p:tgtEl>
-                    <p:sldTgt/>
-                  </p:tgtEl>
-                </p:cond>
-              </p:nextCondLst>
-            </p:seq>
-          </p:childTnLst>
-        </p:cTn>
-      </p:par>
-    </p:tnLst>
-    <p:bldLst>
-      <p:bldP spid="50" grpId="0" animBg="1"/>
-      <p:bldP spid="52" grpId="0" animBg="1"/>
+      <p:bldP spid="29" grpId="0"/>
+      <p:bldP spid="33" grpId="0"/>
     </p:bldLst>
   </p:timing>
 </p:sld>

</xml_diff>

<commit_message>
Add more literature ("free" Springer books and cheap Galileo books)
</commit_message>
<xml_diff>
--- a/Vorlesung/0 Organisatorisches.pptx
+++ b/Vorlesung/0 Organisatorisches.pptx
@@ -432,11 +432,11 @@
         </c:dLbls>
         <c:gapWidth val="219"/>
         <c:overlap val="-27"/>
-        <c:axId val="1567337680"/>
-        <c:axId val="1567331152"/>
+        <c:axId val="-1662764912"/>
+        <c:axId val="-1662756752"/>
       </c:barChart>
       <c:catAx>
-        <c:axId val="1567337680"/>
+        <c:axId val="-1662764912"/>
         <c:scaling>
           <c:orientation val="minMax"/>
         </c:scaling>
@@ -479,7 +479,7 @@
             <a:endParaRPr lang="en-US"/>
           </a:p>
         </c:txPr>
-        <c:crossAx val="1567331152"/>
+        <c:crossAx val="-1662756752"/>
         <c:crosses val="autoZero"/>
         <c:auto val="1"/>
         <c:lblAlgn val="ctr"/>
@@ -487,7 +487,7 @@
         <c:noMultiLvlLbl val="0"/>
       </c:catAx>
       <c:valAx>
-        <c:axId val="1567331152"/>
+        <c:axId val="-1662756752"/>
         <c:scaling>
           <c:orientation val="minMax"/>
         </c:scaling>
@@ -511,7 +511,7 @@
         <c:majorTickMark val="out"/>
         <c:minorTickMark val="none"/>
         <c:tickLblPos val="nextTo"/>
-        <c:crossAx val="1567337680"/>
+        <c:crossAx val="-1662764912"/>
         <c:crosses val="autoZero"/>
         <c:crossBetween val="between"/>
       </c:valAx>
@@ -6098,11 +6098,7 @@
             </a:pPr>
             <a:r>
               <a:rPr lang="de-DE" baseline="0" dirty="0" smtClean="0"/>
-              <a:t>manche Programme lassen sich tatsächlich mit C-Compiler </a:t>
-            </a:r>
-            <a:r>
-              <a:rPr lang="de-DE" baseline="0" dirty="0" smtClean="0"/>
-              <a:t>übersetzen </a:t>
+              <a:t>manche Programme lassen sich tatsächlich mit C-Compiler übersetzen </a:t>
             </a:r>
             <a:r>
               <a:rPr lang="de-DE" baseline="0" smtClean="0"/>
@@ -11634,7 +11630,7 @@
           <a:graphicData uri="http://schemas.openxmlformats.org/presentationml/2006/ole">
             <mc:AlternateContent xmlns:mc="http://schemas.openxmlformats.org/markup-compatibility/2006">
               <mc:Choice xmlns:v="urn:schemas-microsoft-com:vml" Requires="v">
-                <p:oleObj spid="_x0000_s27780" r:id="rId3" imgW="1038370" imgH="980952" progId="PBrush">
+                <p:oleObj spid="_x0000_s27784" r:id="rId3" imgW="1038370" imgH="980952" progId="PBrush">
                   <p:embed/>
                 </p:oleObj>
               </mc:Choice>
@@ -14628,7 +14624,7 @@
           <a:graphicData uri="http://schemas.openxmlformats.org/presentationml/2006/ole">
             <mc:AlternateContent xmlns:mc="http://schemas.openxmlformats.org/markup-compatibility/2006">
               <mc:Choice xmlns:v="urn:schemas-microsoft-com:vml" Requires="v">
-                <p:oleObj spid="_x0000_s1167" r:id="rId16" imgW="1038370" imgH="980952" progId="">
+                <p:oleObj spid="_x0000_s1171" r:id="rId16" imgW="1038370" imgH="980952" progId="">
                   <p:embed/>
                 </p:oleObj>
               </mc:Choice>
@@ -15066,7 +15062,7 @@
                 </a:lnSpc>
                 <a:defRPr/>
               </a:pPr>
-              <a:t>18.09.2014</a:t>
+              <a:t>23.09.2014</a:t>
             </a:fld>
             <a:r>
               <a:rPr lang="en-GB" altLang="de-DE" sz="1000" smtClean="0">
@@ -16574,7 +16570,7 @@
           <a:graphicData uri="http://schemas.openxmlformats.org/presentationml/2006/ole">
             <mc:AlternateContent xmlns:mc="http://schemas.openxmlformats.org/markup-compatibility/2006">
               <mc:Choice xmlns:v="urn:schemas-microsoft-com:vml" Requires="v">
-                <p:oleObj spid="_x0000_s2190" r:id="rId6" imgW="1038370" imgH="980952" progId="PBrush">
+                <p:oleObj spid="_x0000_s2194" r:id="rId6" imgW="1038370" imgH="980952" progId="PBrush">
                   <p:embed/>
                 </p:oleObj>
               </mc:Choice>
@@ -21548,11 +21544,7 @@
             </a:pPr>
             <a:r>
               <a:rPr lang="de-DE" dirty="0" smtClean="0"/>
-              <a:t>Übung (nachmittags) im </a:t>
-            </a:r>
-            <a:r>
-              <a:rPr lang="de-DE" dirty="0" smtClean="0"/>
-              <a:t>Raum 67</a:t>
+              <a:t>Übung (nachmittags) im Raum 67</a:t>
             </a:r>
           </a:p>
           <a:p>
@@ -21726,19 +21718,7 @@
               <a:rPr lang="de-DE" sz="1600" b="0" dirty="0" smtClean="0">
                 <a:hlinkClick r:id="rId6"/>
               </a:rPr>
-              <a:t>https</a:t>
-            </a:r>
-            <a:r>
-              <a:rPr lang="de-DE" sz="1600" b="0" dirty="0" smtClean="0">
-                <a:hlinkClick r:id="rId6"/>
-              </a:rPr>
-              <a:t>://code.google.com</a:t>
-            </a:r>
-            <a:r>
-              <a:rPr lang="de-DE" sz="1600" b="0" dirty="0" smtClean="0">
-                <a:hlinkClick r:id="rId6"/>
-              </a:rPr>
-              <a:t>/</a:t>
+              <a:t>https://code.google.com/</a:t>
             </a:r>
             <a:r>
               <a:rPr lang="de-DE" sz="1600" b="0" dirty="0" smtClean="0"/>
@@ -21749,11 +21729,7 @@
             </a:br>
             <a:r>
               <a:rPr lang="de-DE" sz="1600" b="0" dirty="0" smtClean="0"/>
-              <a:t>  Git @ GitHub:</a:t>
-            </a:r>
-            <a:r>
-              <a:rPr lang="de-DE" sz="1600" b="0" dirty="0" smtClean="0"/>
-              <a:t> </a:t>
+              <a:t>  Git @ GitHub: </a:t>
             </a:r>
             <a:r>
               <a:rPr lang="de-DE" sz="1600" b="0" dirty="0" smtClean="0">
@@ -21817,7 +21793,6 @@
               <a:rPr lang="de-DE" dirty="0" smtClean="0"/>
               <a:t> </a:t>
             </a:r>
-            <a:endParaRPr lang="de-DE" dirty="0" smtClean="0"/>
           </a:p>
         </p:txBody>
       </p:sp>
@@ -22120,7 +22095,6 @@
               <a:rPr lang="de-DE" altLang="de-DE" dirty="0" smtClean="0"/>
               <a:t>Ein Wort zu den Übungsblättern</a:t>
             </a:r>
-            <a:endParaRPr lang="de-DE" altLang="de-DE" dirty="0" smtClean="0"/>
           </a:p>
         </p:txBody>
       </p:sp>
@@ -22176,7 +22150,6 @@
               <a:rPr lang="de-DE" b="0" dirty="0" smtClean="0"/>
               <a:t>Die Aufgabenblätter sind unterschiedlich lang – man muss nicht immer am Tagesende mit dem Blatt fertig sein!</a:t>
             </a:r>
-            <a:endParaRPr lang="de-DE" b="0" dirty="0" smtClean="0"/>
           </a:p>
         </p:txBody>
       </p:sp>
@@ -22380,6 +22353,25 @@
             </a:r>
             <a:r>
               <a:rPr lang="de-DE" altLang="de-DE" dirty="0" smtClean="0"/>
+              <a:t> C</a:t>
+            </a:r>
+            <a:r>
+              <a:rPr lang="de-DE" altLang="de-DE" dirty="0" smtClean="0"/>
+              <a:t>++ </a:t>
+            </a:r>
+            <a:br>
+              <a:rPr lang="de-DE" altLang="de-DE" dirty="0" smtClean="0"/>
+            </a:br>
+            <a:r>
+              <a:rPr lang="de-DE" altLang="de-DE" dirty="0" smtClean="0"/>
+              <a:t>Scott Meyers: More </a:t>
+            </a:r>
+            <a:r>
+              <a:rPr lang="de-DE" altLang="de-DE" dirty="0" err="1" smtClean="0"/>
+              <a:t>Effective</a:t>
+            </a:r>
+            <a:r>
+              <a:rPr lang="de-DE" altLang="de-DE" dirty="0" smtClean="0"/>
               <a:t> C++</a:t>
             </a:r>
             <a:br>
@@ -22390,18 +22382,59 @@
           <a:p>
             <a:r>
               <a:rPr lang="de-DE" altLang="de-DE" dirty="0" smtClean="0"/>
-              <a:t>Scott Meyers: More </a:t>
+              <a:t>Helmut </a:t>
             </a:r>
             <a:r>
               <a:rPr lang="de-DE" altLang="de-DE" dirty="0" err="1" smtClean="0"/>
-              <a:t>Effective</a:t>
+              <a:t>Schellong</a:t>
             </a:r>
             <a:r>
               <a:rPr lang="de-DE" altLang="de-DE" dirty="0" smtClean="0"/>
-              <a:t> C++</a:t>
-            </a:r>
-          </a:p>
-          <a:p>
+              <a:t>: Moderne C Programmierung [Springer]</a:t>
+            </a:r>
+            <a:br>
+              <a:rPr lang="de-DE" altLang="de-DE" dirty="0" smtClean="0"/>
+            </a:br>
+            <a:r>
+              <a:rPr lang="de-DE" altLang="de-DE" dirty="0" smtClean="0"/>
+              <a:t>Ralf Schneeweiß: Moderne C</a:t>
+            </a:r>
+            <a:r>
+              <a:rPr lang="de-DE" altLang="de-DE" dirty="0"/>
+              <a:t>++ Programmierung [Springer]</a:t>
+            </a:r>
+            <a:r>
+              <a:rPr lang="de-DE" altLang="de-DE" dirty="0" smtClean="0"/>
+              <a:t/>
+            </a:r>
+            <a:br>
+              <a:rPr lang="de-DE" altLang="de-DE" dirty="0" smtClean="0"/>
+            </a:br>
+            <a:endParaRPr lang="de-DE" altLang="de-DE" dirty="0" smtClean="0"/>
+          </a:p>
+          <a:p>
+            <a:r>
+              <a:rPr lang="de-DE" altLang="de-DE" dirty="0" smtClean="0"/>
+              <a:t>Jürgen Wolf: Grundkurs C [Galileo]</a:t>
+            </a:r>
+            <a:br>
+              <a:rPr lang="de-DE" altLang="de-DE" dirty="0" smtClean="0"/>
+            </a:br>
+            <a:r>
+              <a:rPr lang="de-DE" altLang="de-DE" dirty="0" smtClean="0"/>
+              <a:t>Jürgen Wolf: Grundkurs C++ </a:t>
+            </a:r>
+            <a:r>
+              <a:rPr lang="de-DE" altLang="de-DE" dirty="0"/>
+              <a:t>[Galileo]</a:t>
+            </a:r>
+            <a:r>
+              <a:rPr lang="de-DE" altLang="de-DE" dirty="0" smtClean="0"/>
+              <a:t/>
+            </a:r>
+            <a:br>
+              <a:rPr lang="de-DE" altLang="de-DE" dirty="0" smtClean="0"/>
+            </a:br>
             <a:endParaRPr lang="de-DE" altLang="de-DE" dirty="0" smtClean="0"/>
           </a:p>
           <a:p>
@@ -22468,6 +22501,136 @@
                 </a:solidFill>
               </a:rPr>
               <a:t>Alles Klausurrelevante wird während der 6 Tage vermittelt.</a:t>
+            </a:r>
+            <a:endParaRPr lang="de-DE" dirty="0">
+              <a:solidFill>
+                <a:schemeClr val="bg1"/>
+              </a:solidFill>
+            </a:endParaRPr>
+          </a:p>
+        </p:txBody>
+      </p:sp>
+      <p:sp>
+        <p:nvSpPr>
+          <p:cNvPr id="5" name="Abgerundete rechteckige Legende 4"/>
+          <p:cNvSpPr/>
+          <p:nvPr/>
+        </p:nvSpPr>
+        <p:spPr>
+          <a:xfrm>
+            <a:off x="5292080" y="3573016"/>
+            <a:ext cx="3599508" cy="559789"/>
+          </a:xfrm>
+          <a:prstGeom prst="wedgeRoundRectCallout">
+            <a:avLst>
+              <a:gd name="adj1" fmla="val -35660"/>
+              <a:gd name="adj2" fmla="val 67144"/>
+              <a:gd name="adj3" fmla="val 16667"/>
+            </a:avLst>
+          </a:prstGeom>
+          <a:ln/>
+        </p:spPr>
+        <p:style>
+          <a:lnRef idx="1">
+            <a:schemeClr val="dk1"/>
+          </a:lnRef>
+          <a:fillRef idx="3">
+            <a:schemeClr val="dk1"/>
+          </a:fillRef>
+          <a:effectRef idx="2">
+            <a:schemeClr val="dk1"/>
+          </a:effectRef>
+          <a:fontRef idx="minor">
+            <a:schemeClr val="lt1"/>
+          </a:fontRef>
+        </p:style>
+        <p:txBody>
+          <a:bodyPr anchor="ctr"/>
+          <a:lstStyle/>
+          <a:p>
+            <a:pPr>
+              <a:defRPr/>
+            </a:pPr>
+            <a:r>
+              <a:rPr lang="de-DE" dirty="0" smtClean="0">
+                <a:solidFill>
+                  <a:schemeClr val="bg1"/>
+                </a:solidFill>
+              </a:rPr>
+              <a:t>Aus dem </a:t>
+            </a:r>
+            <a:r>
+              <a:rPr lang="de-DE" dirty="0" err="1" smtClean="0">
+                <a:solidFill>
+                  <a:schemeClr val="bg1"/>
+                </a:solidFill>
+              </a:rPr>
+              <a:t>Uninetz</a:t>
+            </a:r>
+            <a:r>
+              <a:rPr lang="de-DE" dirty="0" smtClean="0">
+                <a:solidFill>
+                  <a:schemeClr val="bg1"/>
+                </a:solidFill>
+              </a:rPr>
+              <a:t> frei zugänglich.</a:t>
+            </a:r>
+            <a:endParaRPr lang="de-DE" dirty="0">
+              <a:solidFill>
+                <a:schemeClr val="bg1"/>
+              </a:solidFill>
+            </a:endParaRPr>
+          </a:p>
+        </p:txBody>
+      </p:sp>
+      <p:sp>
+        <p:nvSpPr>
+          <p:cNvPr id="6" name="Abgerundete rechteckige Legende 5"/>
+          <p:cNvSpPr/>
+          <p:nvPr/>
+        </p:nvSpPr>
+        <p:spPr>
+          <a:xfrm>
+            <a:off x="5288835" y="5229200"/>
+            <a:ext cx="2595533" cy="559789"/>
+          </a:xfrm>
+          <a:prstGeom prst="wedgeRoundRectCallout">
+            <a:avLst>
+              <a:gd name="adj1" fmla="val -59131"/>
+              <a:gd name="adj2" fmla="val -25183"/>
+              <a:gd name="adj3" fmla="val 16667"/>
+            </a:avLst>
+          </a:prstGeom>
+          <a:ln/>
+        </p:spPr>
+        <p:style>
+          <a:lnRef idx="1">
+            <a:schemeClr val="dk1"/>
+          </a:lnRef>
+          <a:fillRef idx="3">
+            <a:schemeClr val="dk1"/>
+          </a:fillRef>
+          <a:effectRef idx="2">
+            <a:schemeClr val="dk1"/>
+          </a:effectRef>
+          <a:fontRef idx="minor">
+            <a:schemeClr val="lt1"/>
+          </a:fontRef>
+        </p:style>
+        <p:txBody>
+          <a:bodyPr anchor="ctr"/>
+          <a:lstStyle/>
+          <a:p>
+            <a:pPr>
+              <a:defRPr/>
+            </a:pPr>
+            <a:r>
+              <a:rPr lang="de-DE" dirty="0" smtClean="0">
+                <a:solidFill>
+                  <a:schemeClr val="bg1"/>
+                </a:solidFill>
+              </a:rPr>
+              <a:t>Kompakt und günstig</a:t>
             </a:r>
             <a:endParaRPr lang="de-DE" dirty="0">
               <a:solidFill>
@@ -22548,6 +22711,112 @@
                       </p:childTnLst>
                     </p:cTn>
                   </p:par>
+                  <p:par>
+                    <p:cTn id="8" fill="hold">
+                      <p:stCondLst>
+                        <p:cond delay="indefinite"/>
+                      </p:stCondLst>
+                      <p:childTnLst>
+                        <p:par>
+                          <p:cTn id="9" fill="hold">
+                            <p:stCondLst>
+                              <p:cond delay="0"/>
+                            </p:stCondLst>
+                            <p:childTnLst>
+                              <p:par>
+                                <p:cTn id="10" presetID="10" presetClass="entr" presetSubtype="0" fill="hold" grpId="0" nodeType="clickEffect">
+                                  <p:stCondLst>
+                                    <p:cond delay="0"/>
+                                  </p:stCondLst>
+                                  <p:childTnLst>
+                                    <p:set>
+                                      <p:cBhvr>
+                                        <p:cTn id="11" dur="1" fill="hold">
+                                          <p:stCondLst>
+                                            <p:cond delay="0"/>
+                                          </p:stCondLst>
+                                        </p:cTn>
+                                        <p:tgtEl>
+                                          <p:spTgt spid="5"/>
+                                        </p:tgtEl>
+                                        <p:attrNameLst>
+                                          <p:attrName>style.visibility</p:attrName>
+                                        </p:attrNameLst>
+                                      </p:cBhvr>
+                                      <p:to>
+                                        <p:strVal val="visible"/>
+                                      </p:to>
+                                    </p:set>
+                                    <p:animEffect transition="in" filter="fade">
+                                      <p:cBhvr>
+                                        <p:cTn id="12" dur="500"/>
+                                        <p:tgtEl>
+                                          <p:spTgt spid="5"/>
+                                        </p:tgtEl>
+                                      </p:cBhvr>
+                                    </p:animEffect>
+                                  </p:childTnLst>
+                                </p:cTn>
+                              </p:par>
+                            </p:childTnLst>
+                          </p:cTn>
+                        </p:par>
+                      </p:childTnLst>
+                    </p:cTn>
+                  </p:par>
+                  <p:par>
+                    <p:cTn id="13" fill="hold">
+                      <p:stCondLst>
+                        <p:cond delay="indefinite"/>
+                      </p:stCondLst>
+                      <p:childTnLst>
+                        <p:par>
+                          <p:cTn id="14" fill="hold">
+                            <p:stCondLst>
+                              <p:cond delay="0"/>
+                            </p:stCondLst>
+                            <p:childTnLst>
+                              <p:par>
+                                <p:cTn id="15" presetID="10" presetClass="entr" presetSubtype="0" fill="hold" grpId="0" nodeType="clickEffect">
+                                  <p:stCondLst>
+                                    <p:cond delay="0"/>
+                                  </p:stCondLst>
+                                  <p:childTnLst>
+                                    <p:set>
+                                      <p:cBhvr>
+                                        <p:cTn id="16" dur="1" fill="hold">
+                                          <p:stCondLst>
+                                            <p:cond delay="0"/>
+                                          </p:stCondLst>
+                                        </p:cTn>
+                                        <p:tgtEl>
+                                          <p:spTgt spid="6"/>
+                                        </p:tgtEl>
+                                        <p:attrNameLst>
+                                          <p:attrName>style.visibility</p:attrName>
+                                        </p:attrNameLst>
+                                      </p:cBhvr>
+                                      <p:to>
+                                        <p:strVal val="visible"/>
+                                      </p:to>
+                                    </p:set>
+                                    <p:animEffect transition="in" filter="fade">
+                                      <p:cBhvr>
+                                        <p:cTn id="17" dur="500"/>
+                                        <p:tgtEl>
+                                          <p:spTgt spid="6"/>
+                                        </p:tgtEl>
+                                      </p:cBhvr>
+                                    </p:animEffect>
+                                  </p:childTnLst>
+                                </p:cTn>
+                              </p:par>
+                            </p:childTnLst>
+                          </p:cTn>
+                        </p:par>
+                      </p:childTnLst>
+                    </p:cTn>
+                  </p:par>
                 </p:childTnLst>
               </p:cTn>
               <p:prevCondLst>
@@ -22571,6 +22840,8 @@
     </p:tnLst>
     <p:bldLst>
       <p:bldP spid="4" grpId="0" animBg="1"/>
+      <p:bldP spid="5" grpId="0" animBg="1"/>
+      <p:bldP spid="6" grpId="0" animBg="1"/>
     </p:bldLst>
   </p:timing>
 </p:sld>
@@ -23299,9 +23570,6 @@
               </a:rPr>
               <a:t>C, C++ und Java</a:t>
             </a:r>
-            <a:endParaRPr lang="de-DE" altLang="de-DE" dirty="0" smtClean="0">
-              <a:ea typeface="ＭＳ Ｐゴシック" pitchFamily="34" charset="-128"/>
-            </a:endParaRPr>
           </a:p>
         </p:txBody>
       </p:sp>

</xml_diff>